<commit_message>
Add service and repository for category crawler
</commit_message>
<xml_diff>
--- a/PriceMonitoringDesign.pptx
+++ b/PriceMonitoringDesign.pptx
@@ -5,7 +5,7 @@
     <p:sldMasterId id="2147483648" r:id="rId1"/>
   </p:sldMasterIdLst>
   <p:notesMasterIdLst>
-    <p:notesMasterId r:id="rId8"/>
+    <p:notesMasterId r:id="rId10"/>
   </p:notesMasterIdLst>
   <p:sldIdLst>
     <p:sldId id="256" r:id="rId2"/>
@@ -14,6 +14,8 @@
     <p:sldId id="259" r:id="rId5"/>
     <p:sldId id="260" r:id="rId6"/>
     <p:sldId id="261" r:id="rId7"/>
+    <p:sldId id="262" r:id="rId8"/>
+    <p:sldId id="263" r:id="rId9"/>
   </p:sldIdLst>
   <p:sldSz cx="12192000" cy="6858000"/>
   <p:notesSz cx="6858000" cy="9144000"/>
@@ -6465,6 +6467,720 @@
       </p:par>
     </p:tnLst>
   </p:timing>
+</p:sld>
+</file>
+
+<file path=ppt/slides/slide7.xml><?xml version="1.0" encoding="utf-8"?>
+<p:sld xmlns:a="http://schemas.openxmlformats.org/drawingml/2006/main" xmlns:r="http://schemas.openxmlformats.org/officeDocument/2006/relationships" xmlns:p="http://schemas.openxmlformats.org/presentationml/2006/main">
+  <p:cSld>
+    <p:spTree>
+      <p:nvGrpSpPr>
+        <p:cNvPr id="1" name=""/>
+        <p:cNvGrpSpPr/>
+        <p:nvPr/>
+      </p:nvGrpSpPr>
+      <p:grpSpPr>
+        <a:xfrm>
+          <a:off x="0" y="0"/>
+          <a:ext cx="0" cy="0"/>
+          <a:chOff x="0" y="0"/>
+          <a:chExt cx="0" cy="0"/>
+        </a:xfrm>
+      </p:grpSpPr>
+      <p:sp>
+        <p:nvSpPr>
+          <p:cNvPr id="2" name="Title 1"/>
+          <p:cNvSpPr>
+            <a:spLocks noGrp="1"/>
+          </p:cNvSpPr>
+          <p:nvPr>
+            <p:ph type="title"/>
+          </p:nvPr>
+        </p:nvSpPr>
+        <p:spPr/>
+        <p:txBody>
+          <a:bodyPr/>
+          <a:lstStyle/>
+          <a:p>
+            <a:r>
+              <a:rPr lang="en-US" dirty="0" smtClean="0"/>
+              <a:t>Category Crawler Detail</a:t>
+            </a:r>
+            <a:endParaRPr lang="en-US" dirty="0"/>
+          </a:p>
+        </p:txBody>
+      </p:sp>
+      <p:sp>
+        <p:nvSpPr>
+          <p:cNvPr id="3" name="Content Placeholder 2"/>
+          <p:cNvSpPr>
+            <a:spLocks noGrp="1"/>
+          </p:cNvSpPr>
+          <p:nvPr>
+            <p:ph idx="1"/>
+          </p:nvPr>
+        </p:nvSpPr>
+        <p:spPr/>
+        <p:txBody>
+          <a:bodyPr>
+            <a:normAutofit fontScale="62500" lnSpcReduction="20000"/>
+          </a:bodyPr>
+          <a:lstStyle/>
+          <a:p>
+            <a:r>
+              <a:rPr lang="en-US" dirty="0" smtClean="0"/>
+              <a:t>Since </a:t>
+            </a:r>
+            <a:r>
+              <a:rPr lang="en-US" dirty="0"/>
+              <a:t>product category won't change too fast, this crawler is scheduled to run once a </a:t>
+            </a:r>
+            <a:r>
+              <a:rPr lang="en-US" dirty="0" smtClean="0"/>
+              <a:t>week.</a:t>
+            </a:r>
+          </a:p>
+          <a:p>
+            <a:r>
+              <a:rPr lang="en-US" dirty="0" smtClean="0"/>
+              <a:t>From </a:t>
+            </a:r>
+            <a:r>
+              <a:rPr lang="en-US" dirty="0" err="1"/>
+              <a:t>url</a:t>
+            </a:r>
+            <a:r>
+              <a:rPr lang="en-US" dirty="0"/>
+              <a:t>: </a:t>
+            </a:r>
+            <a:r>
+              <a:rPr lang="en-US" dirty="0" smtClean="0">
+                <a:hlinkClick r:id="rId2"/>
+              </a:rPr>
+              <a:t>https</a:t>
+            </a:r>
+            <a:r>
+              <a:rPr lang="en-US" dirty="0">
+                <a:hlinkClick r:id="rId2"/>
+              </a:rPr>
+              <a:t>://www.amazon.com/s/ref=nb_sb_noss_2?url=search-alias=aps&amp;field-keywords=-</a:t>
+            </a:r>
+            <a:r>
+              <a:rPr lang="en-US" dirty="0" smtClean="0">
+                <a:hlinkClick r:id="rId2"/>
+              </a:rPr>
+              <a:t>12345</a:t>
+            </a:r>
+            <a:endParaRPr lang="en-US" dirty="0"/>
+          </a:p>
+          <a:p>
+            <a:r>
+              <a:rPr lang="en-US" dirty="0" smtClean="0"/>
+              <a:t>Selector: #</a:t>
+            </a:r>
+            <a:r>
+              <a:rPr lang="en-US" dirty="0" err="1" smtClean="0"/>
+              <a:t>searchDropdownBox</a:t>
+            </a:r>
+            <a:r>
+              <a:rPr lang="en-US" dirty="0" smtClean="0"/>
+              <a:t> </a:t>
+            </a:r>
+            <a:r>
+              <a:rPr lang="en-US" dirty="0"/>
+              <a:t>&gt; </a:t>
+            </a:r>
+            <a:r>
+              <a:rPr lang="en-US" dirty="0" err="1"/>
+              <a:t>option:nth-child</a:t>
+            </a:r>
+            <a:r>
+              <a:rPr lang="en-US" dirty="0"/>
+              <a:t>(n)</a:t>
+            </a:r>
+            <a:br>
+              <a:rPr lang="en-US" dirty="0"/>
+            </a:br>
+            <a:r>
+              <a:rPr lang="en-US" dirty="0"/>
+              <a:t/>
+            </a:r>
+            <a:br>
+              <a:rPr lang="en-US" dirty="0"/>
+            </a:br>
+            <a:r>
+              <a:rPr lang="en-US" dirty="0"/>
+              <a:t>Where n &gt;= </a:t>
+            </a:r>
+            <a:r>
+              <a:rPr lang="en-US" dirty="0" smtClean="0"/>
+              <a:t>2</a:t>
+            </a:r>
+          </a:p>
+          <a:p>
+            <a:r>
+              <a:rPr lang="en-US" dirty="0" smtClean="0"/>
+              <a:t>Get category name from child node text.</a:t>
+            </a:r>
+            <a:endParaRPr lang="en-US" dirty="0"/>
+          </a:p>
+          <a:p>
+            <a:r>
+              <a:rPr lang="en-US" dirty="0" smtClean="0"/>
+              <a:t>Get </a:t>
+            </a:r>
+            <a:r>
+              <a:rPr lang="en-US" dirty="0"/>
+              <a:t>“</a:t>
+            </a:r>
+            <a:r>
+              <a:rPr lang="en-US" dirty="0" smtClean="0"/>
+              <a:t>search-alias=xxx” </a:t>
+            </a:r>
+            <a:r>
+              <a:rPr lang="en-US" dirty="0"/>
+              <a:t>as category </a:t>
+            </a:r>
+            <a:r>
+              <a:rPr lang="en-US" dirty="0" smtClean="0"/>
+              <a:t>search alias</a:t>
+            </a:r>
+            <a:endParaRPr lang="en-US" b="1" dirty="0"/>
+          </a:p>
+          <a:p>
+            <a:r>
+              <a:rPr lang="en-US" dirty="0" smtClean="0"/>
+              <a:t>Repeat </a:t>
+            </a:r>
+            <a:r>
+              <a:rPr lang="en-US" dirty="0"/>
+              <a:t>till empty element </a:t>
+            </a:r>
+            <a:r>
+              <a:rPr lang="en-US" dirty="0" smtClean="0"/>
+              <a:t>is reached.</a:t>
+            </a:r>
+          </a:p>
+          <a:p>
+            <a:r>
+              <a:rPr lang="en-US" dirty="0" smtClean="0"/>
+              <a:t>The </a:t>
+            </a:r>
+            <a:r>
+              <a:rPr lang="en-US" dirty="0"/>
+              <a:t>product list </a:t>
+            </a:r>
+            <a:r>
+              <a:rPr lang="en-US" dirty="0" err="1"/>
+              <a:t>url</a:t>
+            </a:r>
+            <a:r>
+              <a:rPr lang="en-US" dirty="0"/>
+              <a:t> for each category is in the following format:</a:t>
+            </a:r>
+            <a:br>
+              <a:rPr lang="en-US" dirty="0"/>
+            </a:br>
+            <a:r>
+              <a:rPr lang="en-US" dirty="0" smtClean="0"/>
+              <a:t>https</a:t>
+            </a:r>
+            <a:r>
+              <a:rPr lang="en-US" dirty="0"/>
+              <a:t>://</a:t>
+            </a:r>
+            <a:r>
+              <a:rPr lang="en-US" dirty="0" err="1"/>
+              <a:t>www.amazon.com</a:t>
+            </a:r>
+            <a:r>
+              <a:rPr lang="en-US" dirty="0"/>
+              <a:t>/s/ref=</a:t>
+            </a:r>
+            <a:r>
+              <a:rPr lang="en-US" dirty="0" err="1"/>
+              <a:t>nb_sb_noss?url</a:t>
+            </a:r>
+            <a:r>
+              <a:rPr lang="en-US" dirty="0"/>
+              <a:t>=$</a:t>
+            </a:r>
+            <a:r>
+              <a:rPr lang="en-US" dirty="0" err="1"/>
+              <a:t>SEARCH_ALIAS&amp;field-keywords</a:t>
+            </a:r>
+            <a:r>
+              <a:rPr lang="en-US" dirty="0"/>
+              <a:t>=-12345&amp;page=$PAGE_NO</a:t>
+            </a:r>
+            <a:br>
+              <a:rPr lang="en-US" dirty="0"/>
+            </a:br>
+            <a:r>
+              <a:rPr lang="en-US" dirty="0"/>
+              <a:t/>
+            </a:r>
+            <a:br>
+              <a:rPr lang="en-US" dirty="0"/>
+            </a:br>
+            <a:r>
+              <a:rPr lang="en-US" dirty="0"/>
+              <a:t>Replace the $SEARCH_ALIAS with category name and $PAGE_NO with the desired product </a:t>
+            </a:r>
+            <a:r>
+              <a:rPr lang="en-US" dirty="0" smtClean="0"/>
+              <a:t>list.</a:t>
+            </a:r>
+            <a:endParaRPr lang="en-US" dirty="0"/>
+          </a:p>
+          <a:p>
+            <a:r>
+              <a:rPr lang="en-US" dirty="0" smtClean="0"/>
+              <a:t>Store </a:t>
+            </a:r>
+            <a:r>
+              <a:rPr lang="en-US" dirty="0"/>
+              <a:t>the &lt;Category name, product list </a:t>
+            </a:r>
+            <a:r>
+              <a:rPr lang="en-US" dirty="0" err="1"/>
+              <a:t>url</a:t>
+            </a:r>
+            <a:r>
+              <a:rPr lang="en-US" dirty="0"/>
+              <a:t>&gt; pairs into Category DB.</a:t>
+            </a:r>
+            <a:br>
+              <a:rPr lang="en-US" dirty="0"/>
+            </a:br>
+            <a:endParaRPr lang="en-US" dirty="0"/>
+          </a:p>
+        </p:txBody>
+      </p:sp>
+    </p:spTree>
+    <p:extLst>
+      <p:ext uri="{BB962C8B-B14F-4D97-AF65-F5344CB8AC3E}">
+        <p14:creationId xmlns:p14="http://schemas.microsoft.com/office/powerpoint/2010/main" val="662863133"/>
+      </p:ext>
+    </p:extLst>
+  </p:cSld>
+  <p:clrMapOvr>
+    <a:masterClrMapping/>
+  </p:clrMapOvr>
+</p:sld>
+</file>
+
+<file path=ppt/slides/slide8.xml><?xml version="1.0" encoding="utf-8"?>
+<p:sld xmlns:a="http://schemas.openxmlformats.org/drawingml/2006/main" xmlns:r="http://schemas.openxmlformats.org/officeDocument/2006/relationships" xmlns:p="http://schemas.openxmlformats.org/presentationml/2006/main">
+  <p:cSld>
+    <p:spTree>
+      <p:nvGrpSpPr>
+        <p:cNvPr id="1" name=""/>
+        <p:cNvGrpSpPr/>
+        <p:nvPr/>
+      </p:nvGrpSpPr>
+      <p:grpSpPr>
+        <a:xfrm>
+          <a:off x="0" y="0"/>
+          <a:ext cx="0" cy="0"/>
+          <a:chOff x="0" y="0"/>
+          <a:chExt cx="0" cy="0"/>
+        </a:xfrm>
+      </p:grpSpPr>
+      <p:sp>
+        <p:nvSpPr>
+          <p:cNvPr id="2" name="Title 1"/>
+          <p:cNvSpPr>
+            <a:spLocks noGrp="1"/>
+          </p:cNvSpPr>
+          <p:nvPr>
+            <p:ph type="title"/>
+          </p:nvPr>
+        </p:nvSpPr>
+        <p:spPr/>
+        <p:txBody>
+          <a:bodyPr/>
+          <a:lstStyle/>
+          <a:p>
+            <a:r>
+              <a:rPr lang="en-US" dirty="0" smtClean="0"/>
+              <a:t>Product Crawler Detail</a:t>
+            </a:r>
+            <a:endParaRPr lang="en-US" dirty="0"/>
+          </a:p>
+        </p:txBody>
+      </p:sp>
+      <p:sp>
+        <p:nvSpPr>
+          <p:cNvPr id="3" name="Content Placeholder 2"/>
+          <p:cNvSpPr>
+            <a:spLocks noGrp="1"/>
+          </p:cNvSpPr>
+          <p:nvPr>
+            <p:ph idx="1"/>
+          </p:nvPr>
+        </p:nvSpPr>
+        <p:spPr/>
+        <p:txBody>
+          <a:bodyPr>
+            <a:normAutofit fontScale="62500" lnSpcReduction="20000"/>
+          </a:bodyPr>
+          <a:lstStyle/>
+          <a:p>
+            <a:r>
+              <a:rPr lang="en-US" dirty="0" smtClean="0"/>
+              <a:t>This </a:t>
+            </a:r>
+            <a:r>
+              <a:rPr lang="en-US" dirty="0"/>
+              <a:t>crawler is scheduled to run every 4 hours to quickly catch price changing </a:t>
+            </a:r>
+            <a:r>
+              <a:rPr lang="en-US" dirty="0" smtClean="0"/>
+              <a:t>information.</a:t>
+            </a:r>
+          </a:p>
+          <a:p>
+            <a:r>
+              <a:rPr lang="en-US" dirty="0" smtClean="0"/>
+              <a:t>If </a:t>
+            </a:r>
+            <a:r>
+              <a:rPr lang="en-US" dirty="0"/>
+              <a:t>a category contains a lot of products, multiple crawlers can be started to share the </a:t>
+            </a:r>
+            <a:r>
+              <a:rPr lang="en-US" dirty="0" smtClean="0"/>
+              <a:t>load.</a:t>
+            </a:r>
+          </a:p>
+          <a:p>
+            <a:r>
+              <a:rPr lang="en-US" dirty="0" smtClean="0"/>
+              <a:t>Only </a:t>
+            </a:r>
+            <a:r>
+              <a:rPr lang="en-US" dirty="0"/>
+              <a:t>subscribed categories will be </a:t>
+            </a:r>
+            <a:r>
+              <a:rPr lang="en-US" dirty="0" smtClean="0"/>
+              <a:t>crawled.</a:t>
+            </a:r>
+          </a:p>
+          <a:p>
+            <a:r>
+              <a:rPr lang="en-US" dirty="0" smtClean="0"/>
+              <a:t>Title</a:t>
+            </a:r>
+            <a:r>
+              <a:rPr lang="en-US" dirty="0"/>
+              <a:t>: get title from selector: </a:t>
+            </a:r>
+            <a:br>
+              <a:rPr lang="en-US" dirty="0"/>
+            </a:br>
+            <a:r>
+              <a:rPr lang="en-US" dirty="0" smtClean="0"/>
+              <a:t>#</a:t>
+            </a:r>
+            <a:r>
+              <a:rPr lang="en-US" dirty="0" err="1"/>
+              <a:t>result_$RESULT_NO</a:t>
+            </a:r>
+            <a:r>
+              <a:rPr lang="en-US" dirty="0"/>
+              <a:t> &gt; div &gt; div &gt; div &gt; </a:t>
+            </a:r>
+            <a:r>
+              <a:rPr lang="en-US" dirty="0" err="1"/>
+              <a:t>div.a</a:t>
+            </a:r>
+            <a:r>
+              <a:rPr lang="en-US" dirty="0"/>
+              <a:t>-fixed-left-grid-</a:t>
+            </a:r>
+            <a:r>
+              <a:rPr lang="en-US" dirty="0" err="1"/>
+              <a:t>col.a</a:t>
+            </a:r>
+            <a:r>
+              <a:rPr lang="en-US" dirty="0"/>
+              <a:t>-col-right &gt; </a:t>
+            </a:r>
+            <a:r>
+              <a:rPr lang="en-US" dirty="0" err="1"/>
+              <a:t>div.a</a:t>
+            </a:r>
+            <a:r>
+              <a:rPr lang="en-US" dirty="0"/>
+              <a:t>-</a:t>
+            </a:r>
+            <a:r>
+              <a:rPr lang="en-US" dirty="0" err="1"/>
+              <a:t>row.a</a:t>
+            </a:r>
+            <a:r>
+              <a:rPr lang="en-US" dirty="0"/>
+              <a:t>-spacing-small &gt; </a:t>
+            </a:r>
+            <a:r>
+              <a:rPr lang="en-US" dirty="0" err="1"/>
+              <a:t>div:nth-child</a:t>
+            </a:r>
+            <a:r>
+              <a:rPr lang="en-US" dirty="0"/>
+              <a:t>(1) &gt; a</a:t>
+            </a:r>
+            <a:br>
+              <a:rPr lang="en-US" dirty="0"/>
+            </a:br>
+            <a:r>
+              <a:rPr lang="en-US" dirty="0"/>
+              <a:t/>
+            </a:r>
+            <a:br>
+              <a:rPr lang="en-US" dirty="0"/>
+            </a:br>
+            <a:r>
+              <a:rPr lang="en-US" dirty="0"/>
+              <a:t>Where $RESULT_NO starts from </a:t>
+            </a:r>
+            <a:r>
+              <a:rPr lang="en-US" dirty="0" smtClean="0"/>
+              <a:t>0</a:t>
+            </a:r>
+            <a:endParaRPr lang="en-US" dirty="0"/>
+          </a:p>
+          <a:p>
+            <a:r>
+              <a:rPr lang="en-US" dirty="0" smtClean="0"/>
+              <a:t>Price</a:t>
+            </a:r>
+            <a:r>
+              <a:rPr lang="en-US" dirty="0"/>
+              <a:t>: get aria-label from selector: </a:t>
+            </a:r>
+            <a:br>
+              <a:rPr lang="en-US" dirty="0"/>
+            </a:br>
+            <a:r>
+              <a:rPr lang="en-US" dirty="0" smtClean="0"/>
+              <a:t>#</a:t>
+            </a:r>
+            <a:r>
+              <a:rPr lang="en-US" dirty="0" err="1"/>
+              <a:t>result_$RESULT_NO</a:t>
+            </a:r>
+            <a:r>
+              <a:rPr lang="en-US" dirty="0"/>
+              <a:t> &gt; div &gt; div &gt; div &gt; </a:t>
+            </a:r>
+            <a:r>
+              <a:rPr lang="en-US" dirty="0" err="1"/>
+              <a:t>div.a</a:t>
+            </a:r>
+            <a:r>
+              <a:rPr lang="en-US" dirty="0"/>
+              <a:t>-fixed-left-grid-</a:t>
+            </a:r>
+            <a:r>
+              <a:rPr lang="en-US" dirty="0" err="1"/>
+              <a:t>col.a</a:t>
+            </a:r>
+            <a:r>
+              <a:rPr lang="en-US" dirty="0"/>
+              <a:t>-col-right &gt; </a:t>
+            </a:r>
+            <a:r>
+              <a:rPr lang="en-US" dirty="0" err="1"/>
+              <a:t>div:nth-child</a:t>
+            </a:r>
+            <a:r>
+              <a:rPr lang="en-US" dirty="0"/>
+              <a:t>(2) &gt; div.a-column.a-span7 &gt; </a:t>
+            </a:r>
+            <a:r>
+              <a:rPr lang="en-US" dirty="0" err="1"/>
+              <a:t>div.a</a:t>
+            </a:r>
+            <a:r>
+              <a:rPr lang="en-US" dirty="0"/>
+              <a:t>-</a:t>
+            </a:r>
+            <a:r>
+              <a:rPr lang="en-US" dirty="0" err="1"/>
+              <a:t>row.a</a:t>
+            </a:r>
+            <a:r>
+              <a:rPr lang="en-US" dirty="0"/>
+              <a:t>-spacing-none &gt; a &gt; </a:t>
+            </a:r>
+            <a:r>
+              <a:rPr lang="en-US" dirty="0" smtClean="0"/>
+              <a:t>span</a:t>
+            </a:r>
+            <a:endParaRPr lang="en-US" dirty="0"/>
+          </a:p>
+          <a:p>
+            <a:r>
+              <a:rPr lang="en-US" dirty="0" err="1" smtClean="0"/>
+              <a:t>Thumnail</a:t>
+            </a:r>
+            <a:r>
+              <a:rPr lang="en-US" dirty="0"/>
+              <a:t>: get </a:t>
+            </a:r>
+            <a:r>
+              <a:rPr lang="en-US" dirty="0" err="1"/>
+              <a:t>src</a:t>
+            </a:r>
+            <a:r>
+              <a:rPr lang="en-US" dirty="0"/>
+              <a:t> from selector: </a:t>
+            </a:r>
+            <a:br>
+              <a:rPr lang="en-US" dirty="0"/>
+            </a:br>
+            <a:r>
+              <a:rPr lang="en-US" dirty="0" smtClean="0"/>
+              <a:t>#</a:t>
+            </a:r>
+            <a:r>
+              <a:rPr lang="en-US" dirty="0" err="1"/>
+              <a:t>result_$RESULT_NO</a:t>
+            </a:r>
+            <a:r>
+              <a:rPr lang="en-US" dirty="0"/>
+              <a:t> &gt; div &gt; div &gt; div &gt; </a:t>
+            </a:r>
+            <a:r>
+              <a:rPr lang="en-US" dirty="0" err="1"/>
+              <a:t>div.a</a:t>
+            </a:r>
+            <a:r>
+              <a:rPr lang="en-US" dirty="0"/>
+              <a:t>-fixed-left-grid-</a:t>
+            </a:r>
+            <a:r>
+              <a:rPr lang="en-US" dirty="0" err="1"/>
+              <a:t>col.a</a:t>
+            </a:r>
+            <a:r>
+              <a:rPr lang="en-US" dirty="0"/>
+              <a:t>-col-left &gt; div &gt; div &gt; a &gt; </a:t>
+            </a:r>
+            <a:r>
+              <a:rPr lang="en-US" dirty="0" err="1" smtClean="0"/>
+              <a:t>img</a:t>
+            </a:r>
+            <a:endParaRPr lang="en-US" dirty="0"/>
+          </a:p>
+          <a:p>
+            <a:r>
+              <a:rPr lang="en-US" dirty="0" err="1" smtClean="0"/>
+              <a:t>Detail_url</a:t>
+            </a:r>
+            <a:r>
+              <a:rPr lang="en-US" dirty="0"/>
+              <a:t>: get </a:t>
+            </a:r>
+            <a:r>
+              <a:rPr lang="en-US" dirty="0" err="1"/>
+              <a:t>href</a:t>
+            </a:r>
+            <a:r>
+              <a:rPr lang="en-US" dirty="0"/>
+              <a:t> from selector: </a:t>
+            </a:r>
+            <a:br>
+              <a:rPr lang="en-US" dirty="0"/>
+            </a:br>
+            <a:r>
+              <a:rPr lang="en-US" dirty="0" smtClean="0"/>
+              <a:t>#</a:t>
+            </a:r>
+            <a:r>
+              <a:rPr lang="en-US" dirty="0"/>
+              <a:t>result _$RESULT_NO &gt; div &gt; div &gt; div &gt; </a:t>
+            </a:r>
+            <a:r>
+              <a:rPr lang="en-US" dirty="0" err="1"/>
+              <a:t>div.a</a:t>
+            </a:r>
+            <a:r>
+              <a:rPr lang="en-US" dirty="0"/>
+              <a:t>-fixed-left-grid-</a:t>
+            </a:r>
+            <a:r>
+              <a:rPr lang="en-US" dirty="0" err="1"/>
+              <a:t>col.a</a:t>
+            </a:r>
+            <a:r>
+              <a:rPr lang="en-US" dirty="0"/>
+              <a:t>-col-right &gt; </a:t>
+            </a:r>
+            <a:r>
+              <a:rPr lang="en-US" dirty="0" err="1"/>
+              <a:t>div.a</a:t>
+            </a:r>
+            <a:r>
+              <a:rPr lang="en-US" dirty="0"/>
+              <a:t>-</a:t>
+            </a:r>
+            <a:r>
+              <a:rPr lang="en-US" dirty="0" err="1"/>
+              <a:t>row.a</a:t>
+            </a:r>
+            <a:r>
+              <a:rPr lang="en-US" dirty="0"/>
+              <a:t>-spacing-small &gt; </a:t>
+            </a:r>
+            <a:r>
+              <a:rPr lang="en-US" dirty="0" err="1"/>
+              <a:t>div:nth-child</a:t>
+            </a:r>
+            <a:r>
+              <a:rPr lang="en-US" dirty="0"/>
+              <a:t>(1) &gt; </a:t>
+            </a:r>
+            <a:r>
+              <a:rPr lang="en-US" dirty="0" smtClean="0"/>
+              <a:t>a</a:t>
+            </a:r>
+            <a:endParaRPr lang="en-US" dirty="0"/>
+          </a:p>
+          <a:p>
+            <a:r>
+              <a:rPr lang="en-US" dirty="0" err="1" smtClean="0"/>
+              <a:t>product_id</a:t>
+            </a:r>
+            <a:r>
+              <a:rPr lang="en-US" dirty="0"/>
+              <a:t>: get last portion of </a:t>
+            </a:r>
+            <a:r>
+              <a:rPr lang="en-US" dirty="0" err="1"/>
+              <a:t>detail_url</a:t>
+            </a:r>
+            <a:r>
+              <a:rPr lang="en-US" dirty="0" smtClean="0"/>
+              <a:t>.</a:t>
+            </a:r>
+            <a:endParaRPr lang="en-US" dirty="0"/>
+          </a:p>
+        </p:txBody>
+      </p:sp>
+    </p:spTree>
+    <p:extLst>
+      <p:ext uri="{BB962C8B-B14F-4D97-AF65-F5344CB8AC3E}">
+        <p14:creationId xmlns:p14="http://schemas.microsoft.com/office/powerpoint/2010/main" val="893143620"/>
+      </p:ext>
+    </p:extLst>
+  </p:cSld>
+  <p:clrMapOvr>
+    <a:masterClrMapping/>
+  </p:clrMapOvr>
 </p:sld>
 </file>
 

</xml_diff>

<commit_message>
Add logic to assign category priorities
</commit_message>
<xml_diff>
--- a/PriceMonitoringDesign.pptx
+++ b/PriceMonitoringDesign.pptx
@@ -5,7 +5,7 @@
     <p:sldMasterId id="2147483648" r:id="rId1"/>
   </p:sldMasterIdLst>
   <p:notesMasterIdLst>
-    <p:notesMasterId r:id="rId10"/>
+    <p:notesMasterId r:id="rId11"/>
   </p:notesMasterIdLst>
   <p:sldIdLst>
     <p:sldId id="256" r:id="rId2"/>
@@ -16,6 +16,7 @@
     <p:sldId id="261" r:id="rId7"/>
     <p:sldId id="262" r:id="rId8"/>
     <p:sldId id="263" r:id="rId9"/>
+    <p:sldId id="264" r:id="rId10"/>
   </p:sldIdLst>
   <p:sldSz cx="12192000" cy="6858000"/>
   <p:notesSz cx="6858000" cy="9144000"/>
@@ -204,7 +205,7 @@
           <a:p>
             <a:fld id="{822F189D-D7C4-2B4B-BA7D-F542C8765D31}" type="datetimeFigureOut">
               <a:rPr lang="en-US" smtClean="0"/>
-              <a:t>5/31/17</a:t>
+              <a:t>6/11/17</a:t>
             </a:fld>
             <a:endParaRPr lang="en-US"/>
           </a:p>
@@ -603,7 +604,7 @@
           <a:p>
             <a:fld id="{FE13B3C1-B50E-B844-B5EC-A0E6C3AA92EA}" type="datetimeFigureOut">
               <a:rPr lang="en-US" smtClean="0"/>
-              <a:t>5/31/17</a:t>
+              <a:t>6/11/17</a:t>
             </a:fld>
             <a:endParaRPr lang="en-US"/>
           </a:p>
@@ -773,7 +774,7 @@
           <a:p>
             <a:fld id="{FE13B3C1-B50E-B844-B5EC-A0E6C3AA92EA}" type="datetimeFigureOut">
               <a:rPr lang="en-US" smtClean="0"/>
-              <a:t>5/31/17</a:t>
+              <a:t>6/11/17</a:t>
             </a:fld>
             <a:endParaRPr lang="en-US"/>
           </a:p>
@@ -953,7 +954,7 @@
           <a:p>
             <a:fld id="{FE13B3C1-B50E-B844-B5EC-A0E6C3AA92EA}" type="datetimeFigureOut">
               <a:rPr lang="en-US" smtClean="0"/>
-              <a:t>5/31/17</a:t>
+              <a:t>6/11/17</a:t>
             </a:fld>
             <a:endParaRPr lang="en-US"/>
           </a:p>
@@ -1123,7 +1124,7 @@
           <a:p>
             <a:fld id="{FE13B3C1-B50E-B844-B5EC-A0E6C3AA92EA}" type="datetimeFigureOut">
               <a:rPr lang="en-US" smtClean="0"/>
-              <a:t>5/31/17</a:t>
+              <a:t>6/11/17</a:t>
             </a:fld>
             <a:endParaRPr lang="en-US"/>
           </a:p>
@@ -1369,7 +1370,7 @@
           <a:p>
             <a:fld id="{FE13B3C1-B50E-B844-B5EC-A0E6C3AA92EA}" type="datetimeFigureOut">
               <a:rPr lang="en-US" smtClean="0"/>
-              <a:t>5/31/17</a:t>
+              <a:t>6/11/17</a:t>
             </a:fld>
             <a:endParaRPr lang="en-US"/>
           </a:p>
@@ -1601,7 +1602,7 @@
           <a:p>
             <a:fld id="{FE13B3C1-B50E-B844-B5EC-A0E6C3AA92EA}" type="datetimeFigureOut">
               <a:rPr lang="en-US" smtClean="0"/>
-              <a:t>5/31/17</a:t>
+              <a:t>6/11/17</a:t>
             </a:fld>
             <a:endParaRPr lang="en-US"/>
           </a:p>
@@ -1968,7 +1969,7 @@
           <a:p>
             <a:fld id="{FE13B3C1-B50E-B844-B5EC-A0E6C3AA92EA}" type="datetimeFigureOut">
               <a:rPr lang="en-US" smtClean="0"/>
-              <a:t>5/31/17</a:t>
+              <a:t>6/11/17</a:t>
             </a:fld>
             <a:endParaRPr lang="en-US"/>
           </a:p>
@@ -2086,7 +2087,7 @@
           <a:p>
             <a:fld id="{FE13B3C1-B50E-B844-B5EC-A0E6C3AA92EA}" type="datetimeFigureOut">
               <a:rPr lang="en-US" smtClean="0"/>
-              <a:t>5/31/17</a:t>
+              <a:t>6/11/17</a:t>
             </a:fld>
             <a:endParaRPr lang="en-US"/>
           </a:p>
@@ -2181,7 +2182,7 @@
           <a:p>
             <a:fld id="{FE13B3C1-B50E-B844-B5EC-A0E6C3AA92EA}" type="datetimeFigureOut">
               <a:rPr lang="en-US" smtClean="0"/>
-              <a:t>5/31/17</a:t>
+              <a:t>6/11/17</a:t>
             </a:fld>
             <a:endParaRPr lang="en-US"/>
           </a:p>
@@ -2458,7 +2459,7 @@
           <a:p>
             <a:fld id="{FE13B3C1-B50E-B844-B5EC-A0E6C3AA92EA}" type="datetimeFigureOut">
               <a:rPr lang="en-US" smtClean="0"/>
-              <a:t>5/31/17</a:t>
+              <a:t>6/11/17</a:t>
             </a:fld>
             <a:endParaRPr lang="en-US"/>
           </a:p>
@@ -2711,7 +2712,7 @@
           <a:p>
             <a:fld id="{FE13B3C1-B50E-B844-B5EC-A0E6C3AA92EA}" type="datetimeFigureOut">
               <a:rPr lang="en-US" smtClean="0"/>
-              <a:t>5/31/17</a:t>
+              <a:t>6/11/17</a:t>
             </a:fld>
             <a:endParaRPr lang="en-US"/>
           </a:p>
@@ -2924,7 +2925,7 @@
           <a:p>
             <a:fld id="{FE13B3C1-B50E-B844-B5EC-A0E6C3AA92EA}" type="datetimeFigureOut">
               <a:rPr lang="en-US" smtClean="0"/>
-              <a:t>5/31/17</a:t>
+              <a:t>6/11/17</a:t>
             </a:fld>
             <a:endParaRPr lang="en-US"/>
           </a:p>
@@ -7175,6 +7176,151 @@
     <p:extLst>
       <p:ext uri="{BB962C8B-B14F-4D97-AF65-F5344CB8AC3E}">
         <p14:creationId xmlns:p14="http://schemas.microsoft.com/office/powerpoint/2010/main" val="893143620"/>
+      </p:ext>
+    </p:extLst>
+  </p:cSld>
+  <p:clrMapOvr>
+    <a:masterClrMapping/>
+  </p:clrMapOvr>
+</p:sld>
+</file>
+
+<file path=ppt/slides/slide9.xml><?xml version="1.0" encoding="utf-8"?>
+<p:sld xmlns:a="http://schemas.openxmlformats.org/drawingml/2006/main" xmlns:r="http://schemas.openxmlformats.org/officeDocument/2006/relationships" xmlns:p="http://schemas.openxmlformats.org/presentationml/2006/main">
+  <p:cSld>
+    <p:spTree>
+      <p:nvGrpSpPr>
+        <p:cNvPr id="1" name=""/>
+        <p:cNvGrpSpPr/>
+        <p:nvPr/>
+      </p:nvGrpSpPr>
+      <p:grpSpPr>
+        <a:xfrm>
+          <a:off x="0" y="0"/>
+          <a:ext cx="0" cy="0"/>
+          <a:chOff x="0" y="0"/>
+          <a:chExt cx="0" cy="0"/>
+        </a:xfrm>
+      </p:grpSpPr>
+      <p:sp>
+        <p:nvSpPr>
+          <p:cNvPr id="2" name="Title 1"/>
+          <p:cNvSpPr>
+            <a:spLocks noGrp="1"/>
+          </p:cNvSpPr>
+          <p:nvPr>
+            <p:ph type="title"/>
+          </p:nvPr>
+        </p:nvSpPr>
+        <p:spPr/>
+        <p:txBody>
+          <a:bodyPr/>
+          <a:lstStyle/>
+          <a:p>
+            <a:r>
+              <a:rPr lang="en-US" dirty="0" smtClean="0"/>
+              <a:t>Scheduling</a:t>
+            </a:r>
+            <a:endParaRPr lang="en-US" dirty="0"/>
+          </a:p>
+        </p:txBody>
+      </p:sp>
+      <p:sp>
+        <p:nvSpPr>
+          <p:cNvPr id="3" name="Content Placeholder 2"/>
+          <p:cNvSpPr>
+            <a:spLocks noGrp="1"/>
+          </p:cNvSpPr>
+          <p:nvPr>
+            <p:ph idx="1"/>
+          </p:nvPr>
+        </p:nvSpPr>
+        <p:spPr/>
+        <p:txBody>
+          <a:bodyPr>
+            <a:normAutofit fontScale="92500" lnSpcReduction="10000"/>
+          </a:bodyPr>
+          <a:lstStyle/>
+          <a:p>
+            <a:r>
+              <a:rPr lang="en-US" dirty="0" smtClean="0"/>
+              <a:t>Category Crawler</a:t>
+            </a:r>
+          </a:p>
+          <a:p>
+            <a:pPr lvl="1"/>
+            <a:r>
+              <a:rPr lang="en-US" dirty="0" smtClean="0"/>
+              <a:t>Every week at 12:00 AM Sunday</a:t>
+            </a:r>
+          </a:p>
+          <a:p>
+            <a:r>
+              <a:rPr lang="en-US" dirty="0" smtClean="0"/>
+              <a:t>High Priority Product Crawler</a:t>
+            </a:r>
+          </a:p>
+          <a:p>
+            <a:pPr lvl="1"/>
+            <a:r>
+              <a:rPr lang="en-US" dirty="0" smtClean="0"/>
+              <a:t>Every 3 hours starting from 1:00 AM daily</a:t>
+            </a:r>
+          </a:p>
+          <a:p>
+            <a:r>
+              <a:rPr lang="en-US" dirty="0" smtClean="0"/>
+              <a:t>Medium Priority Product Crawler</a:t>
+            </a:r>
+          </a:p>
+          <a:p>
+            <a:pPr lvl="1"/>
+            <a:r>
+              <a:rPr lang="en-US" dirty="0" smtClean="0"/>
+              <a:t>Every 12 hours starting from 2:00 AM daily</a:t>
+            </a:r>
+          </a:p>
+          <a:p>
+            <a:r>
+              <a:rPr lang="en-US" dirty="0" smtClean="0"/>
+              <a:t>Low Priority Product Crawler</a:t>
+            </a:r>
+          </a:p>
+          <a:p>
+            <a:pPr lvl="1"/>
+            <a:r>
+              <a:rPr lang="en-US" dirty="0" smtClean="0"/>
+              <a:t>Every day at 3:00 AM</a:t>
+            </a:r>
+          </a:p>
+          <a:p>
+            <a:r>
+              <a:rPr lang="en-US" smtClean="0"/>
+              <a:t>Order </a:t>
+            </a:r>
+            <a:r>
+              <a:rPr lang="en-US" dirty="0" smtClean="0"/>
+              <a:t>categories by subscribers count, then by category id.</a:t>
+            </a:r>
+          </a:p>
+          <a:p>
+            <a:r>
+              <a:rPr lang="en-US" dirty="0" smtClean="0"/>
+              <a:t>First 1/3 goes to high priority queue, second 1/3 to medium and last 1/3 goes to low priority queue.</a:t>
+            </a:r>
+          </a:p>
+          <a:p>
+            <a:endParaRPr lang="en-US" dirty="0" smtClean="0"/>
+          </a:p>
+          <a:p>
+            <a:endParaRPr lang="en-US" dirty="0"/>
+          </a:p>
+        </p:txBody>
+      </p:sp>
+    </p:spTree>
+    <p:extLst>
+      <p:ext uri="{BB962C8B-B14F-4D97-AF65-F5344CB8AC3E}">
+        <p14:creationId xmlns:p14="http://schemas.microsoft.com/office/powerpoint/2010/main" val="2042320774"/>
       </p:ext>
     </p:extLst>
   </p:cSld>

</xml_diff>

<commit_message>
Add method in DealSearchService to list all categories
</commit_message>
<xml_diff>
--- a/PriceMonitoringDesign.pptx
+++ b/PriceMonitoringDesign.pptx
@@ -8947,8 +8947,17 @@
             </a:r>
             <a:r>
               <a:rPr lang="en-US" sz="2000" dirty="0" smtClean="0"/>
-              <a:t>/category-crawler/user-count-threshold		Update threshold</a:t>
-            </a:r>
+              <a:t>/category-crawler/user-count-threshold		</a:t>
+            </a:r>
+            <a:r>
+              <a:rPr lang="en-US" sz="2000" smtClean="0"/>
+              <a:t>Update </a:t>
+            </a:r>
+            <a:r>
+              <a:rPr lang="en-US" sz="2000" smtClean="0"/>
+              <a:t>threshold</a:t>
+            </a:r>
+            <a:endParaRPr lang="en-US" sz="2000" dirty="0" smtClean="0"/>
           </a:p>
         </p:txBody>
       </p:sp>

</xml_diff>

<commit_message>
Update ppt for using MongoDB part
</commit_message>
<xml_diff>
--- a/PriceMonitoringDesign.pptx
+++ b/PriceMonitoringDesign.pptx
@@ -4817,43 +4817,6 @@
       </p:sp>
       <p:cxnSp>
         <p:nvCxnSpPr>
-          <p:cNvPr id="216" name="Elbow Connector 215"/>
-          <p:cNvCxnSpPr>
-            <a:stCxn id="206" idx="5"/>
-            <a:endCxn id="365" idx="2"/>
-          </p:cNvCxnSpPr>
-          <p:nvPr/>
-        </p:nvCxnSpPr>
-        <p:spPr>
-          <a:xfrm flipV="1">
-            <a:off x="7742253" y="2856584"/>
-            <a:ext cx="3947221" cy="2303164"/>
-          </a:xfrm>
-          <a:prstGeom prst="bentConnector2">
-            <a:avLst/>
-          </a:prstGeom>
-          <a:ln>
-            <a:headEnd type="triangle"/>
-            <a:tailEnd type="triangle"/>
-          </a:ln>
-        </p:spPr>
-        <p:style>
-          <a:lnRef idx="1">
-            <a:schemeClr val="accent1"/>
-          </a:lnRef>
-          <a:fillRef idx="0">
-            <a:schemeClr val="accent1"/>
-          </a:fillRef>
-          <a:effectRef idx="0">
-            <a:schemeClr val="accent1"/>
-          </a:effectRef>
-          <a:fontRef idx="minor">
-            <a:schemeClr val="tx1"/>
-          </a:fontRef>
-        </p:style>
-      </p:cxnSp>
-      <p:cxnSp>
-        <p:nvCxnSpPr>
           <p:cNvPr id="219" name="Elbow Connector 218"/>
           <p:cNvCxnSpPr>
             <a:stCxn id="205" idx="5"/>
@@ -5916,6 +5879,72 @@
           </a:p>
         </p:txBody>
       </p:sp>
+      <p:pic>
+        <p:nvPicPr>
+          <p:cNvPr id="10" name="Picture 9"/>
+          <p:cNvPicPr>
+            <a:picLocks noChangeAspect="1"/>
+          </p:cNvPicPr>
+          <p:nvPr/>
+        </p:nvPicPr>
+        <p:blipFill>
+          <a:blip r:embed="rId11">
+            <a:extLst>
+              <a:ext uri="{28A0092B-C50C-407E-A947-70E740481C1C}">
+                <a14:useLocalDpi xmlns:a14="http://schemas.microsoft.com/office/drawing/2010/main" val="0"/>
+              </a:ext>
+            </a:extLst>
+          </a:blip>
+          <a:stretch>
+            <a:fillRect/>
+          </a:stretch>
+        </p:blipFill>
+        <p:spPr>
+          <a:xfrm>
+            <a:off x="10165111" y="4700205"/>
+            <a:ext cx="919082" cy="919082"/>
+          </a:xfrm>
+          <a:prstGeom prst="rect">
+            <a:avLst/>
+          </a:prstGeom>
+        </p:spPr>
+      </p:pic>
+      <p:cxnSp>
+        <p:nvCxnSpPr>
+          <p:cNvPr id="12" name="Elbow Connector 11"/>
+          <p:cNvCxnSpPr>
+            <a:stCxn id="206" idx="5"/>
+            <a:endCxn id="10" idx="1"/>
+          </p:cNvCxnSpPr>
+          <p:nvPr/>
+        </p:nvCxnSpPr>
+        <p:spPr>
+          <a:xfrm flipV="1">
+            <a:off x="7742253" y="5159746"/>
+            <a:ext cx="2422858" cy="2"/>
+          </a:xfrm>
+          <a:prstGeom prst="bentConnector3">
+            <a:avLst/>
+          </a:prstGeom>
+          <a:ln>
+            <a:tailEnd type="triangle"/>
+          </a:ln>
+        </p:spPr>
+        <p:style>
+          <a:lnRef idx="1">
+            <a:schemeClr val="accent1"/>
+          </a:lnRef>
+          <a:fillRef idx="0">
+            <a:schemeClr val="accent1"/>
+          </a:fillRef>
+          <a:effectRef idx="0">
+            <a:schemeClr val="accent1"/>
+          </a:effectRef>
+          <a:fontRef idx="minor">
+            <a:schemeClr val="tx1"/>
+          </a:fontRef>
+        </p:style>
+      </p:cxnSp>
     </p:spTree>
     <p:extLst>
       <p:ext uri="{BB962C8B-B14F-4D97-AF65-F5344CB8AC3E}">
@@ -10782,7 +10811,7 @@
       </p:sp>
       <p:pic>
         <p:nvPicPr>
-          <p:cNvPr id="5" name="Picture 4"/>
+          <p:cNvPr id="6" name="Picture 5"/>
           <p:cNvPicPr>
             <a:picLocks noChangeAspect="1"/>
           </p:cNvPicPr>
@@ -10802,17 +10831,269 @@
         </p:blipFill>
         <p:spPr>
           <a:xfrm>
-            <a:off x="5160369" y="2880586"/>
-            <a:ext cx="809510" cy="809510"/>
+            <a:off x="2142560" y="1794549"/>
+            <a:ext cx="517918" cy="517918"/>
           </a:xfrm>
           <a:prstGeom prst="rect">
             <a:avLst/>
           </a:prstGeom>
         </p:spPr>
       </p:pic>
+      <p:sp>
+        <p:nvSpPr>
+          <p:cNvPr id="7" name="Rectangle 6"/>
+          <p:cNvSpPr/>
+          <p:nvPr/>
+        </p:nvSpPr>
+        <p:spPr>
+          <a:xfrm>
+            <a:off x="2612308" y="1985550"/>
+            <a:ext cx="1559529" cy="369332"/>
+          </a:xfrm>
+          <a:prstGeom prst="rect">
+            <a:avLst/>
+          </a:prstGeom>
+        </p:spPr>
+        <p:txBody>
+          <a:bodyPr wrap="none">
+            <a:spAutoFit/>
+          </a:bodyPr>
+          <a:lstStyle/>
+          <a:p>
+            <a:r>
+              <a:rPr lang="en-US" dirty="0" err="1" smtClean="0"/>
+              <a:t>q_product_log</a:t>
+            </a:r>
+            <a:endParaRPr lang="en-US" dirty="0"/>
+          </a:p>
+        </p:txBody>
+      </p:sp>
+      <p:sp>
+        <p:nvSpPr>
+          <p:cNvPr id="8" name="Cube 7"/>
+          <p:cNvSpPr/>
+          <p:nvPr/>
+        </p:nvSpPr>
+        <p:spPr>
+          <a:xfrm>
+            <a:off x="4622261" y="1794549"/>
+            <a:ext cx="1980955" cy="417372"/>
+          </a:xfrm>
+          <a:prstGeom prst="cube">
+            <a:avLst/>
+          </a:prstGeom>
+          <a:solidFill>
+            <a:srgbClr val="00B0F0"/>
+          </a:solidFill>
+        </p:spPr>
+        <p:style>
+          <a:lnRef idx="2">
+            <a:schemeClr val="accent1">
+              <a:shade val="50000"/>
+            </a:schemeClr>
+          </a:lnRef>
+          <a:fillRef idx="1">
+            <a:schemeClr val="accent1"/>
+          </a:fillRef>
+          <a:effectRef idx="0">
+            <a:schemeClr val="accent1"/>
+          </a:effectRef>
+          <a:fontRef idx="minor">
+            <a:schemeClr val="lt1"/>
+          </a:fontRef>
+        </p:style>
+        <p:txBody>
+          <a:bodyPr rtlCol="0" anchor="ctr"/>
+          <a:lstStyle/>
+          <a:p>
+            <a:pPr algn="ctr"/>
+            <a:endParaRPr lang="en-US"/>
+          </a:p>
+        </p:txBody>
+      </p:sp>
+      <p:sp>
+        <p:nvSpPr>
+          <p:cNvPr id="9" name="TextBox 8"/>
+          <p:cNvSpPr txBox="1"/>
+          <p:nvPr/>
+        </p:nvSpPr>
+        <p:spPr>
+          <a:xfrm>
+            <a:off x="4622261" y="1894550"/>
+            <a:ext cx="1980726" cy="276999"/>
+          </a:xfrm>
+          <a:prstGeom prst="rect">
+            <a:avLst/>
+          </a:prstGeom>
+          <a:noFill/>
+        </p:spPr>
+        <p:txBody>
+          <a:bodyPr wrap="square" rtlCol="0">
+            <a:spAutoFit/>
+          </a:bodyPr>
+          <a:lstStyle/>
+          <a:p>
+            <a:r>
+              <a:rPr lang="en-US" sz="1200" dirty="0" smtClean="0"/>
+              <a:t>Product Log Service</a:t>
+            </a:r>
+            <a:endParaRPr lang="en-US" sz="1200" dirty="0"/>
+          </a:p>
+        </p:txBody>
+      </p:sp>
+      <p:cxnSp>
+        <p:nvCxnSpPr>
+          <p:cNvPr id="11" name="Straight Arrow Connector 10"/>
+          <p:cNvCxnSpPr>
+            <a:stCxn id="8" idx="3"/>
+            <a:endCxn id="12" idx="0"/>
+          </p:cNvCxnSpPr>
+          <p:nvPr/>
+        </p:nvCxnSpPr>
+        <p:spPr>
+          <a:xfrm>
+            <a:off x="5560567" y="2211921"/>
+            <a:ext cx="0" cy="668665"/>
+          </a:xfrm>
+          <a:prstGeom prst="straightConnector1">
+            <a:avLst/>
+          </a:prstGeom>
+          <a:ln>
+            <a:tailEnd type="triangle"/>
+          </a:ln>
+        </p:spPr>
+        <p:style>
+          <a:lnRef idx="1">
+            <a:schemeClr val="accent1"/>
+          </a:lnRef>
+          <a:fillRef idx="0">
+            <a:schemeClr val="accent1"/>
+          </a:fillRef>
+          <a:effectRef idx="0">
+            <a:schemeClr val="accent1"/>
+          </a:effectRef>
+          <a:fontRef idx="minor">
+            <a:schemeClr val="tx1"/>
+          </a:fontRef>
+        </p:style>
+      </p:cxnSp>
+      <p:cxnSp>
+        <p:nvCxnSpPr>
+          <p:cNvPr id="13" name="Straight Arrow Connector 12"/>
+          <p:cNvCxnSpPr>
+            <a:stCxn id="6" idx="3"/>
+            <a:endCxn id="8" idx="2"/>
+          </p:cNvCxnSpPr>
+          <p:nvPr/>
+        </p:nvCxnSpPr>
+        <p:spPr>
+          <a:xfrm>
+            <a:off x="2660478" y="2053508"/>
+            <a:ext cx="1961783" cy="1899"/>
+          </a:xfrm>
+          <a:prstGeom prst="straightConnector1">
+            <a:avLst/>
+          </a:prstGeom>
+          <a:ln>
+            <a:tailEnd type="triangle"/>
+          </a:ln>
+        </p:spPr>
+        <p:style>
+          <a:lnRef idx="1">
+            <a:schemeClr val="accent1"/>
+          </a:lnRef>
+          <a:fillRef idx="0">
+            <a:schemeClr val="accent1"/>
+          </a:fillRef>
+          <a:effectRef idx="0">
+            <a:schemeClr val="accent1"/>
+          </a:effectRef>
+          <a:fontRef idx="minor">
+            <a:schemeClr val="tx1"/>
+          </a:fontRef>
+        </p:style>
+      </p:cxnSp>
+      <p:sp>
+        <p:nvSpPr>
+          <p:cNvPr id="14" name="TextBox 13"/>
+          <p:cNvSpPr txBox="1"/>
+          <p:nvPr/>
+        </p:nvSpPr>
+        <p:spPr>
+          <a:xfrm>
+            <a:off x="356259" y="4191990"/>
+            <a:ext cx="11709070" cy="1015663"/>
+          </a:xfrm>
+          <a:prstGeom prst="rect">
+            <a:avLst/>
+          </a:prstGeom>
+          <a:noFill/>
+        </p:spPr>
+        <p:txBody>
+          <a:bodyPr wrap="square" rtlCol="0">
+            <a:spAutoFit/>
+          </a:bodyPr>
+          <a:lstStyle/>
+          <a:p>
+            <a:pPr marL="342900" indent="-342900">
+              <a:buFont typeface="Arial" charset="0"/>
+              <a:buChar char="•"/>
+            </a:pPr>
+            <a:r>
+              <a:rPr lang="en-US" sz="2000" dirty="0" smtClean="0"/>
+              <a:t>Receive product crawler log from </a:t>
+            </a:r>
+            <a:r>
+              <a:rPr lang="en-US" sz="2000" dirty="0" err="1" smtClean="0"/>
+              <a:t>q_product_log</a:t>
+            </a:r>
+            <a:r>
+              <a:rPr lang="en-US" sz="2000" dirty="0" smtClean="0"/>
+              <a:t> queue.</a:t>
+            </a:r>
+          </a:p>
+          <a:p>
+            <a:pPr marL="342900" indent="-342900">
+              <a:buFont typeface="Arial" charset="0"/>
+              <a:buChar char="•"/>
+            </a:pPr>
+            <a:r>
+              <a:rPr lang="en-US" sz="2000" dirty="0" smtClean="0"/>
+              <a:t>Store the log into </a:t>
+            </a:r>
+            <a:r>
+              <a:rPr lang="en-US" sz="2000" dirty="0" smtClean="0"/>
+              <a:t>MongoDB</a:t>
+            </a:r>
+            <a:r>
+              <a:rPr lang="en-US" sz="2000" dirty="0" smtClean="0"/>
+              <a:t>.</a:t>
+            </a:r>
+          </a:p>
+          <a:p>
+            <a:pPr marL="342900" indent="-342900">
+              <a:buFont typeface="Arial" charset="0"/>
+              <a:buChar char="•"/>
+            </a:pPr>
+            <a:r>
+              <a:rPr lang="en-US" sz="2000" dirty="0" smtClean="0"/>
+              <a:t>Product crawler sends log to queue instead of writing to DB or file to have higher throughput for </a:t>
+            </a:r>
+            <a:r>
+              <a:rPr lang="en-US" sz="2000" smtClean="0"/>
+              <a:t>crawling</a:t>
+            </a:r>
+            <a:r>
+              <a:rPr lang="en-US" sz="2000" smtClean="0"/>
+              <a:t>.</a:t>
+            </a:r>
+            <a:endParaRPr lang="en-US" sz="2000" dirty="0" smtClean="0"/>
+          </a:p>
+        </p:txBody>
+      </p:sp>
       <p:pic>
         <p:nvPicPr>
-          <p:cNvPr id="6" name="Picture 5"/>
+          <p:cNvPr id="12" name="Picture 11"/>
           <p:cNvPicPr>
             <a:picLocks noChangeAspect="1"/>
           </p:cNvPicPr>
@@ -10832,249 +11113,14 @@
         </p:blipFill>
         <p:spPr>
           <a:xfrm>
-            <a:off x="2142560" y="1794549"/>
-            <a:ext cx="517918" cy="517918"/>
+            <a:off x="5101026" y="2880586"/>
+            <a:ext cx="919082" cy="919082"/>
           </a:xfrm>
           <a:prstGeom prst="rect">
             <a:avLst/>
           </a:prstGeom>
         </p:spPr>
       </p:pic>
-      <p:sp>
-        <p:nvSpPr>
-          <p:cNvPr id="7" name="Rectangle 6"/>
-          <p:cNvSpPr/>
-          <p:nvPr/>
-        </p:nvSpPr>
-        <p:spPr>
-          <a:xfrm>
-            <a:off x="2612308" y="1985550"/>
-            <a:ext cx="1559529" cy="369332"/>
-          </a:xfrm>
-          <a:prstGeom prst="rect">
-            <a:avLst/>
-          </a:prstGeom>
-        </p:spPr>
-        <p:txBody>
-          <a:bodyPr wrap="none">
-            <a:spAutoFit/>
-          </a:bodyPr>
-          <a:lstStyle/>
-          <a:p>
-            <a:r>
-              <a:rPr lang="en-US" dirty="0" err="1" smtClean="0"/>
-              <a:t>q_product_log</a:t>
-            </a:r>
-            <a:endParaRPr lang="en-US" dirty="0"/>
-          </a:p>
-        </p:txBody>
-      </p:sp>
-      <p:sp>
-        <p:nvSpPr>
-          <p:cNvPr id="8" name="Cube 7"/>
-          <p:cNvSpPr/>
-          <p:nvPr/>
-        </p:nvSpPr>
-        <p:spPr>
-          <a:xfrm>
-            <a:off x="4622261" y="1794549"/>
-            <a:ext cx="1980955" cy="417372"/>
-          </a:xfrm>
-          <a:prstGeom prst="cube">
-            <a:avLst/>
-          </a:prstGeom>
-          <a:solidFill>
-            <a:srgbClr val="00B0F0"/>
-          </a:solidFill>
-        </p:spPr>
-        <p:style>
-          <a:lnRef idx="2">
-            <a:schemeClr val="accent1">
-              <a:shade val="50000"/>
-            </a:schemeClr>
-          </a:lnRef>
-          <a:fillRef idx="1">
-            <a:schemeClr val="accent1"/>
-          </a:fillRef>
-          <a:effectRef idx="0">
-            <a:schemeClr val="accent1"/>
-          </a:effectRef>
-          <a:fontRef idx="minor">
-            <a:schemeClr val="lt1"/>
-          </a:fontRef>
-        </p:style>
-        <p:txBody>
-          <a:bodyPr rtlCol="0" anchor="ctr"/>
-          <a:lstStyle/>
-          <a:p>
-            <a:pPr algn="ctr"/>
-            <a:endParaRPr lang="en-US"/>
-          </a:p>
-        </p:txBody>
-      </p:sp>
-      <p:sp>
-        <p:nvSpPr>
-          <p:cNvPr id="9" name="TextBox 8"/>
-          <p:cNvSpPr txBox="1"/>
-          <p:nvPr/>
-        </p:nvSpPr>
-        <p:spPr>
-          <a:xfrm>
-            <a:off x="4622261" y="1894550"/>
-            <a:ext cx="1980726" cy="276999"/>
-          </a:xfrm>
-          <a:prstGeom prst="rect">
-            <a:avLst/>
-          </a:prstGeom>
-          <a:noFill/>
-        </p:spPr>
-        <p:txBody>
-          <a:bodyPr wrap="square" rtlCol="0">
-            <a:spAutoFit/>
-          </a:bodyPr>
-          <a:lstStyle/>
-          <a:p>
-            <a:r>
-              <a:rPr lang="en-US" sz="1200" dirty="0" smtClean="0"/>
-              <a:t>Product Log Service</a:t>
-            </a:r>
-            <a:endParaRPr lang="en-US" sz="1200" dirty="0"/>
-          </a:p>
-        </p:txBody>
-      </p:sp>
-      <p:cxnSp>
-        <p:nvCxnSpPr>
-          <p:cNvPr id="11" name="Straight Arrow Connector 10"/>
-          <p:cNvCxnSpPr>
-            <a:stCxn id="8" idx="3"/>
-            <a:endCxn id="5" idx="0"/>
-          </p:cNvCxnSpPr>
-          <p:nvPr/>
-        </p:nvCxnSpPr>
-        <p:spPr>
-          <a:xfrm>
-            <a:off x="5560567" y="2211921"/>
-            <a:ext cx="4557" cy="668665"/>
-          </a:xfrm>
-          <a:prstGeom prst="straightConnector1">
-            <a:avLst/>
-          </a:prstGeom>
-          <a:ln>
-            <a:tailEnd type="triangle"/>
-          </a:ln>
-        </p:spPr>
-        <p:style>
-          <a:lnRef idx="1">
-            <a:schemeClr val="accent1"/>
-          </a:lnRef>
-          <a:fillRef idx="0">
-            <a:schemeClr val="accent1"/>
-          </a:fillRef>
-          <a:effectRef idx="0">
-            <a:schemeClr val="accent1"/>
-          </a:effectRef>
-          <a:fontRef idx="minor">
-            <a:schemeClr val="tx1"/>
-          </a:fontRef>
-        </p:style>
-      </p:cxnSp>
-      <p:cxnSp>
-        <p:nvCxnSpPr>
-          <p:cNvPr id="13" name="Straight Arrow Connector 12"/>
-          <p:cNvCxnSpPr>
-            <a:stCxn id="6" idx="3"/>
-            <a:endCxn id="8" idx="2"/>
-          </p:cNvCxnSpPr>
-          <p:nvPr/>
-        </p:nvCxnSpPr>
-        <p:spPr>
-          <a:xfrm>
-            <a:off x="2660478" y="2053508"/>
-            <a:ext cx="1961783" cy="1899"/>
-          </a:xfrm>
-          <a:prstGeom prst="straightConnector1">
-            <a:avLst/>
-          </a:prstGeom>
-          <a:ln>
-            <a:tailEnd type="triangle"/>
-          </a:ln>
-        </p:spPr>
-        <p:style>
-          <a:lnRef idx="1">
-            <a:schemeClr val="accent1"/>
-          </a:lnRef>
-          <a:fillRef idx="0">
-            <a:schemeClr val="accent1"/>
-          </a:fillRef>
-          <a:effectRef idx="0">
-            <a:schemeClr val="accent1"/>
-          </a:effectRef>
-          <a:fontRef idx="minor">
-            <a:schemeClr val="tx1"/>
-          </a:fontRef>
-        </p:style>
-      </p:cxnSp>
-      <p:sp>
-        <p:nvSpPr>
-          <p:cNvPr id="14" name="TextBox 13"/>
-          <p:cNvSpPr txBox="1"/>
-          <p:nvPr/>
-        </p:nvSpPr>
-        <p:spPr>
-          <a:xfrm>
-            <a:off x="356259" y="4191990"/>
-            <a:ext cx="11709070" cy="1015663"/>
-          </a:xfrm>
-          <a:prstGeom prst="rect">
-            <a:avLst/>
-          </a:prstGeom>
-          <a:noFill/>
-        </p:spPr>
-        <p:txBody>
-          <a:bodyPr wrap="square" rtlCol="0">
-            <a:spAutoFit/>
-          </a:bodyPr>
-          <a:lstStyle/>
-          <a:p>
-            <a:pPr marL="342900" indent="-342900">
-              <a:buFont typeface="Arial" charset="0"/>
-              <a:buChar char="•"/>
-            </a:pPr>
-            <a:r>
-              <a:rPr lang="en-US" sz="2000" dirty="0" smtClean="0"/>
-              <a:t>Receive product crawler log from </a:t>
-            </a:r>
-            <a:r>
-              <a:rPr lang="en-US" sz="2000" dirty="0" err="1" smtClean="0"/>
-              <a:t>q_product_log</a:t>
-            </a:r>
-            <a:r>
-              <a:rPr lang="en-US" sz="2000" dirty="0" smtClean="0"/>
-              <a:t> queue.</a:t>
-            </a:r>
-          </a:p>
-          <a:p>
-            <a:pPr marL="342900" indent="-342900">
-              <a:buFont typeface="Arial" charset="0"/>
-              <a:buChar char="•"/>
-            </a:pPr>
-            <a:r>
-              <a:rPr lang="en-US" sz="2000" dirty="0" smtClean="0"/>
-              <a:t>Store the log into MySQL DB.</a:t>
-            </a:r>
-          </a:p>
-          <a:p>
-            <a:pPr marL="342900" indent="-342900">
-              <a:buFont typeface="Arial" charset="0"/>
-              <a:buChar char="•"/>
-            </a:pPr>
-            <a:r>
-              <a:rPr lang="en-US" sz="2000" dirty="0" smtClean="0"/>
-              <a:t>Product crawler sends log to queue instead of writing to DB or file to have higher throughput for crawling.</a:t>
-            </a:r>
-          </a:p>
-        </p:txBody>
-      </p:sp>
     </p:spTree>
     <p:extLst>
       <p:ext uri="{BB962C8B-B14F-4D97-AF65-F5344CB8AC3E}">

</xml_diff>

<commit_message>
Update ppt for searchDeals method
</commit_message>
<xml_diff>
--- a/PriceMonitoringDesign.pptx
+++ b/PriceMonitoringDesign.pptx
@@ -13068,7 +13068,7 @@
         <p:spPr>
           <a:xfrm>
             <a:off x="332509" y="3158841"/>
-            <a:ext cx="11542816" cy="3170099"/>
+            <a:ext cx="11542816" cy="3477875"/>
           </a:xfrm>
           <a:prstGeom prst="rect">
             <a:avLst/>
@@ -13119,7 +13119,7 @@
             </a:r>
             <a:r>
               <a:rPr lang="en-US" sz="2000" dirty="0" smtClean="0"/>
-              <a:t>	Create </a:t>
+              <a:t>			Create </a:t>
             </a:r>
             <a:r>
               <a:rPr lang="en-US" sz="2000" dirty="0" smtClean="0"/>
@@ -13149,7 +13149,7 @@
             </a:r>
             <a:r>
               <a:rPr lang="en-US" sz="2000" dirty="0" smtClean="0"/>
-              <a:t>	Update </a:t>
+              <a:t>			Update </a:t>
             </a:r>
             <a:r>
               <a:rPr lang="en-US" sz="2000" dirty="0" smtClean="0"/>
@@ -13179,7 +13179,7 @@
             </a:r>
             <a:r>
               <a:rPr lang="en-US" sz="2000" dirty="0" smtClean="0"/>
-              <a:t>	Delete </a:t>
+              <a:t>			Delete </a:t>
             </a:r>
             <a:r>
               <a:rPr lang="en-US" sz="2000" dirty="0" smtClean="0"/>
@@ -13213,7 +13213,15 @@
             </a:r>
             <a:r>
               <a:rPr lang="en-US" sz="2000" dirty="0" smtClean="0"/>
-              <a:t>}		Subscribe category</a:t>
+              <a:t>}		</a:t>
+            </a:r>
+            <a:r>
+              <a:rPr lang="en-US" sz="2000" dirty="0" smtClean="0"/>
+              <a:t>		Subscribe </a:t>
+            </a:r>
+            <a:r>
+              <a:rPr lang="en-US" sz="2000" dirty="0" smtClean="0"/>
+              <a:t>category</a:t>
             </a:r>
           </a:p>
           <a:p>
@@ -13243,7 +13251,15 @@
             </a:r>
             <a:r>
               <a:rPr lang="en-US" sz="2000" dirty="0" smtClean="0"/>
-              <a:t>}		Unsubscribe category</a:t>
+              <a:t>}		</a:t>
+            </a:r>
+            <a:r>
+              <a:rPr lang="en-US" sz="2000" dirty="0" smtClean="0"/>
+              <a:t>		Unsubscribe </a:t>
+            </a:r>
+            <a:r>
+              <a:rPr lang="en-US" sz="2000" dirty="0" smtClean="0"/>
+              <a:t>category</a:t>
             </a:r>
           </a:p>
           <a:p>
@@ -13261,7 +13277,7 @@
             </a:r>
             <a:r>
               <a:rPr lang="en-US" sz="2000" dirty="0" smtClean="0"/>
-              <a:t>		List </a:t>
+              <a:t>				List </a:t>
             </a:r>
             <a:r>
               <a:rPr lang="en-US" sz="2000" dirty="0"/>
@@ -13271,31 +13287,49 @@
           <a:p>
             <a:r>
               <a:rPr lang="en-US" sz="2000" dirty="0" smtClean="0"/>
-              <a:t>GET	/users/deals</a:t>
-            </a:r>
-            <a:r>
-              <a:rPr lang="en-US" sz="2000" dirty="0"/>
-              <a:t>/{</a:t>
-            </a:r>
-            <a:r>
-              <a:rPr lang="en-US" sz="2000" dirty="0" err="1"/>
+              <a:t>GET	/users/</a:t>
+            </a:r>
+            <a:r>
+              <a:rPr lang="en-US" sz="2000" dirty="0" err="1" smtClean="0"/>
+              <a:t>deals?</a:t>
+            </a:r>
+            <a:r>
+              <a:rPr lang="en-US" sz="2000" dirty="0" err="1" smtClean="0"/>
+              <a:t>page</a:t>
+            </a:r>
+            <a:r>
+              <a:rPr lang="en-US" sz="2000" dirty="0" smtClean="0"/>
+              <a:t>=&lt;page#&gt;&amp;size=&lt;page size&gt;			Search deals</a:t>
+            </a:r>
+          </a:p>
+          <a:p>
+            <a:r>
+              <a:rPr lang="en-US" sz="2000" dirty="0" smtClean="0"/>
+              <a:t>	&amp;</a:t>
+            </a:r>
+            <a:r>
+              <a:rPr lang="en-US" sz="2000" dirty="0" err="1" smtClean="0"/>
+              <a:t>sortBy</a:t>
+            </a:r>
+            <a:r>
+              <a:rPr lang="en-US" sz="2000" dirty="0" smtClean="0"/>
+              <a:t>=&lt;field&gt;&amp;direction=&lt;ASC/DESC&gt;&amp;</a:t>
+            </a:r>
+            <a:r>
+              <a:rPr lang="en-US" sz="2000" dirty="0" err="1" smtClean="0"/>
               <a:t>categoryId</a:t>
             </a:r>
             <a:r>
-              <a:rPr lang="en-US" sz="2000" dirty="0"/>
-              <a:t>}	</a:t>
-            </a:r>
-            <a:r>
               <a:rPr lang="en-US" sz="2000" dirty="0" smtClean="0"/>
-              <a:t>			List </a:t>
-            </a:r>
-            <a:r>
-              <a:rPr lang="en-US" sz="2000" dirty="0"/>
-              <a:t>all deals for the specified category</a:t>
+              <a:t>=&lt;</a:t>
+            </a:r>
+            <a:r>
+              <a:rPr lang="en-US" sz="2000" dirty="0" err="1" smtClean="0"/>
+              <a:t>categoryId</a:t>
             </a:r>
             <a:r>
               <a:rPr lang="en-US" sz="2000" dirty="0" smtClean="0"/>
-              <a:t>.</a:t>
+              <a:t>&gt;</a:t>
             </a:r>
             <a:endParaRPr lang="en-US" sz="2000" dirty="0"/>
           </a:p>

</xml_diff>

<commit_message>
Allow actuator to display metrics, fix email not receiving error
</commit_message>
<xml_diff>
--- a/PriceMonitoringDesign.pptx
+++ b/PriceMonitoringDesign.pptx
@@ -194,7 +194,7 @@
             </a:lvl1pPr>
           </a:lstStyle>
           <a:p>
-            <a:endParaRPr lang="en-US"/>
+            <a:endParaRPr lang="en-US" dirty="0"/>
           </a:p>
         </p:txBody>
       </p:sp>
@@ -229,7 +229,7 @@
               <a:rPr lang="en-US" smtClean="0"/>
               <a:t>6/14/17</a:t>
             </a:fld>
-            <a:endParaRPr lang="en-US"/>
+            <a:endParaRPr lang="en-US" dirty="0"/>
           </a:p>
         </p:txBody>
       </p:sp>
@@ -262,7 +262,7 @@
           <a:bodyPr vert="horz" lIns="91440" tIns="45720" rIns="91440" bIns="45720" rtlCol="0" anchor="ctr"/>
           <a:lstStyle/>
           <a:p>
-            <a:endParaRPr lang="en-US"/>
+            <a:endParaRPr lang="en-US" dirty="0"/>
           </a:p>
         </p:txBody>
       </p:sp>
@@ -353,7 +353,7 @@
             </a:lvl1pPr>
           </a:lstStyle>
           <a:p>
-            <a:endParaRPr lang="en-US"/>
+            <a:endParaRPr lang="en-US" dirty="0"/>
           </a:p>
         </p:txBody>
       </p:sp>
@@ -388,7 +388,7 @@
               <a:rPr lang="en-US" smtClean="0"/>
               <a:t>‹#›</a:t>
             </a:fld>
-            <a:endParaRPr lang="en-US"/>
+            <a:endParaRPr lang="en-US" dirty="0"/>
           </a:p>
         </p:txBody>
       </p:sp>
@@ -562,7 +562,7 @@
               <a:rPr lang="en-US" smtClean="0"/>
               <a:t>2</a:t>
             </a:fld>
-            <a:endParaRPr lang="en-US"/>
+            <a:endParaRPr lang="en-US" dirty="0"/>
           </a:p>
         </p:txBody>
       </p:sp>
@@ -646,7 +646,7 @@
               <a:rPr lang="en-US" smtClean="0"/>
               <a:t>6</a:t>
             </a:fld>
-            <a:endParaRPr lang="en-US"/>
+            <a:endParaRPr lang="en-US" dirty="0"/>
           </a:p>
         </p:txBody>
       </p:sp>
@@ -796,7 +796,7 @@
               <a:rPr lang="en-US" smtClean="0"/>
               <a:t>6/14/17</a:t>
             </a:fld>
-            <a:endParaRPr lang="en-US"/>
+            <a:endParaRPr lang="en-US" dirty="0"/>
           </a:p>
         </p:txBody>
       </p:sp>
@@ -815,7 +815,7 @@
           <a:bodyPr/>
           <a:lstStyle/>
           <a:p>
-            <a:endParaRPr lang="en-US"/>
+            <a:endParaRPr lang="en-US" dirty="0"/>
           </a:p>
         </p:txBody>
       </p:sp>
@@ -838,7 +838,7 @@
               <a:rPr lang="en-US" smtClean="0"/>
               <a:t>‹#›</a:t>
             </a:fld>
-            <a:endParaRPr lang="en-US"/>
+            <a:endParaRPr lang="en-US" dirty="0"/>
           </a:p>
         </p:txBody>
       </p:sp>
@@ -966,7 +966,7 @@
               <a:rPr lang="en-US" smtClean="0"/>
               <a:t>6/14/17</a:t>
             </a:fld>
-            <a:endParaRPr lang="en-US"/>
+            <a:endParaRPr lang="en-US" dirty="0"/>
           </a:p>
         </p:txBody>
       </p:sp>
@@ -985,7 +985,7 @@
           <a:bodyPr/>
           <a:lstStyle/>
           <a:p>
-            <a:endParaRPr lang="en-US"/>
+            <a:endParaRPr lang="en-US" dirty="0"/>
           </a:p>
         </p:txBody>
       </p:sp>
@@ -1008,7 +1008,7 @@
               <a:rPr lang="en-US" smtClean="0"/>
               <a:t>‹#›</a:t>
             </a:fld>
-            <a:endParaRPr lang="en-US"/>
+            <a:endParaRPr lang="en-US" dirty="0"/>
           </a:p>
         </p:txBody>
       </p:sp>
@@ -1146,7 +1146,7 @@
               <a:rPr lang="en-US" smtClean="0"/>
               <a:t>6/14/17</a:t>
             </a:fld>
-            <a:endParaRPr lang="en-US"/>
+            <a:endParaRPr lang="en-US" dirty="0"/>
           </a:p>
         </p:txBody>
       </p:sp>
@@ -1165,7 +1165,7 @@
           <a:bodyPr/>
           <a:lstStyle/>
           <a:p>
-            <a:endParaRPr lang="en-US"/>
+            <a:endParaRPr lang="en-US" dirty="0"/>
           </a:p>
         </p:txBody>
       </p:sp>
@@ -1188,7 +1188,7 @@
               <a:rPr lang="en-US" smtClean="0"/>
               <a:t>‹#›</a:t>
             </a:fld>
-            <a:endParaRPr lang="en-US"/>
+            <a:endParaRPr lang="en-US" dirty="0"/>
           </a:p>
         </p:txBody>
       </p:sp>
@@ -1316,7 +1316,7 @@
               <a:rPr lang="en-US" smtClean="0"/>
               <a:t>6/14/17</a:t>
             </a:fld>
-            <a:endParaRPr lang="en-US"/>
+            <a:endParaRPr lang="en-US" dirty="0"/>
           </a:p>
         </p:txBody>
       </p:sp>
@@ -1335,7 +1335,7 @@
           <a:bodyPr/>
           <a:lstStyle/>
           <a:p>
-            <a:endParaRPr lang="en-US"/>
+            <a:endParaRPr lang="en-US" dirty="0"/>
           </a:p>
         </p:txBody>
       </p:sp>
@@ -1358,7 +1358,7 @@
               <a:rPr lang="en-US" smtClean="0"/>
               <a:t>‹#›</a:t>
             </a:fld>
-            <a:endParaRPr lang="en-US"/>
+            <a:endParaRPr lang="en-US" dirty="0"/>
           </a:p>
         </p:txBody>
       </p:sp>
@@ -1562,7 +1562,7 @@
               <a:rPr lang="en-US" smtClean="0"/>
               <a:t>6/14/17</a:t>
             </a:fld>
-            <a:endParaRPr lang="en-US"/>
+            <a:endParaRPr lang="en-US" dirty="0"/>
           </a:p>
         </p:txBody>
       </p:sp>
@@ -1581,7 +1581,7 @@
           <a:bodyPr/>
           <a:lstStyle/>
           <a:p>
-            <a:endParaRPr lang="en-US"/>
+            <a:endParaRPr lang="en-US" dirty="0"/>
           </a:p>
         </p:txBody>
       </p:sp>
@@ -1604,7 +1604,7 @@
               <a:rPr lang="en-US" smtClean="0"/>
               <a:t>‹#›</a:t>
             </a:fld>
-            <a:endParaRPr lang="en-US"/>
+            <a:endParaRPr lang="en-US" dirty="0"/>
           </a:p>
         </p:txBody>
       </p:sp>
@@ -1794,7 +1794,7 @@
               <a:rPr lang="en-US" smtClean="0"/>
               <a:t>6/14/17</a:t>
             </a:fld>
-            <a:endParaRPr lang="en-US"/>
+            <a:endParaRPr lang="en-US" dirty="0"/>
           </a:p>
         </p:txBody>
       </p:sp>
@@ -1813,7 +1813,7 @@
           <a:bodyPr/>
           <a:lstStyle/>
           <a:p>
-            <a:endParaRPr lang="en-US"/>
+            <a:endParaRPr lang="en-US" dirty="0"/>
           </a:p>
         </p:txBody>
       </p:sp>
@@ -1836,7 +1836,7 @@
               <a:rPr lang="en-US" smtClean="0"/>
               <a:t>‹#›</a:t>
             </a:fld>
-            <a:endParaRPr lang="en-US"/>
+            <a:endParaRPr lang="en-US" dirty="0"/>
           </a:p>
         </p:txBody>
       </p:sp>
@@ -2161,7 +2161,7 @@
               <a:rPr lang="en-US" smtClean="0"/>
               <a:t>6/14/17</a:t>
             </a:fld>
-            <a:endParaRPr lang="en-US"/>
+            <a:endParaRPr lang="en-US" dirty="0"/>
           </a:p>
         </p:txBody>
       </p:sp>
@@ -2180,7 +2180,7 @@
           <a:bodyPr/>
           <a:lstStyle/>
           <a:p>
-            <a:endParaRPr lang="en-US"/>
+            <a:endParaRPr lang="en-US" dirty="0"/>
           </a:p>
         </p:txBody>
       </p:sp>
@@ -2203,7 +2203,7 @@
               <a:rPr lang="en-US" smtClean="0"/>
               <a:t>‹#›</a:t>
             </a:fld>
-            <a:endParaRPr lang="en-US"/>
+            <a:endParaRPr lang="en-US" dirty="0"/>
           </a:p>
         </p:txBody>
       </p:sp>
@@ -2279,7 +2279,7 @@
               <a:rPr lang="en-US" smtClean="0"/>
               <a:t>6/14/17</a:t>
             </a:fld>
-            <a:endParaRPr lang="en-US"/>
+            <a:endParaRPr lang="en-US" dirty="0"/>
           </a:p>
         </p:txBody>
       </p:sp>
@@ -2298,7 +2298,7 @@
           <a:bodyPr/>
           <a:lstStyle/>
           <a:p>
-            <a:endParaRPr lang="en-US"/>
+            <a:endParaRPr lang="en-US" dirty="0"/>
           </a:p>
         </p:txBody>
       </p:sp>
@@ -2321,7 +2321,7 @@
               <a:rPr lang="en-US" smtClean="0"/>
               <a:t>‹#›</a:t>
             </a:fld>
-            <a:endParaRPr lang="en-US"/>
+            <a:endParaRPr lang="en-US" dirty="0"/>
           </a:p>
         </p:txBody>
       </p:sp>
@@ -2374,7 +2374,7 @@
               <a:rPr lang="en-US" smtClean="0"/>
               <a:t>6/14/17</a:t>
             </a:fld>
-            <a:endParaRPr lang="en-US"/>
+            <a:endParaRPr lang="en-US" dirty="0"/>
           </a:p>
         </p:txBody>
       </p:sp>
@@ -2393,7 +2393,7 @@
           <a:bodyPr/>
           <a:lstStyle/>
           <a:p>
-            <a:endParaRPr lang="en-US"/>
+            <a:endParaRPr lang="en-US" dirty="0"/>
           </a:p>
         </p:txBody>
       </p:sp>
@@ -2416,7 +2416,7 @@
               <a:rPr lang="en-US" smtClean="0"/>
               <a:t>‹#›</a:t>
             </a:fld>
-            <a:endParaRPr lang="en-US"/>
+            <a:endParaRPr lang="en-US" dirty="0"/>
           </a:p>
         </p:txBody>
       </p:sp>
@@ -2651,7 +2651,7 @@
               <a:rPr lang="en-US" smtClean="0"/>
               <a:t>6/14/17</a:t>
             </a:fld>
-            <a:endParaRPr lang="en-US"/>
+            <a:endParaRPr lang="en-US" dirty="0"/>
           </a:p>
         </p:txBody>
       </p:sp>
@@ -2670,7 +2670,7 @@
           <a:bodyPr/>
           <a:lstStyle/>
           <a:p>
-            <a:endParaRPr lang="en-US"/>
+            <a:endParaRPr lang="en-US" dirty="0"/>
           </a:p>
         </p:txBody>
       </p:sp>
@@ -2693,7 +2693,7 @@
               <a:rPr lang="en-US" smtClean="0"/>
               <a:t>‹#›</a:t>
             </a:fld>
-            <a:endParaRPr lang="en-US"/>
+            <a:endParaRPr lang="en-US" dirty="0"/>
           </a:p>
         </p:txBody>
       </p:sp>
@@ -2816,7 +2816,7 @@
             </a:lvl9pPr>
           </a:lstStyle>
           <a:p>
-            <a:endParaRPr lang="en-US"/>
+            <a:endParaRPr lang="en-US" dirty="0"/>
           </a:p>
         </p:txBody>
       </p:sp>
@@ -2904,7 +2904,7 @@
               <a:rPr lang="en-US" smtClean="0"/>
               <a:t>6/14/17</a:t>
             </a:fld>
-            <a:endParaRPr lang="en-US"/>
+            <a:endParaRPr lang="en-US" dirty="0"/>
           </a:p>
         </p:txBody>
       </p:sp>
@@ -2923,7 +2923,7 @@
           <a:bodyPr/>
           <a:lstStyle/>
           <a:p>
-            <a:endParaRPr lang="en-US"/>
+            <a:endParaRPr lang="en-US" dirty="0"/>
           </a:p>
         </p:txBody>
       </p:sp>
@@ -2946,7 +2946,7 @@
               <a:rPr lang="en-US" smtClean="0"/>
               <a:t>‹#›</a:t>
             </a:fld>
-            <a:endParaRPr lang="en-US"/>
+            <a:endParaRPr lang="en-US" dirty="0"/>
           </a:p>
         </p:txBody>
       </p:sp>
@@ -3117,7 +3117,7 @@
               <a:rPr lang="en-US" smtClean="0"/>
               <a:t>6/14/17</a:t>
             </a:fld>
-            <a:endParaRPr lang="en-US"/>
+            <a:endParaRPr lang="en-US" dirty="0"/>
           </a:p>
         </p:txBody>
       </p:sp>
@@ -3154,7 +3154,7 @@
             </a:lvl1pPr>
           </a:lstStyle>
           <a:p>
-            <a:endParaRPr lang="en-US"/>
+            <a:endParaRPr lang="en-US" dirty="0"/>
           </a:p>
         </p:txBody>
       </p:sp>
@@ -3195,7 +3195,7 @@
               <a:rPr lang="en-US" smtClean="0"/>
               <a:t>‹#›</a:t>
             </a:fld>
-            <a:endParaRPr lang="en-US"/>
+            <a:endParaRPr lang="en-US" dirty="0"/>
           </a:p>
         </p:txBody>
       </p:sp>
@@ -3576,7 +3576,7 @@
             </a:r>
             <a:r>
               <a:rPr lang="en-US" dirty="0" smtClean="0"/>
-              <a:t>eeps track of product price changes at online shopping web site. </a:t>
+              <a:t>eeps track of product prices at online shopping web site. </a:t>
             </a:r>
           </a:p>
           <a:p>
@@ -3596,14 +3596,17 @@
           <a:p>
             <a:r>
               <a:rPr lang="en-US" dirty="0"/>
-              <a:t>Notifies subscribers if any product of subscribed categories has reduced price. </a:t>
-            </a:r>
-            <a:endParaRPr lang="en-US" dirty="0" smtClean="0"/>
-          </a:p>
-          <a:p>
+              <a:t>Notifies subscribers if </a:t>
+            </a:r>
             <a:r>
               <a:rPr lang="en-US" dirty="0" smtClean="0"/>
-              <a:t>Also allow users </a:t>
+              <a:t>there is any discount product in the subscribed categories. </a:t>
+            </a:r>
+          </a:p>
+          <a:p>
+            <a:r>
+              <a:rPr lang="en-US" dirty="0" smtClean="0"/>
+              <a:t>Also allows users </a:t>
             </a:r>
             <a:r>
               <a:rPr lang="en-US" dirty="0"/>
@@ -3733,7 +3736,7 @@
           <a:lstStyle/>
           <a:p>
             <a:r>
-              <a:rPr lang="en-US" dirty="0" err="1" smtClean="0"/>
+              <a:rPr lang="en-US" dirty="0" smtClean="0"/>
               <a:t>q_product_log</a:t>
             </a:r>
             <a:endParaRPr lang="en-US" dirty="0"/>
@@ -3779,7 +3782,7 @@
           <a:lstStyle/>
           <a:p>
             <a:pPr algn="ctr"/>
-            <a:endParaRPr lang="en-US"/>
+            <a:endParaRPr lang="en-US" dirty="0"/>
           </a:p>
         </p:txBody>
       </p:sp>
@@ -3913,15 +3916,7 @@
             </a:pPr>
             <a:r>
               <a:rPr lang="en-US" sz="2000" dirty="0" smtClean="0"/>
-              <a:t>Receive product crawler log from </a:t>
-            </a:r>
-            <a:r>
-              <a:rPr lang="en-US" sz="2000" dirty="0" err="1" smtClean="0"/>
-              <a:t>q_product_log</a:t>
-            </a:r>
-            <a:r>
-              <a:rPr lang="en-US" sz="2000" dirty="0" smtClean="0"/>
-              <a:t> queue.</a:t>
+              <a:t>Receive product crawler log from q_product_log queue.</a:t>
             </a:r>
           </a:p>
           <a:p>
@@ -4031,11 +4026,7 @@
             <a:pPr algn="ctr"/>
             <a:r>
               <a:rPr lang="en-US" dirty="0" smtClean="0"/>
-              <a:t>Price Monitoring </a:t>
-            </a:r>
-            <a:r>
-              <a:rPr lang="en-US" smtClean="0"/>
-              <a:t>System Overview</a:t>
+              <a:t>Price Monitoring System Overview</a:t>
             </a:r>
             <a:endParaRPr lang="en-US" dirty="0"/>
           </a:p>
@@ -4111,7 +4102,7 @@
           <a:lstStyle/>
           <a:p>
             <a:pPr algn="ctr"/>
-            <a:endParaRPr lang="en-US"/>
+            <a:endParaRPr lang="en-US" dirty="0"/>
           </a:p>
         </p:txBody>
       </p:sp>
@@ -4156,7 +4147,7 @@
           <a:lstStyle/>
           <a:p>
             <a:pPr algn="ctr"/>
-            <a:endParaRPr lang="en-US"/>
+            <a:endParaRPr lang="en-US" dirty="0"/>
           </a:p>
         </p:txBody>
       </p:sp>
@@ -4199,7 +4190,7 @@
           <a:lstStyle/>
           <a:p>
             <a:pPr algn="ctr"/>
-            <a:endParaRPr lang="en-US"/>
+            <a:endParaRPr lang="en-US" dirty="0"/>
           </a:p>
         </p:txBody>
       </p:sp>
@@ -4242,7 +4233,7 @@
           <a:lstStyle/>
           <a:p>
             <a:pPr algn="ctr"/>
-            <a:endParaRPr lang="en-US"/>
+            <a:endParaRPr lang="en-US" dirty="0"/>
           </a:p>
         </p:txBody>
       </p:sp>
@@ -4375,7 +4366,7 @@
           <a:lstStyle/>
           <a:p>
             <a:pPr algn="ctr"/>
-            <a:endParaRPr lang="en-US"/>
+            <a:endParaRPr lang="en-US" dirty="0"/>
           </a:p>
         </p:txBody>
       </p:sp>
@@ -4448,7 +4439,7 @@
           <a:lstStyle/>
           <a:p>
             <a:pPr algn="ctr"/>
-            <a:endParaRPr lang="en-US"/>
+            <a:endParaRPr lang="en-US" dirty="0"/>
           </a:p>
         </p:txBody>
       </p:sp>
@@ -4491,7 +4482,7 @@
           <a:lstStyle/>
           <a:p>
             <a:pPr algn="ctr"/>
-            <a:endParaRPr lang="en-US"/>
+            <a:endParaRPr lang="en-US" dirty="0"/>
           </a:p>
         </p:txBody>
       </p:sp>
@@ -4594,7 +4585,7 @@
           <a:lstStyle/>
           <a:p>
             <a:pPr algn="ctr"/>
-            <a:endParaRPr lang="en-US"/>
+            <a:endParaRPr lang="en-US" dirty="0"/>
           </a:p>
         </p:txBody>
       </p:sp>
@@ -4621,12 +4612,8 @@
           <a:lstStyle/>
           <a:p>
             <a:r>
-              <a:rPr lang="en-US" sz="1200" smtClean="0"/>
-              <a:t>Health </a:t>
-            </a:r>
-            <a:r>
               <a:rPr lang="en-US" sz="1200" dirty="0" smtClean="0"/>
-              <a:t>Check Service</a:t>
+              <a:t>Health Check Service</a:t>
             </a:r>
             <a:endParaRPr lang="en-US" sz="1200" dirty="0"/>
           </a:p>
@@ -4671,7 +4658,7 @@
           <a:lstStyle/>
           <a:p>
             <a:pPr algn="ctr"/>
-            <a:endParaRPr lang="en-US"/>
+            <a:endParaRPr lang="en-US" dirty="0"/>
           </a:p>
         </p:txBody>
       </p:sp>
@@ -4848,7 +4835,7 @@
           <a:lstStyle/>
           <a:p>
             <a:pPr algn="ctr"/>
-            <a:endParaRPr lang="en-US"/>
+            <a:endParaRPr lang="en-US" dirty="0"/>
           </a:p>
         </p:txBody>
       </p:sp>
@@ -4891,7 +4878,7 @@
           <a:lstStyle/>
           <a:p>
             <a:pPr algn="ctr"/>
-            <a:endParaRPr lang="en-US"/>
+            <a:endParaRPr lang="en-US" dirty="0"/>
           </a:p>
         </p:txBody>
       </p:sp>
@@ -4934,7 +4921,7 @@
           <a:lstStyle/>
           <a:p>
             <a:pPr algn="ctr"/>
-            <a:endParaRPr lang="en-US"/>
+            <a:endParaRPr lang="en-US" dirty="0"/>
           </a:p>
         </p:txBody>
       </p:sp>
@@ -4977,7 +4964,7 @@
           <a:lstStyle/>
           <a:p>
             <a:pPr algn="ctr"/>
-            <a:endParaRPr lang="en-US"/>
+            <a:endParaRPr lang="en-US" dirty="0"/>
           </a:p>
         </p:txBody>
       </p:sp>
@@ -5020,7 +5007,7 @@
           <a:lstStyle/>
           <a:p>
             <a:pPr algn="ctr"/>
-            <a:endParaRPr lang="en-US"/>
+            <a:endParaRPr lang="en-US" dirty="0"/>
           </a:p>
         </p:txBody>
       </p:sp>
@@ -6135,12 +6122,8 @@
           <a:lstStyle/>
           <a:p>
             <a:r>
-              <a:rPr lang="en-US" dirty="0" err="1" smtClean="0"/>
-              <a:t>q_product_p</a:t>
-            </a:r>
-            <a:r>
               <a:rPr lang="en-US" dirty="0" smtClean="0"/>
-              <a:t>(n)</a:t>
+              <a:t>q_product_p(n)</a:t>
             </a:r>
             <a:endParaRPr lang="en-US" dirty="0"/>
           </a:p>
@@ -6168,7 +6151,7 @@
           <a:lstStyle/>
           <a:p>
             <a:r>
-              <a:rPr lang="en-US" dirty="0" err="1" smtClean="0"/>
+              <a:rPr lang="en-US" dirty="0" smtClean="0"/>
               <a:t>q_product_log</a:t>
             </a:r>
             <a:endParaRPr lang="en-US" dirty="0"/>
@@ -6197,12 +6180,8 @@
           <a:lstStyle/>
           <a:p>
             <a:r>
-              <a:rPr lang="en-US" dirty="0" err="1" smtClean="0"/>
-              <a:t>q_discount_product_p</a:t>
-            </a:r>
-            <a:r>
               <a:rPr lang="en-US" dirty="0" smtClean="0"/>
-              <a:t>(n)</a:t>
+              <a:t>q_discount_product_p(n)</a:t>
             </a:r>
             <a:endParaRPr lang="en-US" dirty="0"/>
           </a:p>
@@ -6414,44 +6393,40 @@
               <a:buNone/>
             </a:pPr>
             <a:r>
-              <a:rPr lang="en-US" sz="1800" dirty="0" err="1" smtClean="0"/>
+              <a:rPr lang="en-US" sz="1800" dirty="0" smtClean="0"/>
               <a:t>category_name</a:t>
             </a:r>
-            <a:endParaRPr lang="en-US" sz="1800" dirty="0" smtClean="0"/>
           </a:p>
           <a:p>
             <a:pPr marL="0" indent="0">
               <a:buNone/>
             </a:pPr>
             <a:r>
-              <a:rPr lang="en-US" sz="1800" dirty="0" err="1" smtClean="0"/>
+              <a:rPr lang="en-US" sz="1800" dirty="0" smtClean="0"/>
               <a:t>product_list_url</a:t>
             </a:r>
-            <a:endParaRPr lang="en-US" sz="1800" dirty="0" smtClean="0"/>
           </a:p>
           <a:p>
             <a:pPr marL="0" indent="0">
               <a:buNone/>
             </a:pPr>
             <a:r>
-              <a:rPr lang="en-US" sz="1800" dirty="0" err="1" smtClean="0"/>
+              <a:rPr lang="en-US" sz="1800" dirty="0" smtClean="0"/>
               <a:t>create_time</a:t>
             </a:r>
-            <a:endParaRPr lang="en-US" sz="1800" dirty="0" smtClean="0"/>
           </a:p>
           <a:p>
             <a:pPr marL="0" indent="0">
               <a:buNone/>
             </a:pPr>
             <a:r>
-              <a:rPr lang="en-US" sz="1800" dirty="0" err="1"/>
+              <a:rPr lang="en-US" sz="1800" dirty="0"/>
               <a:t>u</a:t>
             </a:r>
             <a:r>
-              <a:rPr lang="en-US" sz="1800" dirty="0" err="1" smtClean="0"/>
+              <a:rPr lang="en-US" sz="1800" dirty="0" smtClean="0"/>
               <a:t>pdate_time</a:t>
             </a:r>
-            <a:endParaRPr lang="en-US" sz="1800" dirty="0" smtClean="0"/>
           </a:p>
         </p:txBody>
       </p:sp>
@@ -6508,11 +6483,11 @@
           <a:lstStyle/>
           <a:p>
             <a:r>
-              <a:rPr lang="en-US" sz="2400" dirty="0" err="1"/>
+              <a:rPr lang="en-US" sz="2400" dirty="0"/>
               <a:t>c</a:t>
             </a:r>
             <a:r>
-              <a:rPr lang="en-US" sz="2400" dirty="0" err="1" smtClean="0"/>
+              <a:rPr lang="en-US" sz="2400" dirty="0" smtClean="0"/>
               <a:t>ategory_priority</a:t>
             </a:r>
             <a:endParaRPr lang="en-US" sz="2400" dirty="0"/>
@@ -6725,10 +6700,9 @@
               <a:buNone/>
             </a:pPr>
             <a:r>
-              <a:rPr lang="en-US" sz="1800" dirty="0" err="1" smtClean="0"/>
+              <a:rPr lang="en-US" sz="1800" dirty="0" smtClean="0"/>
               <a:t>category_id</a:t>
             </a:r>
-            <a:endParaRPr lang="en-US" sz="1800" dirty="0" smtClean="0"/>
           </a:p>
           <a:p>
             <a:pPr marL="0" indent="0">
@@ -6750,14 +6724,13 @@
               <a:buNone/>
             </a:pPr>
             <a:r>
-              <a:rPr lang="en-US" sz="1800" dirty="0" err="1"/>
+              <a:rPr lang="en-US" sz="1800" dirty="0"/>
               <a:t>u</a:t>
             </a:r>
             <a:r>
-              <a:rPr lang="en-US" sz="1800" dirty="0" err="1" smtClean="0"/>
+              <a:rPr lang="en-US" sz="1800" dirty="0" smtClean="0"/>
               <a:t>ser_count</a:t>
             </a:r>
-            <a:endParaRPr lang="en-US" sz="1800" dirty="0" smtClean="0"/>
           </a:p>
           <a:p>
             <a:pPr marL="0" indent="0">
@@ -6765,10 +6738,9 @@
               <a:buNone/>
             </a:pPr>
             <a:r>
-              <a:rPr lang="en-US" sz="1800" dirty="0" err="1" smtClean="0"/>
+              <a:rPr lang="en-US" sz="1800" dirty="0" smtClean="0"/>
               <a:t>create_time</a:t>
             </a:r>
-            <a:endParaRPr lang="en-US" sz="1800" dirty="0" smtClean="0"/>
           </a:p>
           <a:p>
             <a:pPr marL="0" indent="0">
@@ -6776,10 +6748,9 @@
               <a:buNone/>
             </a:pPr>
             <a:r>
-              <a:rPr lang="en-US" sz="1800" dirty="0" err="1" smtClean="0"/>
+              <a:rPr lang="en-US" sz="1800" dirty="0" smtClean="0"/>
               <a:t>update_time</a:t>
             </a:r>
-            <a:endParaRPr lang="en-US" sz="1800" dirty="0" smtClean="0"/>
           </a:p>
         </p:txBody>
       </p:sp>
@@ -6806,7 +6777,7 @@
           <a:lstStyle/>
           <a:p>
             <a:r>
-              <a:rPr lang="en-US" sz="2400" dirty="0" err="1" smtClean="0"/>
+              <a:rPr lang="en-US" sz="2400" dirty="0" smtClean="0"/>
               <a:t>user_category</a:t>
             </a:r>
             <a:endParaRPr lang="en-US" sz="2400" dirty="0"/>
@@ -7019,10 +6990,9 @@
               <a:buNone/>
             </a:pPr>
             <a:r>
-              <a:rPr lang="en-US" sz="1800" dirty="0" err="1" smtClean="0"/>
+              <a:rPr lang="en-US" sz="1800" dirty="0" smtClean="0"/>
               <a:t>user_id</a:t>
             </a:r>
-            <a:endParaRPr lang="en-US" sz="1800" dirty="0" smtClean="0"/>
           </a:p>
           <a:p>
             <a:pPr marL="0" indent="0">
@@ -7030,10 +7000,9 @@
               <a:buNone/>
             </a:pPr>
             <a:r>
-              <a:rPr lang="en-US" sz="1800" dirty="0" err="1" smtClean="0"/>
+              <a:rPr lang="en-US" sz="1800" dirty="0" smtClean="0"/>
               <a:t>category_id</a:t>
             </a:r>
-            <a:endParaRPr lang="en-US" sz="1800" dirty="0" smtClean="0"/>
           </a:p>
           <a:p>
             <a:pPr marL="0" indent="0">
@@ -7041,10 +7010,9 @@
               <a:buNone/>
             </a:pPr>
             <a:r>
-              <a:rPr lang="en-US" sz="1800" dirty="0" err="1" smtClean="0"/>
+              <a:rPr lang="en-US" sz="1800" dirty="0" smtClean="0"/>
               <a:t>create_time</a:t>
             </a:r>
-            <a:endParaRPr lang="en-US" sz="1800" dirty="0" smtClean="0"/>
           </a:p>
           <a:p>
             <a:pPr marL="0" indent="0">
@@ -7052,10 +7020,9 @@
               <a:buNone/>
             </a:pPr>
             <a:r>
-              <a:rPr lang="en-US" sz="1800" dirty="0" err="1" smtClean="0"/>
+              <a:rPr lang="en-US" sz="1800" dirty="0" smtClean="0"/>
               <a:t>update_time</a:t>
             </a:r>
-            <a:endParaRPr lang="en-US" sz="1800" dirty="0" smtClean="0"/>
           </a:p>
         </p:txBody>
       </p:sp>
@@ -7082,7 +7049,7 @@
           <a:lstStyle/>
           <a:p>
             <a:r>
-              <a:rPr lang="en-US" sz="2400" dirty="0" err="1" smtClean="0"/>
+              <a:rPr lang="en-US" sz="2400" dirty="0" smtClean="0"/>
               <a:t>user_count_threshold</a:t>
             </a:r>
             <a:endParaRPr lang="en-US" sz="2400" dirty="0"/>
@@ -7295,14 +7262,13 @@
               <a:buNone/>
             </a:pPr>
             <a:r>
-              <a:rPr lang="en-US" sz="1800" dirty="0" err="1"/>
+              <a:rPr lang="en-US" sz="1800" dirty="0"/>
               <a:t>h</a:t>
             </a:r>
             <a:r>
-              <a:rPr lang="en-US" sz="1800" dirty="0" err="1" smtClean="0"/>
+              <a:rPr lang="en-US" sz="1800" dirty="0" smtClean="0"/>
               <a:t>igh_priority_user_count</a:t>
             </a:r>
-            <a:endParaRPr lang="en-US" sz="1800" dirty="0" smtClean="0"/>
           </a:p>
           <a:p>
             <a:pPr marL="0" indent="0">
@@ -7310,10 +7276,9 @@
               <a:buNone/>
             </a:pPr>
             <a:r>
-              <a:rPr lang="en-US" sz="1800" dirty="0" err="1" smtClean="0"/>
+              <a:rPr lang="en-US" sz="1800" dirty="0" smtClean="0"/>
               <a:t>create_time</a:t>
             </a:r>
-            <a:endParaRPr lang="en-US" sz="1800" dirty="0" smtClean="0"/>
           </a:p>
           <a:p>
             <a:pPr marL="0" indent="0">
@@ -7321,10 +7286,9 @@
               <a:buNone/>
             </a:pPr>
             <a:r>
-              <a:rPr lang="en-US" sz="1800" dirty="0" err="1" smtClean="0"/>
+              <a:rPr lang="en-US" sz="1800" dirty="0" smtClean="0"/>
               <a:t>update_time</a:t>
             </a:r>
-            <a:endParaRPr lang="en-US" sz="1800" dirty="0" smtClean="0"/>
           </a:p>
         </p:txBody>
       </p:sp>
@@ -7534,14 +7498,13 @@
               <a:buNone/>
             </a:pPr>
             <a:r>
-              <a:rPr lang="en-US" sz="1800" dirty="0" err="1"/>
+              <a:rPr lang="en-US" sz="1800" dirty="0"/>
               <a:t>p</a:t>
             </a:r>
             <a:r>
-              <a:rPr lang="en-US" sz="1800" dirty="0" err="1" smtClean="0"/>
+              <a:rPr lang="en-US" sz="1800" dirty="0" smtClean="0"/>
               <a:t>roduct_id</a:t>
             </a:r>
-            <a:endParaRPr lang="en-US" sz="1800" dirty="0" smtClean="0"/>
           </a:p>
           <a:p>
             <a:pPr marL="0" indent="0">
@@ -7549,14 +7512,13 @@
               <a:buNone/>
             </a:pPr>
             <a:r>
-              <a:rPr lang="en-US" sz="1800" dirty="0" err="1"/>
+              <a:rPr lang="en-US" sz="1800" dirty="0"/>
               <a:t>c</a:t>
             </a:r>
             <a:r>
-              <a:rPr lang="en-US" sz="1800" dirty="0" err="1" smtClean="0"/>
+              <a:rPr lang="en-US" sz="1800" dirty="0" smtClean="0"/>
               <a:t>ategory_id</a:t>
             </a:r>
-            <a:endParaRPr lang="en-US" sz="1800" dirty="0" smtClean="0"/>
           </a:p>
           <a:p>
             <a:pPr marL="0" indent="0">
@@ -7578,14 +7540,13 @@
               <a:buNone/>
             </a:pPr>
             <a:r>
-              <a:rPr lang="en-US" sz="1800" dirty="0" err="1"/>
+              <a:rPr lang="en-US" sz="1800" dirty="0"/>
               <a:t>t</a:t>
             </a:r>
             <a:r>
-              <a:rPr lang="en-US" sz="1800" dirty="0" err="1" smtClean="0"/>
+              <a:rPr lang="en-US" sz="1800" dirty="0" smtClean="0"/>
               <a:t>humnail</a:t>
             </a:r>
-            <a:endParaRPr lang="en-US" sz="1800" dirty="0" smtClean="0"/>
           </a:p>
           <a:p>
             <a:pPr marL="0" indent="0">
@@ -7593,10 +7554,9 @@
               <a:buNone/>
             </a:pPr>
             <a:r>
-              <a:rPr lang="en-US" sz="1800" dirty="0" err="1" smtClean="0"/>
+              <a:rPr lang="en-US" sz="1800" dirty="0" smtClean="0"/>
               <a:t>detail_url</a:t>
             </a:r>
-            <a:endParaRPr lang="en-US" sz="1800" dirty="0" smtClean="0"/>
           </a:p>
           <a:p>
             <a:pPr marL="0" indent="0">
@@ -7618,14 +7578,13 @@
               <a:buNone/>
             </a:pPr>
             <a:r>
-              <a:rPr lang="en-US" sz="1800" dirty="0" err="1"/>
+              <a:rPr lang="en-US" sz="1800" dirty="0"/>
               <a:t>o</a:t>
             </a:r>
             <a:r>
-              <a:rPr lang="en-US" sz="1800" dirty="0" err="1" smtClean="0"/>
+              <a:rPr lang="en-US" sz="1800" dirty="0" smtClean="0"/>
               <a:t>ld_price</a:t>
             </a:r>
-            <a:endParaRPr lang="en-US" sz="1800" dirty="0" smtClean="0"/>
           </a:p>
           <a:p>
             <a:pPr marL="0" indent="0">
@@ -7633,10 +7592,9 @@
               <a:buNone/>
             </a:pPr>
             <a:r>
-              <a:rPr lang="en-US" sz="1800" dirty="0" err="1" smtClean="0"/>
+              <a:rPr lang="en-US" sz="1800" dirty="0" smtClean="0"/>
               <a:t>create_time</a:t>
             </a:r>
-            <a:endParaRPr lang="en-US" sz="1800" dirty="0" smtClean="0"/>
           </a:p>
           <a:p>
             <a:pPr marL="0" indent="0">
@@ -7644,10 +7602,9 @@
               <a:buNone/>
             </a:pPr>
             <a:r>
-              <a:rPr lang="en-US" sz="1800" dirty="0" err="1" smtClean="0"/>
+              <a:rPr lang="en-US" sz="1800" dirty="0" smtClean="0"/>
               <a:t>update_time</a:t>
             </a:r>
-            <a:endParaRPr lang="en-US" sz="1800" dirty="0" smtClean="0"/>
           </a:p>
         </p:txBody>
       </p:sp>
@@ -7907,14 +7864,13 @@
               <a:buNone/>
             </a:pPr>
             <a:r>
-              <a:rPr lang="en-US" sz="1800" dirty="0" err="1"/>
+              <a:rPr lang="en-US" sz="1800" dirty="0"/>
               <a:t>n</a:t>
             </a:r>
             <a:r>
-              <a:rPr lang="en-US" sz="1800" dirty="0" err="1" smtClean="0"/>
+              <a:rPr lang="en-US" sz="1800" dirty="0" smtClean="0"/>
               <a:t>otification_type</a:t>
             </a:r>
-            <a:endParaRPr lang="en-US" sz="1800" dirty="0" smtClean="0"/>
           </a:p>
           <a:p>
             <a:pPr marL="0" indent="0">
@@ -7922,10 +7878,9 @@
               <a:buNone/>
             </a:pPr>
             <a:r>
-              <a:rPr lang="en-US" sz="1800" dirty="0" err="1" smtClean="0"/>
+              <a:rPr lang="en-US" sz="1800" dirty="0" smtClean="0"/>
               <a:t>create_time</a:t>
             </a:r>
-            <a:endParaRPr lang="en-US" sz="1800" dirty="0" smtClean="0"/>
           </a:p>
           <a:p>
             <a:pPr marL="0" indent="0">
@@ -7933,10 +7888,9 @@
               <a:buNone/>
             </a:pPr>
             <a:r>
-              <a:rPr lang="en-US" sz="1800" dirty="0" err="1" smtClean="0"/>
+              <a:rPr lang="en-US" sz="1800" dirty="0" smtClean="0"/>
               <a:t>update_time</a:t>
             </a:r>
-            <a:endParaRPr lang="en-US" sz="1800" dirty="0" smtClean="0"/>
           </a:p>
         </p:txBody>
       </p:sp>
@@ -8024,15 +7978,7 @@
           <a:p>
             <a:r>
               <a:rPr lang="en-US" dirty="0" smtClean="0"/>
-              <a:t>DB Schema (MongoDB) and cache (</a:t>
-            </a:r>
-            <a:r>
-              <a:rPr lang="en-US" dirty="0" err="1" smtClean="0"/>
-              <a:t>Redis</a:t>
-            </a:r>
-            <a:r>
-              <a:rPr lang="en-US" dirty="0" smtClean="0"/>
-              <a:t>)</a:t>
+              <a:t>DB Schema (MongoDB) and cache (Redis)</a:t>
             </a:r>
             <a:endParaRPr lang="en-US" dirty="0"/>
           </a:p>
@@ -8269,14 +8215,13 @@
               <a:buNone/>
             </a:pPr>
             <a:r>
-              <a:rPr lang="en-US" sz="1800" dirty="0" err="1"/>
+              <a:rPr lang="en-US" sz="1800" dirty="0"/>
               <a:t>t</a:t>
             </a:r>
             <a:r>
-              <a:rPr lang="en-US" sz="1800" dirty="0" err="1" smtClean="0"/>
+              <a:rPr lang="en-US" sz="1800" dirty="0" smtClean="0"/>
               <a:t>hread_id</a:t>
             </a:r>
-            <a:endParaRPr lang="en-US" sz="1800" dirty="0" smtClean="0"/>
           </a:p>
           <a:p>
             <a:pPr marL="0" indent="0">
@@ -8284,10 +8229,9 @@
               <a:buNone/>
             </a:pPr>
             <a:r>
-              <a:rPr lang="en-US" sz="1800" dirty="0" err="1" smtClean="0"/>
+              <a:rPr lang="en-US" sz="1800" dirty="0" smtClean="0"/>
               <a:t>product_url</a:t>
             </a:r>
-            <a:endParaRPr lang="en-US" sz="1800" dirty="0" smtClean="0"/>
           </a:p>
           <a:p>
             <a:pPr marL="0" indent="0">
@@ -8295,10 +8239,9 @@
               <a:buNone/>
             </a:pPr>
             <a:r>
-              <a:rPr lang="en-US" sz="1800" dirty="0" err="1" smtClean="0"/>
+              <a:rPr lang="en-US" sz="1800" dirty="0" smtClean="0"/>
               <a:t>category_name</a:t>
             </a:r>
-            <a:endParaRPr lang="en-US" sz="1800" dirty="0" smtClean="0"/>
           </a:p>
           <a:p>
             <a:pPr marL="0" indent="0">
@@ -8306,10 +8249,9 @@
               <a:buNone/>
             </a:pPr>
             <a:r>
-              <a:rPr lang="en-US" sz="1800" dirty="0" err="1" smtClean="0"/>
+              <a:rPr lang="en-US" sz="1800" dirty="0" smtClean="0"/>
               <a:t>page_number</a:t>
             </a:r>
-            <a:endParaRPr lang="en-US" sz="1800" dirty="0" smtClean="0"/>
           </a:p>
           <a:p>
             <a:pPr marL="0" indent="0">
@@ -8317,11 +8259,11 @@
               <a:buNone/>
             </a:pPr>
             <a:r>
-              <a:rPr lang="en-US" sz="1800" dirty="0" err="1"/>
+              <a:rPr lang="en-US" sz="1800" dirty="0"/>
               <a:t>c</a:t>
             </a:r>
             <a:r>
-              <a:rPr lang="en-US" sz="1800" dirty="0" err="1" smtClean="0"/>
+              <a:rPr lang="en-US" sz="1800" dirty="0" smtClean="0"/>
               <a:t>reate_time</a:t>
             </a:r>
             <a:endParaRPr lang="en-US" sz="1800" dirty="0" smtClean="0"/>
@@ -8351,7 +8293,7 @@
           <a:lstStyle/>
           <a:p>
             <a:r>
-              <a:rPr lang="en-US" sz="2400" dirty="0" err="1" smtClean="0"/>
+              <a:rPr lang="en-US" sz="2400" dirty="0" smtClean="0"/>
               <a:t>product_log</a:t>
             </a:r>
             <a:endParaRPr lang="en-US" sz="2400" dirty="0"/>
@@ -8387,13 +8329,8 @@
           <a:p>
             <a:r>
               <a:rPr lang="en-US" dirty="0" smtClean="0"/>
-              <a:t>Key: </a:t>
-            </a:r>
-            <a:r>
-              <a:rPr lang="en-US" dirty="0" err="1" smtClean="0"/>
-              <a:t>productId</a:t>
-            </a:r>
-            <a:endParaRPr lang="en-US" dirty="0" smtClean="0"/>
+              <a:t>Key: productId</a:t>
+            </a:r>
           </a:p>
           <a:p>
             <a:r>
@@ -8603,7 +8540,7 @@
           <a:lstStyle/>
           <a:p>
             <a:pPr algn="ctr"/>
-            <a:endParaRPr lang="en-US"/>
+            <a:endParaRPr lang="en-US" dirty="0"/>
           </a:p>
         </p:txBody>
       </p:sp>
@@ -8646,7 +8583,7 @@
           <a:lstStyle/>
           <a:p>
             <a:pPr algn="ctr"/>
-            <a:endParaRPr lang="en-US"/>
+            <a:endParaRPr lang="en-US" dirty="0"/>
           </a:p>
         </p:txBody>
       </p:sp>
@@ -8761,7 +8698,7 @@
         <p:spPr>
           <a:xfrm>
             <a:off x="721241" y="2383544"/>
-            <a:ext cx="10192182" cy="4093428"/>
+            <a:ext cx="10192182" cy="3785652"/>
           </a:xfrm>
           <a:prstGeom prst="rect">
             <a:avLst/>
@@ -8790,15 +8727,7 @@
             </a:pPr>
             <a:r>
               <a:rPr lang="en-US" sz="2000" dirty="0" smtClean="0"/>
-              <a:t>For each category, find the product list </a:t>
-            </a:r>
-            <a:r>
-              <a:rPr lang="en-US" sz="2000" dirty="0" err="1" smtClean="0"/>
-              <a:t>url</a:t>
-            </a:r>
-            <a:r>
-              <a:rPr lang="en-US" sz="2000" dirty="0" smtClean="0"/>
-              <a:t>, store the information into DB.</a:t>
+              <a:t>For each category, find the product list url, store the information into DB.</a:t>
             </a:r>
           </a:p>
           <a:p>
@@ -8870,11 +8799,7 @@
             </a:r>
             <a:r>
               <a:rPr lang="en-US" sz="2000" dirty="0" smtClean="0"/>
-              <a:t>configured at </a:t>
-            </a:r>
-            <a:r>
-              <a:rPr lang="en-US" sz="2000" dirty="0" err="1" smtClean="0"/>
-              <a:t>application.yml</a:t>
+              <a:t>configured at application.yml</a:t>
             </a:r>
             <a:r>
               <a:rPr lang="en-US" sz="2000" dirty="0"/>
@@ -8892,23 +8817,31 @@
             </a:pPr>
             <a:r>
               <a:rPr lang="en-US" sz="2000" dirty="0" smtClean="0"/>
-              <a:t>When crawler starts, it checks if </a:t>
+              <a:t>When crawler </a:t>
             </a:r>
             <a:r>
               <a:rPr lang="en-US" sz="2000" dirty="0" smtClean="0"/>
-              <a:t>threshold exists </a:t>
+              <a:t>starts the first time, </a:t>
             </a:r>
             <a:r>
               <a:rPr lang="en-US" sz="2000" dirty="0" smtClean="0"/>
-              <a:t>in DB, if not, get </a:t>
-            </a:r>
-            <a:r>
-              <a:rPr lang="en-US" sz="2000" dirty="0"/>
-              <a:t>threshold from </a:t>
+              <a:t>it </a:t>
             </a:r>
             <a:r>
               <a:rPr lang="en-US" sz="2000" dirty="0" smtClean="0"/>
-              <a:t>property file and update DB.</a:t>
+              <a:t>will update the </a:t>
+            </a:r>
+            <a:r>
+              <a:rPr lang="en-US" sz="2000" dirty="0" smtClean="0"/>
+              <a:t>threshold in </a:t>
+            </a:r>
+            <a:r>
+              <a:rPr lang="en-US" sz="2000" dirty="0" smtClean="0"/>
+              <a:t>DB</a:t>
+            </a:r>
+            <a:r>
+              <a:rPr lang="en-US" sz="2000" dirty="0" smtClean="0"/>
+              <a:t>.</a:t>
             </a:r>
           </a:p>
           <a:p>
@@ -8926,15 +8859,7 @@
             </a:r>
             <a:r>
               <a:rPr lang="en-US" sz="2000" dirty="0" smtClean="0"/>
-              <a:t>also be changed at run time through REST </a:t>
-            </a:r>
-            <a:r>
-              <a:rPr lang="en-US" sz="2000" dirty="0" err="1" smtClean="0"/>
-              <a:t>api</a:t>
-            </a:r>
-            <a:r>
-              <a:rPr lang="en-US" sz="2000" dirty="0" smtClean="0"/>
-              <a:t>:</a:t>
+              <a:t>also be changed at run time through REST api:</a:t>
             </a:r>
           </a:p>
           <a:p>
@@ -9309,7 +9234,7 @@
           <a:lstStyle/>
           <a:p>
             <a:pPr algn="ctr"/>
-            <a:endParaRPr lang="en-US"/>
+            <a:endParaRPr lang="en-US" dirty="0"/>
           </a:p>
         </p:txBody>
       </p:sp>
@@ -9473,8 +9398,16 @@
               <a:buChar char="•"/>
             </a:pPr>
             <a:r>
+              <a:rPr lang="en-US" sz="2000" smtClean="0"/>
+              <a:t>Get </a:t>
+            </a:r>
+            <a:r>
+              <a:rPr lang="en-US" sz="2000" smtClean="0"/>
+              <a:t>categories </a:t>
+            </a:r>
+            <a:r>
               <a:rPr lang="en-US" sz="2000" dirty="0" smtClean="0"/>
-              <a:t>Get category list from Category table with the matching priority.</a:t>
+              <a:t>from Category table with the matching priority.</a:t>
             </a:r>
           </a:p>
           <a:p>
@@ -9487,12 +9420,8 @@
               <a:t>Order categories by </a:t>
             </a:r>
             <a:r>
-              <a:rPr lang="en-US" sz="2000" dirty="0" err="1" smtClean="0"/>
-              <a:t>user_count</a:t>
-            </a:r>
-            <a:r>
               <a:rPr lang="en-US" sz="2000" dirty="0" smtClean="0"/>
-              <a:t> </a:t>
+              <a:t>user_count </a:t>
             </a:r>
             <a:r>
               <a:rPr lang="en-US" sz="2000" dirty="0" smtClean="0"/>
@@ -9537,15 +9466,7 @@
             </a:r>
             <a:r>
               <a:rPr lang="en-US" sz="2000" dirty="0" smtClean="0"/>
-              <a:t>with </a:t>
-            </a:r>
-            <a:r>
-              <a:rPr lang="en-US" sz="2000" dirty="0" err="1" smtClean="0"/>
-              <a:t>product_list_url</a:t>
-            </a:r>
-            <a:r>
-              <a:rPr lang="en-US" sz="2000" dirty="0" smtClean="0"/>
-              <a:t> to </a:t>
+              <a:t>with product_list_url to </a:t>
             </a:r>
             <a:r>
               <a:rPr lang="en-US" sz="2000" dirty="0" smtClean="0"/>
@@ -9559,15 +9480,7 @@
             </a:pPr>
             <a:r>
               <a:rPr lang="en-US" sz="2000" dirty="0" smtClean="0"/>
-              <a:t>Product information is sent to </a:t>
-            </a:r>
-            <a:r>
-              <a:rPr lang="en-US" sz="2000" dirty="0" err="1" smtClean="0"/>
-              <a:t>q_product_p</a:t>
-            </a:r>
-            <a:r>
-              <a:rPr lang="en-US" sz="2000" dirty="0" smtClean="0"/>
-              <a:t>(n).</a:t>
+              <a:t>Product information is sent to q_product_p(n).</a:t>
             </a:r>
           </a:p>
           <a:p>
@@ -9577,15 +9490,7 @@
             </a:pPr>
             <a:r>
               <a:rPr lang="en-US" sz="2000" dirty="0" smtClean="0"/>
-              <a:t>Log information is sent to </a:t>
-            </a:r>
-            <a:r>
-              <a:rPr lang="en-US" sz="2000" dirty="0" err="1" smtClean="0"/>
-              <a:t>q_product_log</a:t>
-            </a:r>
-            <a:r>
-              <a:rPr lang="en-US" sz="2000" dirty="0" smtClean="0"/>
-              <a:t> with status SUCCESS (0) or FAIL (1). </a:t>
+              <a:t>Log information is sent to q_product_log with status SUCCESS (0) or FAIL (1). </a:t>
             </a:r>
             <a:endParaRPr lang="en-US" sz="2000" dirty="0"/>
           </a:p>
@@ -9710,11 +9615,11 @@
           <a:lstStyle/>
           <a:p>
             <a:r>
-              <a:rPr lang="en-US" dirty="0" err="1"/>
+              <a:rPr lang="en-US" dirty="0"/>
               <a:t>q</a:t>
             </a:r>
             <a:r>
-              <a:rPr lang="en-US" dirty="0" err="1" smtClean="0"/>
+              <a:rPr lang="en-US" dirty="0" smtClean="0"/>
               <a:t>_product_log</a:t>
             </a:r>
             <a:endParaRPr lang="en-US" dirty="0"/>
@@ -9820,7 +9725,7 @@
           <a:lstStyle/>
           <a:p>
             <a:pPr algn="ctr"/>
-            <a:endParaRPr lang="en-US"/>
+            <a:endParaRPr lang="en-US" dirty="0"/>
           </a:p>
         </p:txBody>
       </p:sp>
@@ -9863,7 +9768,7 @@
           <a:lstStyle/>
           <a:p>
             <a:pPr algn="ctr"/>
-            <a:endParaRPr lang="en-US"/>
+            <a:endParaRPr lang="en-US" dirty="0"/>
           </a:p>
         </p:txBody>
       </p:sp>
@@ -10168,7 +10073,7 @@
           <a:lstStyle/>
           <a:p>
             <a:r>
-              <a:rPr lang="en-US" smtClean="0"/>
+              <a:rPr lang="en-US" dirty="0" smtClean="0"/>
               <a:t>q_product_p2 (Medium)</a:t>
             </a:r>
             <a:endParaRPr lang="en-US" dirty="0"/>
@@ -10198,7 +10103,7 @@
           <a:lstStyle/>
           <a:p>
             <a:r>
-              <a:rPr lang="en-US" smtClean="0"/>
+              <a:rPr lang="en-US" dirty="0" smtClean="0"/>
               <a:t>q_product_p3 (Low)</a:t>
             </a:r>
             <a:endParaRPr lang="en-US" dirty="0"/>
@@ -10246,7 +10151,7 @@
           <a:lstStyle/>
           <a:p>
             <a:pPr algn="ctr"/>
-            <a:endParaRPr lang="en-US"/>
+            <a:endParaRPr lang="en-US" dirty="0"/>
           </a:p>
         </p:txBody>
       </p:sp>
@@ -10674,7 +10579,7 @@
           <a:lstStyle/>
           <a:p>
             <a:pPr algn="ctr"/>
-            <a:endParaRPr lang="en-US"/>
+            <a:endParaRPr lang="en-US" dirty="0"/>
           </a:p>
         </p:txBody>
       </p:sp>
@@ -10717,7 +10622,7 @@
           <a:lstStyle/>
           <a:p>
             <a:pPr algn="ctr"/>
-            <a:endParaRPr lang="en-US"/>
+            <a:endParaRPr lang="en-US" dirty="0"/>
           </a:p>
         </p:txBody>
       </p:sp>
@@ -10760,7 +10665,7 @@
           <a:lstStyle/>
           <a:p>
             <a:pPr algn="ctr"/>
-            <a:endParaRPr lang="en-US"/>
+            <a:endParaRPr lang="en-US" dirty="0"/>
           </a:p>
         </p:txBody>
       </p:sp>
@@ -10967,12 +10872,8 @@
           <a:lstStyle/>
           <a:p>
             <a:r>
-              <a:rPr lang="en-US" dirty="0" err="1" smtClean="0"/>
-              <a:t>Price_monitoring_service</a:t>
-            </a:r>
-            <a:r>
               <a:rPr lang="en-US" dirty="0" smtClean="0"/>
-              <a:t> (p1)</a:t>
+              <a:t>Price_monitoring_service (p1)</a:t>
             </a:r>
             <a:endParaRPr lang="en-US" dirty="0"/>
           </a:p>
@@ -11001,12 +10902,8 @@
           <a:lstStyle/>
           <a:p>
             <a:r>
-              <a:rPr lang="en-US" dirty="0" err="1" smtClean="0"/>
-              <a:t>Price_monitoring_service</a:t>
-            </a:r>
-            <a:r>
               <a:rPr lang="en-US" dirty="0" smtClean="0"/>
-              <a:t> (p2)</a:t>
+              <a:t>Price_monitoring_service (p2)</a:t>
             </a:r>
             <a:endParaRPr lang="en-US" dirty="0"/>
           </a:p>
@@ -11035,12 +10932,8 @@
           <a:lstStyle/>
           <a:p>
             <a:r>
-              <a:rPr lang="en-US" dirty="0" err="1" smtClean="0"/>
-              <a:t>Price_monitoring_service</a:t>
-            </a:r>
-            <a:r>
               <a:rPr lang="en-US" dirty="0" smtClean="0"/>
-              <a:t> (p3)</a:t>
+              <a:t>Price_monitoring_service (p3)</a:t>
             </a:r>
             <a:endParaRPr lang="en-US" dirty="0"/>
           </a:p>
@@ -11431,15 +11324,7 @@
             </a:pPr>
             <a:r>
               <a:rPr lang="en-US" sz="2000" dirty="0" smtClean="0"/>
-              <a:t>Get product from </a:t>
-            </a:r>
-            <a:r>
-              <a:rPr lang="en-US" sz="2000" dirty="0" err="1" smtClean="0"/>
-              <a:t>q_product_p</a:t>
-            </a:r>
-            <a:r>
-              <a:rPr lang="en-US" sz="2000" dirty="0" smtClean="0"/>
-              <a:t>(n) queue.</a:t>
+              <a:t>Get product from q_product_p(n) queue.</a:t>
             </a:r>
           </a:p>
           <a:p>
@@ -11452,7 +11337,7 @@
               <a:t>Check if product’s id exists in cache, if not, store the product in DB and &lt;</a:t>
             </a:r>
             <a:r>
-              <a:rPr lang="en-US" sz="2000" dirty="0" err="1" smtClean="0"/>
+              <a:rPr lang="en-US" sz="2000" dirty="0" smtClean="0"/>
               <a:t>product_id</a:t>
             </a:r>
             <a:r>
@@ -11467,15 +11352,7 @@
             </a:pPr>
             <a:r>
               <a:rPr lang="en-US" sz="2000" dirty="0" smtClean="0"/>
-              <a:t>If product exists in cache, compare if price is reduced, if yes, send product to </a:t>
-            </a:r>
-            <a:r>
-              <a:rPr lang="en-US" sz="2000" dirty="0" err="1" smtClean="0"/>
-              <a:t>q_discount_product_p</a:t>
-            </a:r>
-            <a:r>
-              <a:rPr lang="en-US" sz="2000" dirty="0" smtClean="0"/>
-              <a:t>(n) </a:t>
+              <a:t>If product exists in cache, compare if price is reduced, if yes, send product to q_discount_product_p(n) </a:t>
             </a:r>
             <a:r>
               <a:rPr lang="en-US" sz="2000" dirty="0" smtClean="0"/>
@@ -11915,15 +11792,7 @@
             </a:pPr>
             <a:r>
               <a:rPr lang="en-US" sz="2000" dirty="0" smtClean="0"/>
-              <a:t>Get discount products from </a:t>
-            </a:r>
-            <a:r>
-              <a:rPr lang="en-US" sz="2000" dirty="0" err="1" smtClean="0"/>
-              <a:t>q_discount_product_p</a:t>
-            </a:r>
-            <a:r>
-              <a:rPr lang="en-US" sz="2000" dirty="0" smtClean="0"/>
-              <a:t>(n) queues.</a:t>
+              <a:t>Get discount products from q_discount_product_p(n) queues.</a:t>
             </a:r>
           </a:p>
           <a:p>
@@ -11988,7 +11857,7 @@
           <a:lstStyle/>
           <a:p>
             <a:pPr algn="ctr"/>
-            <a:endParaRPr lang="en-US"/>
+            <a:endParaRPr lang="en-US" dirty="0"/>
           </a:p>
         </p:txBody>
       </p:sp>
@@ -12031,7 +11900,7 @@
           <a:lstStyle/>
           <a:p>
             <a:pPr algn="ctr"/>
-            <a:endParaRPr lang="en-US"/>
+            <a:endParaRPr lang="en-US" dirty="0"/>
           </a:p>
         </p:txBody>
       </p:sp>
@@ -12074,7 +11943,7 @@
           <a:lstStyle/>
           <a:p>
             <a:pPr algn="ctr"/>
-            <a:endParaRPr lang="en-US"/>
+            <a:endParaRPr lang="en-US" dirty="0"/>
           </a:p>
         </p:txBody>
       </p:sp>
@@ -12132,15 +12001,7 @@
           <a:p>
             <a:r>
               <a:rPr lang="en-US" dirty="0" smtClean="0"/>
-              <a:t>Instant </a:t>
-            </a:r>
-            <a:r>
-              <a:rPr lang="en-US" smtClean="0"/>
-              <a:t>Notification Service (</a:t>
-            </a:r>
-            <a:r>
-              <a:rPr lang="en-US" dirty="0" smtClean="0"/>
-              <a:t>p1)</a:t>
+              <a:t>Instant Notification Service (p1)</a:t>
             </a:r>
             <a:endParaRPr lang="en-US" dirty="0"/>
           </a:p>
@@ -12463,7 +12324,7 @@
           <a:lstStyle/>
           <a:p>
             <a:pPr algn="ctr"/>
-            <a:endParaRPr lang="en-US"/>
+            <a:endParaRPr lang="en-US" dirty="0"/>
           </a:p>
         </p:txBody>
       </p:sp>
@@ -12782,7 +12643,7 @@
           <a:lstStyle/>
           <a:p>
             <a:pPr algn="ctr"/>
-            <a:endParaRPr lang="en-US"/>
+            <a:endParaRPr lang="en-US" dirty="0"/>
           </a:p>
         </p:txBody>
       </p:sp>
@@ -12885,7 +12746,7 @@
           <a:lstStyle/>
           <a:p>
             <a:pPr algn="ctr"/>
-            <a:endParaRPr lang="en-US"/>
+            <a:endParaRPr lang="en-US" dirty="0"/>
           </a:p>
         </p:txBody>
       </p:sp>
@@ -13137,15 +12998,7 @@
             </a:r>
             <a:r>
               <a:rPr lang="en-US" sz="2000" dirty="0" smtClean="0"/>
-              <a:t>/{</a:t>
-            </a:r>
-            <a:r>
-              <a:rPr lang="en-US" sz="2000" dirty="0" err="1" smtClean="0"/>
-              <a:t>userId</a:t>
-            </a:r>
-            <a:r>
-              <a:rPr lang="en-US" sz="2000" dirty="0" smtClean="0"/>
-              <a:t>}				</a:t>
+              <a:t>/{userId}				</a:t>
             </a:r>
             <a:r>
               <a:rPr lang="en-US" sz="2000" dirty="0" smtClean="0"/>
@@ -13167,15 +13020,7 @@
             </a:r>
             <a:r>
               <a:rPr lang="en-US" sz="2000" dirty="0" smtClean="0"/>
-              <a:t>/{</a:t>
-            </a:r>
-            <a:r>
-              <a:rPr lang="en-US" sz="2000" dirty="0" err="1" smtClean="0"/>
-              <a:t>userId</a:t>
-            </a:r>
-            <a:r>
-              <a:rPr lang="en-US" sz="2000" dirty="0" smtClean="0"/>
-              <a:t>}				</a:t>
+              <a:t>/{userId}				</a:t>
             </a:r>
             <a:r>
               <a:rPr lang="en-US" sz="2000" dirty="0" smtClean="0"/>
@@ -13197,23 +13042,7 @@
             </a:r>
             <a:r>
               <a:rPr lang="en-US" sz="2000" dirty="0" smtClean="0"/>
-              <a:t>/{</a:t>
-            </a:r>
-            <a:r>
-              <a:rPr lang="en-US" sz="2000" dirty="0" err="1" smtClean="0"/>
-              <a:t>userId</a:t>
-            </a:r>
-            <a:r>
-              <a:rPr lang="en-US" sz="2000" dirty="0" smtClean="0"/>
-              <a:t>}/categories/{</a:t>
-            </a:r>
-            <a:r>
-              <a:rPr lang="en-US" sz="2000" dirty="0" err="1" smtClean="0"/>
-              <a:t>categoryId</a:t>
-            </a:r>
-            <a:r>
-              <a:rPr lang="en-US" sz="2000" dirty="0" smtClean="0"/>
-              <a:t>}		</a:t>
+              <a:t>/{userId}/categories/{categoryId}		</a:t>
             </a:r>
             <a:r>
               <a:rPr lang="en-US" sz="2000" dirty="0" smtClean="0"/>
@@ -13235,23 +13064,7 @@
             </a:r>
             <a:r>
               <a:rPr lang="en-US" sz="2000" dirty="0" smtClean="0"/>
-              <a:t>/{</a:t>
-            </a:r>
-            <a:r>
-              <a:rPr lang="en-US" sz="2000" dirty="0" err="1" smtClean="0"/>
-              <a:t>userId</a:t>
-            </a:r>
-            <a:r>
-              <a:rPr lang="en-US" sz="2000" dirty="0" smtClean="0"/>
-              <a:t>}/categories/{</a:t>
-            </a:r>
-            <a:r>
-              <a:rPr lang="en-US" sz="2000" dirty="0" err="1" smtClean="0"/>
-              <a:t>categoryId</a:t>
-            </a:r>
-            <a:r>
-              <a:rPr lang="en-US" sz="2000" dirty="0" smtClean="0"/>
-              <a:t>}		</a:t>
+              <a:t>/{userId}/categories/{categoryId}		</a:t>
             </a:r>
             <a:r>
               <a:rPr lang="en-US" sz="2000" dirty="0" smtClean="0"/>
@@ -13287,49 +13100,17 @@
           <a:p>
             <a:r>
               <a:rPr lang="en-US" sz="2000" dirty="0" smtClean="0"/>
-              <a:t>GET	/users/</a:t>
-            </a:r>
-            <a:r>
-              <a:rPr lang="en-US" sz="2000" dirty="0" err="1" smtClean="0"/>
-              <a:t>deals?</a:t>
-            </a:r>
-            <a:r>
-              <a:rPr lang="en-US" sz="2000" dirty="0" err="1" smtClean="0"/>
-              <a:t>page</a:t>
+              <a:t>GET	/users/deals?</a:t>
             </a:r>
             <a:r>
               <a:rPr lang="en-US" sz="2000" dirty="0" smtClean="0"/>
-              <a:t>=&lt;page#&gt;&amp;size=&lt;page size&gt;			Search deals</a:t>
+              <a:t>page=&lt;page#&gt;&amp;size=&lt;page size&gt;			Search deals</a:t>
             </a:r>
           </a:p>
           <a:p>
             <a:r>
               <a:rPr lang="en-US" sz="2000" dirty="0" smtClean="0"/>
-              <a:t>	&amp;</a:t>
-            </a:r>
-            <a:r>
-              <a:rPr lang="en-US" sz="2000" dirty="0" err="1" smtClean="0"/>
-              <a:t>sortBy</a:t>
-            </a:r>
-            <a:r>
-              <a:rPr lang="en-US" sz="2000" dirty="0" smtClean="0"/>
-              <a:t>=&lt;field&gt;&amp;direction=&lt;ASC/DESC&gt;&amp;</a:t>
-            </a:r>
-            <a:r>
-              <a:rPr lang="en-US" sz="2000" dirty="0" err="1" smtClean="0"/>
-              <a:t>categoryId</a:t>
-            </a:r>
-            <a:r>
-              <a:rPr lang="en-US" sz="2000" dirty="0" smtClean="0"/>
-              <a:t>=&lt;</a:t>
-            </a:r>
-            <a:r>
-              <a:rPr lang="en-US" sz="2000" dirty="0" err="1" smtClean="0"/>
-              <a:t>categoryId</a:t>
-            </a:r>
-            <a:r>
-              <a:rPr lang="en-US" sz="2000" dirty="0" smtClean="0"/>
-              <a:t>&gt;</a:t>
+              <a:t>	&amp;sortBy=&lt;field&gt;&amp;direction=&lt;ASC/DESC&gt;&amp;categoryId=&lt;categoryId&gt;</a:t>
             </a:r>
             <a:endParaRPr lang="en-US" sz="2000" dirty="0"/>
           </a:p>

</xml_diff>

<commit_message>
Update ppt for updatePriority() schedule
</commit_message>
<xml_diff>
--- a/PriceMonitoringDesign.pptx
+++ b/PriceMonitoringDesign.pptx
@@ -227,7 +227,7 @@
           <a:p>
             <a:fld id="{822F189D-D7C4-2B4B-BA7D-F542C8765D31}" type="datetimeFigureOut">
               <a:rPr lang="en-US" smtClean="0"/>
-              <a:t>6/14/17</a:t>
+              <a:t>6/17/17</a:t>
             </a:fld>
             <a:endParaRPr lang="en-US" dirty="0"/>
           </a:p>
@@ -794,7 +794,7 @@
           <a:p>
             <a:fld id="{FE13B3C1-B50E-B844-B5EC-A0E6C3AA92EA}" type="datetimeFigureOut">
               <a:rPr lang="en-US" smtClean="0"/>
-              <a:t>6/14/17</a:t>
+              <a:t>6/17/17</a:t>
             </a:fld>
             <a:endParaRPr lang="en-US" dirty="0"/>
           </a:p>
@@ -964,7 +964,7 @@
           <a:p>
             <a:fld id="{FE13B3C1-B50E-B844-B5EC-A0E6C3AA92EA}" type="datetimeFigureOut">
               <a:rPr lang="en-US" smtClean="0"/>
-              <a:t>6/14/17</a:t>
+              <a:t>6/17/17</a:t>
             </a:fld>
             <a:endParaRPr lang="en-US" dirty="0"/>
           </a:p>
@@ -1144,7 +1144,7 @@
           <a:p>
             <a:fld id="{FE13B3C1-B50E-B844-B5EC-A0E6C3AA92EA}" type="datetimeFigureOut">
               <a:rPr lang="en-US" smtClean="0"/>
-              <a:t>6/14/17</a:t>
+              <a:t>6/17/17</a:t>
             </a:fld>
             <a:endParaRPr lang="en-US" dirty="0"/>
           </a:p>
@@ -1314,7 +1314,7 @@
           <a:p>
             <a:fld id="{FE13B3C1-B50E-B844-B5EC-A0E6C3AA92EA}" type="datetimeFigureOut">
               <a:rPr lang="en-US" smtClean="0"/>
-              <a:t>6/14/17</a:t>
+              <a:t>6/17/17</a:t>
             </a:fld>
             <a:endParaRPr lang="en-US" dirty="0"/>
           </a:p>
@@ -1560,7 +1560,7 @@
           <a:p>
             <a:fld id="{FE13B3C1-B50E-B844-B5EC-A0E6C3AA92EA}" type="datetimeFigureOut">
               <a:rPr lang="en-US" smtClean="0"/>
-              <a:t>6/14/17</a:t>
+              <a:t>6/17/17</a:t>
             </a:fld>
             <a:endParaRPr lang="en-US" dirty="0"/>
           </a:p>
@@ -1792,7 +1792,7 @@
           <a:p>
             <a:fld id="{FE13B3C1-B50E-B844-B5EC-A0E6C3AA92EA}" type="datetimeFigureOut">
               <a:rPr lang="en-US" smtClean="0"/>
-              <a:t>6/14/17</a:t>
+              <a:t>6/17/17</a:t>
             </a:fld>
             <a:endParaRPr lang="en-US" dirty="0"/>
           </a:p>
@@ -2159,7 +2159,7 @@
           <a:p>
             <a:fld id="{FE13B3C1-B50E-B844-B5EC-A0E6C3AA92EA}" type="datetimeFigureOut">
               <a:rPr lang="en-US" smtClean="0"/>
-              <a:t>6/14/17</a:t>
+              <a:t>6/17/17</a:t>
             </a:fld>
             <a:endParaRPr lang="en-US" dirty="0"/>
           </a:p>
@@ -2277,7 +2277,7 @@
           <a:p>
             <a:fld id="{FE13B3C1-B50E-B844-B5EC-A0E6C3AA92EA}" type="datetimeFigureOut">
               <a:rPr lang="en-US" smtClean="0"/>
-              <a:t>6/14/17</a:t>
+              <a:t>6/17/17</a:t>
             </a:fld>
             <a:endParaRPr lang="en-US" dirty="0"/>
           </a:p>
@@ -2372,7 +2372,7 @@
           <a:p>
             <a:fld id="{FE13B3C1-B50E-B844-B5EC-A0E6C3AA92EA}" type="datetimeFigureOut">
               <a:rPr lang="en-US" smtClean="0"/>
-              <a:t>6/14/17</a:t>
+              <a:t>6/17/17</a:t>
             </a:fld>
             <a:endParaRPr lang="en-US" dirty="0"/>
           </a:p>
@@ -2649,7 +2649,7 @@
           <a:p>
             <a:fld id="{FE13B3C1-B50E-B844-B5EC-A0E6C3AA92EA}" type="datetimeFigureOut">
               <a:rPr lang="en-US" smtClean="0"/>
-              <a:t>6/14/17</a:t>
+              <a:t>6/17/17</a:t>
             </a:fld>
             <a:endParaRPr lang="en-US" dirty="0"/>
           </a:p>
@@ -2902,7 +2902,7 @@
           <a:p>
             <a:fld id="{FE13B3C1-B50E-B844-B5EC-A0E6C3AA92EA}" type="datetimeFigureOut">
               <a:rPr lang="en-US" smtClean="0"/>
-              <a:t>6/14/17</a:t>
+              <a:t>6/17/17</a:t>
             </a:fld>
             <a:endParaRPr lang="en-US" dirty="0"/>
           </a:p>
@@ -3115,7 +3115,7 @@
           <a:p>
             <a:fld id="{FE13B3C1-B50E-B844-B5EC-A0E6C3AA92EA}" type="datetimeFigureOut">
               <a:rPr lang="en-US" smtClean="0"/>
-              <a:t>6/14/17</a:t>
+              <a:t>6/17/17</a:t>
             </a:fld>
             <a:endParaRPr lang="en-US" dirty="0"/>
           </a:p>
@@ -3538,11 +3538,7 @@
             <a:pPr algn="ctr"/>
             <a:r>
               <a:rPr lang="en-US" dirty="0" smtClean="0"/>
-              <a:t>Price </a:t>
-            </a:r>
-            <a:r>
-              <a:rPr lang="en-US" dirty="0" smtClean="0"/>
-              <a:t>Monitoring System	</a:t>
+              <a:t>Price Monitoring System	</a:t>
             </a:r>
             <a:endParaRPr lang="en-US" dirty="0"/>
           </a:p>
@@ -3582,15 +3578,7 @@
           <a:p>
             <a:r>
               <a:rPr lang="en-US" dirty="0" smtClean="0"/>
-              <a:t>Allows users to subscribe </a:t>
-            </a:r>
-            <a:r>
-              <a:rPr lang="en-US" dirty="0" smtClean="0"/>
-              <a:t>by emails </a:t>
-            </a:r>
-            <a:r>
-              <a:rPr lang="en-US" dirty="0" smtClean="0"/>
-              <a:t>for interested product categories.</a:t>
+              <a:t>Allows users to subscribe by emails for interested product categories.</a:t>
             </a:r>
           </a:p>
           <a:p>
@@ -3926,13 +3914,8 @@
             </a:pPr>
             <a:r>
               <a:rPr lang="en-US" sz="2000" dirty="0" smtClean="0"/>
-              <a:t>Store the log into </a:t>
-            </a:r>
-            <a:r>
-              <a:rPr lang="en-US" sz="2000" dirty="0" smtClean="0"/>
-              <a:t>MongoDB.</a:t>
-            </a:r>
-            <a:endParaRPr lang="en-US" sz="2000" dirty="0" smtClean="0"/>
+              <a:t>Store the log into MongoDB.</a:t>
+            </a:r>
           </a:p>
         </p:txBody>
       </p:sp>
@@ -5970,11 +5953,7 @@
           <a:p>
             <a:r>
               <a:rPr lang="en-US" sz="1600" dirty="0" smtClean="0"/>
-              <a:t>Port: </a:t>
-            </a:r>
-            <a:r>
-              <a:rPr lang="en-US" sz="1600" dirty="0" smtClean="0"/>
-              <a:t>9005</a:t>
+              <a:t>Port: 9005</a:t>
             </a:r>
             <a:endParaRPr lang="en-US" sz="1600" dirty="0"/>
           </a:p>
@@ -6343,11 +6322,7 @@
             <a:pPr algn="ctr"/>
             <a:r>
               <a:rPr lang="en-US" dirty="0" smtClean="0"/>
-              <a:t>DB </a:t>
-            </a:r>
-            <a:r>
-              <a:rPr lang="en-US" dirty="0" smtClean="0"/>
-              <a:t>Schema (MySQL)</a:t>
+              <a:t>DB Schema (MySQL)</a:t>
             </a:r>
             <a:endParaRPr lang="en-US" dirty="0"/>
           </a:p>
@@ -8191,13 +8166,8 @@
             </a:pPr>
             <a:r>
               <a:rPr lang="en-US" sz="1800" dirty="0" smtClean="0"/>
-              <a:t>S</a:t>
-            </a:r>
-            <a:r>
-              <a:rPr lang="en-US" sz="1800" dirty="0" smtClean="0"/>
-              <a:t>tatus</a:t>
-            </a:r>
-            <a:endParaRPr lang="en-US" sz="1800" dirty="0" smtClean="0"/>
+              <a:t>Status</a:t>
+            </a:r>
           </a:p>
           <a:p>
             <a:pPr marL="0" indent="0">
@@ -8266,7 +8236,6 @@
               <a:rPr lang="en-US" sz="1800" dirty="0" smtClean="0"/>
               <a:t>reate_time</a:t>
             </a:r>
-            <a:endParaRPr lang="en-US" sz="1800" dirty="0" smtClean="0"/>
           </a:p>
         </p:txBody>
       </p:sp>
@@ -8507,7 +8476,7 @@
         </p:nvSpPr>
         <p:spPr>
           <a:xfrm>
-            <a:off x="2446329" y="1531170"/>
+            <a:off x="2446329" y="1721169"/>
             <a:ext cx="791004" cy="653598"/>
           </a:xfrm>
           <a:prstGeom prst="cloud">
@@ -8552,7 +8521,7 @@
         </p:nvSpPr>
         <p:spPr>
           <a:xfrm>
-            <a:off x="4419607" y="1581235"/>
+            <a:off x="4419607" y="1771234"/>
             <a:ext cx="1980955" cy="417372"/>
           </a:xfrm>
           <a:prstGeom prst="cube">
@@ -8595,7 +8564,7 @@
         </p:nvSpPr>
         <p:spPr>
           <a:xfrm>
-            <a:off x="4482708" y="1638048"/>
+            <a:off x="4482708" y="1828047"/>
             <a:ext cx="1980726" cy="276999"/>
           </a:xfrm>
           <a:prstGeom prst="rect">
@@ -8628,7 +8597,7 @@
         </p:nvCxnSpPr>
         <p:spPr>
           <a:xfrm flipV="1">
-            <a:off x="3236674" y="1842093"/>
+            <a:off x="3236674" y="2032092"/>
             <a:ext cx="1182933" cy="15876"/>
           </a:xfrm>
           <a:prstGeom prst="straightConnector1">
@@ -8664,7 +8633,7 @@
         </p:nvCxnSpPr>
         <p:spPr>
           <a:xfrm flipV="1">
-            <a:off x="6400562" y="1723835"/>
+            <a:off x="6400562" y="1913834"/>
             <a:ext cx="1159354" cy="13915"/>
           </a:xfrm>
           <a:prstGeom prst="straightConnector1">
@@ -8697,8 +8666,8 @@
         </p:nvSpPr>
         <p:spPr>
           <a:xfrm>
-            <a:off x="721241" y="2383544"/>
-            <a:ext cx="10192182" cy="3785652"/>
+            <a:off x="721241" y="2632927"/>
+            <a:ext cx="10192182" cy="4093428"/>
           </a:xfrm>
           <a:prstGeom prst="rect">
             <a:avLst/>
@@ -8747,15 +8716,7 @@
             </a:pPr>
             <a:r>
               <a:rPr lang="en-US" sz="2000" dirty="0" smtClean="0"/>
-              <a:t>Categories with subscribers count &gt; </a:t>
-            </a:r>
-            <a:r>
-              <a:rPr lang="en-US" sz="2000" dirty="0" smtClean="0"/>
-              <a:t>threshold, </a:t>
-            </a:r>
-            <a:r>
-              <a:rPr lang="en-US" sz="2000" dirty="0" smtClean="0"/>
-              <a:t>set to HIGH (1) priority.</a:t>
+              <a:t>Categories with subscribers count &gt; threshold, set to HIGH (1) priority.</a:t>
             </a:r>
           </a:p>
           <a:p>
@@ -8795,11 +8756,7 @@
             </a:pPr>
             <a:r>
               <a:rPr lang="en-US" sz="2000" dirty="0" smtClean="0"/>
-              <a:t>Threshold is </a:t>
-            </a:r>
-            <a:r>
-              <a:rPr lang="en-US" sz="2000" dirty="0" smtClean="0"/>
-              <a:t>configured at application.yml</a:t>
+              <a:t>Threshold is configured at application.yml</a:t>
             </a:r>
             <a:r>
               <a:rPr lang="en-US" sz="2000" dirty="0"/>
@@ -8817,31 +8774,7 @@
             </a:pPr>
             <a:r>
               <a:rPr lang="en-US" sz="2000" dirty="0" smtClean="0"/>
-              <a:t>When crawler </a:t>
-            </a:r>
-            <a:r>
-              <a:rPr lang="en-US" sz="2000" dirty="0" smtClean="0"/>
-              <a:t>starts the first time, </a:t>
-            </a:r>
-            <a:r>
-              <a:rPr lang="en-US" sz="2000" dirty="0" smtClean="0"/>
-              <a:t>it </a:t>
-            </a:r>
-            <a:r>
-              <a:rPr lang="en-US" sz="2000" dirty="0" smtClean="0"/>
-              <a:t>will update the </a:t>
-            </a:r>
-            <a:r>
-              <a:rPr lang="en-US" sz="2000" dirty="0" smtClean="0"/>
-              <a:t>threshold in </a:t>
-            </a:r>
-            <a:r>
-              <a:rPr lang="en-US" sz="2000" dirty="0" smtClean="0"/>
-              <a:t>DB</a:t>
-            </a:r>
-            <a:r>
-              <a:rPr lang="en-US" sz="2000" dirty="0" smtClean="0"/>
-              <a:t>.</a:t>
+              <a:t>When crawler starts the first time, it will update the threshold in DB.</a:t>
             </a:r>
           </a:p>
           <a:p>
@@ -8859,7 +8792,15 @@
             </a:r>
             <a:r>
               <a:rPr lang="en-US" sz="2000" dirty="0" smtClean="0"/>
-              <a:t>also be changed at run time through REST api:</a:t>
+              <a:t>also be changed at run time through REST </a:t>
+            </a:r>
+            <a:r>
+              <a:rPr lang="en-US" sz="2000" dirty="0" err="1" smtClean="0"/>
+              <a:t>api</a:t>
+            </a:r>
+            <a:r>
+              <a:rPr lang="en-US" sz="2000" dirty="0" smtClean="0"/>
+              <a:t>:</a:t>
             </a:r>
           </a:p>
           <a:p>
@@ -8867,26 +8808,7 @@
               <a:buFont typeface="Arial" charset="0"/>
               <a:buChar char="•"/>
             </a:pPr>
-            <a:r>
-              <a:rPr lang="en-US" sz="2000" dirty="0" smtClean="0"/>
-              <a:t>GET	</a:t>
-            </a:r>
-            <a:r>
-              <a:rPr lang="en-US" sz="2000" dirty="0" smtClean="0"/>
-              <a:t>/category-crawlers/user-count-threshold</a:t>
-            </a:r>
-            <a:r>
-              <a:rPr lang="en-US" sz="2000" dirty="0" smtClean="0"/>
-              <a:t>		</a:t>
-            </a:r>
-            <a:r>
-              <a:rPr lang="en-US" sz="2000" dirty="0" smtClean="0"/>
-              <a:t>	Get </a:t>
-            </a:r>
-            <a:r>
-              <a:rPr lang="en-US" sz="2000" dirty="0" smtClean="0"/>
-              <a:t>threshold</a:t>
-            </a:r>
+            <a:endParaRPr lang="en-US" sz="2000" dirty="0" smtClean="0"/>
           </a:p>
           <a:p>
             <a:pPr marL="285750" indent="-285750">
@@ -8895,23 +8817,17 @@
             </a:pPr>
             <a:r>
               <a:rPr lang="en-US" sz="2000" dirty="0" smtClean="0"/>
-              <a:t>PUT	</a:t>
-            </a:r>
+              <a:t>GET	/category-crawlers/user-count-threshold			Get threshold</a:t>
+            </a:r>
+          </a:p>
+          <a:p>
+            <a:pPr marL="285750" indent="-285750">
+              <a:buFont typeface="Arial" charset="0"/>
+              <a:buChar char="•"/>
+            </a:pPr>
             <a:r>
               <a:rPr lang="en-US" sz="2000" dirty="0" smtClean="0"/>
-              <a:t>/category-crawlers/user-count-threshold</a:t>
-            </a:r>
-            <a:r>
-              <a:rPr lang="en-US" sz="2000" dirty="0" smtClean="0"/>
-              <a:t>		</a:t>
-            </a:r>
-            <a:r>
-              <a:rPr lang="en-US" sz="2000" dirty="0" smtClean="0"/>
-              <a:t>	Update </a:t>
-            </a:r>
-            <a:r>
-              <a:rPr lang="en-US" sz="2000" dirty="0" smtClean="0"/>
-              <a:t>threshold</a:t>
+              <a:t>PUT	/category-crawlers/user-count-threshold			Update threshold</a:t>
             </a:r>
           </a:p>
         </p:txBody>
@@ -8938,7 +8854,7 @@
         </p:blipFill>
         <p:spPr>
           <a:xfrm>
-            <a:off x="7559916" y="1360649"/>
+            <a:off x="7559916" y="1550648"/>
             <a:ext cx="726372" cy="726372"/>
           </a:xfrm>
           <a:prstGeom prst="rect">
@@ -8946,6 +8862,231 @@
           </a:prstGeom>
         </p:spPr>
       </p:pic>
+      <p:pic>
+        <p:nvPicPr>
+          <p:cNvPr id="17" name="Content Placeholder 119"/>
+          <p:cNvPicPr>
+            <a:picLocks noChangeAspect="1"/>
+          </p:cNvPicPr>
+          <p:nvPr/>
+        </p:nvPicPr>
+        <p:blipFill>
+          <a:blip r:embed="rId2">
+            <a:extLst>
+              <a:ext uri="{28A0092B-C50C-407E-A947-70E740481C1C}">
+                <a14:useLocalDpi xmlns:a14="http://schemas.microsoft.com/office/drawing/2010/main" val="0"/>
+              </a:ext>
+            </a:extLst>
+          </a:blip>
+          <a:stretch>
+            <a:fillRect/>
+          </a:stretch>
+        </p:blipFill>
+        <p:spPr>
+          <a:xfrm>
+            <a:off x="2568788" y="1258303"/>
+            <a:ext cx="273043" cy="273043"/>
+          </a:xfrm>
+          <a:prstGeom prst="rect">
+            <a:avLst/>
+          </a:prstGeom>
+        </p:spPr>
+      </p:pic>
+      <p:sp>
+        <p:nvSpPr>
+          <p:cNvPr id="18" name="Subtitle 2"/>
+          <p:cNvSpPr txBox="1">
+            <a:spLocks/>
+          </p:cNvSpPr>
+          <p:nvPr/>
+        </p:nvSpPr>
+        <p:spPr>
+          <a:xfrm>
+            <a:off x="2945081" y="1163303"/>
+            <a:ext cx="6650182" cy="423356"/>
+          </a:xfrm>
+          <a:prstGeom prst="rect">
+            <a:avLst/>
+          </a:prstGeom>
+        </p:spPr>
+        <p:txBody>
+          <a:bodyPr vert="horz" lIns="91440" tIns="45720" rIns="91440" bIns="45720" rtlCol="0">
+            <a:normAutofit/>
+          </a:bodyPr>
+          <a:lstStyle>
+            <a:lvl1pPr marL="0" indent="0" algn="ctr" defTabSz="914400" rtl="0" eaLnBrk="1" latinLnBrk="0" hangingPunct="1">
+              <a:lnSpc>
+                <a:spcPct val="90000"/>
+              </a:lnSpc>
+              <a:spcBef>
+                <a:spcPts val="1000"/>
+              </a:spcBef>
+              <a:buFont typeface="Arial"/>
+              <a:buNone/>
+              <a:defRPr sz="2400" kern="1200">
+                <a:solidFill>
+                  <a:schemeClr val="tx1"/>
+                </a:solidFill>
+                <a:latin typeface="+mn-lt"/>
+                <a:ea typeface="+mn-ea"/>
+                <a:cs typeface="+mn-cs"/>
+              </a:defRPr>
+            </a:lvl1pPr>
+            <a:lvl2pPr marL="457200" indent="0" algn="ctr" defTabSz="914400" rtl="0" eaLnBrk="1" latinLnBrk="0" hangingPunct="1">
+              <a:lnSpc>
+                <a:spcPct val="90000"/>
+              </a:lnSpc>
+              <a:spcBef>
+                <a:spcPts val="500"/>
+              </a:spcBef>
+              <a:buFont typeface="Arial"/>
+              <a:buNone/>
+              <a:defRPr sz="2000" kern="1200">
+                <a:solidFill>
+                  <a:schemeClr val="tx1"/>
+                </a:solidFill>
+                <a:latin typeface="+mn-lt"/>
+                <a:ea typeface="+mn-ea"/>
+                <a:cs typeface="+mn-cs"/>
+              </a:defRPr>
+            </a:lvl2pPr>
+            <a:lvl3pPr marL="914400" indent="0" algn="ctr" defTabSz="914400" rtl="0" eaLnBrk="1" latinLnBrk="0" hangingPunct="1">
+              <a:lnSpc>
+                <a:spcPct val="90000"/>
+              </a:lnSpc>
+              <a:spcBef>
+                <a:spcPts val="500"/>
+              </a:spcBef>
+              <a:buFont typeface="Arial"/>
+              <a:buNone/>
+              <a:defRPr sz="1800" kern="1200">
+                <a:solidFill>
+                  <a:schemeClr val="tx1"/>
+                </a:solidFill>
+                <a:latin typeface="+mn-lt"/>
+                <a:ea typeface="+mn-ea"/>
+                <a:cs typeface="+mn-cs"/>
+              </a:defRPr>
+            </a:lvl3pPr>
+            <a:lvl4pPr marL="1371600" indent="0" algn="ctr" defTabSz="914400" rtl="0" eaLnBrk="1" latinLnBrk="0" hangingPunct="1">
+              <a:lnSpc>
+                <a:spcPct val="90000"/>
+              </a:lnSpc>
+              <a:spcBef>
+                <a:spcPts val="500"/>
+              </a:spcBef>
+              <a:buFont typeface="Arial"/>
+              <a:buNone/>
+              <a:defRPr sz="1600" kern="1200">
+                <a:solidFill>
+                  <a:schemeClr val="tx1"/>
+                </a:solidFill>
+                <a:latin typeface="+mn-lt"/>
+                <a:ea typeface="+mn-ea"/>
+                <a:cs typeface="+mn-cs"/>
+              </a:defRPr>
+            </a:lvl4pPr>
+            <a:lvl5pPr marL="1828800" indent="0" algn="ctr" defTabSz="914400" rtl="0" eaLnBrk="1" latinLnBrk="0" hangingPunct="1">
+              <a:lnSpc>
+                <a:spcPct val="90000"/>
+              </a:lnSpc>
+              <a:spcBef>
+                <a:spcPts val="500"/>
+              </a:spcBef>
+              <a:buFont typeface="Arial"/>
+              <a:buNone/>
+              <a:defRPr sz="1600" kern="1200">
+                <a:solidFill>
+                  <a:schemeClr val="tx1"/>
+                </a:solidFill>
+                <a:latin typeface="+mn-lt"/>
+                <a:ea typeface="+mn-ea"/>
+                <a:cs typeface="+mn-cs"/>
+              </a:defRPr>
+            </a:lvl5pPr>
+            <a:lvl6pPr marL="2286000" indent="0" algn="ctr" defTabSz="914400" rtl="0" eaLnBrk="1" latinLnBrk="0" hangingPunct="1">
+              <a:lnSpc>
+                <a:spcPct val="90000"/>
+              </a:lnSpc>
+              <a:spcBef>
+                <a:spcPts val="500"/>
+              </a:spcBef>
+              <a:buFont typeface="Arial"/>
+              <a:buNone/>
+              <a:defRPr sz="1600" kern="1200">
+                <a:solidFill>
+                  <a:schemeClr val="tx1"/>
+                </a:solidFill>
+                <a:latin typeface="+mn-lt"/>
+                <a:ea typeface="+mn-ea"/>
+                <a:cs typeface="+mn-cs"/>
+              </a:defRPr>
+            </a:lvl6pPr>
+            <a:lvl7pPr marL="2743200" indent="0" algn="ctr" defTabSz="914400" rtl="0" eaLnBrk="1" latinLnBrk="0" hangingPunct="1">
+              <a:lnSpc>
+                <a:spcPct val="90000"/>
+              </a:lnSpc>
+              <a:spcBef>
+                <a:spcPts val="500"/>
+              </a:spcBef>
+              <a:buFont typeface="Arial"/>
+              <a:buNone/>
+              <a:defRPr sz="1600" kern="1200">
+                <a:solidFill>
+                  <a:schemeClr val="tx1"/>
+                </a:solidFill>
+                <a:latin typeface="+mn-lt"/>
+                <a:ea typeface="+mn-ea"/>
+                <a:cs typeface="+mn-cs"/>
+              </a:defRPr>
+            </a:lvl7pPr>
+            <a:lvl8pPr marL="3200400" indent="0" algn="ctr" defTabSz="914400" rtl="0" eaLnBrk="1" latinLnBrk="0" hangingPunct="1">
+              <a:lnSpc>
+                <a:spcPct val="90000"/>
+              </a:lnSpc>
+              <a:spcBef>
+                <a:spcPts val="500"/>
+              </a:spcBef>
+              <a:buFont typeface="Arial"/>
+              <a:buNone/>
+              <a:defRPr sz="1600" kern="1200">
+                <a:solidFill>
+                  <a:schemeClr val="tx1"/>
+                </a:solidFill>
+                <a:latin typeface="+mn-lt"/>
+                <a:ea typeface="+mn-ea"/>
+                <a:cs typeface="+mn-cs"/>
+              </a:defRPr>
+            </a:lvl8pPr>
+            <a:lvl9pPr marL="3657600" indent="0" algn="ctr" defTabSz="914400" rtl="0" eaLnBrk="1" latinLnBrk="0" hangingPunct="1">
+              <a:lnSpc>
+                <a:spcPct val="90000"/>
+              </a:lnSpc>
+              <a:spcBef>
+                <a:spcPts val="500"/>
+              </a:spcBef>
+              <a:buFont typeface="Arial"/>
+              <a:buNone/>
+              <a:defRPr sz="1600" kern="1200">
+                <a:solidFill>
+                  <a:schemeClr val="tx1"/>
+                </a:solidFill>
+                <a:latin typeface="+mn-lt"/>
+                <a:ea typeface="+mn-ea"/>
+                <a:cs typeface="+mn-cs"/>
+              </a:defRPr>
+            </a:lvl9pPr>
+          </a:lstStyle>
+          <a:p>
+            <a:pPr algn="l"/>
+            <a:r>
+              <a:rPr lang="en-US" sz="2000" dirty="0" smtClean="0"/>
+              <a:t>Update category priority at 00:00:00 AM Monday - Saturday</a:t>
+            </a:r>
+            <a:endParaRPr lang="en-US" sz="2000" dirty="0"/>
+          </a:p>
+        </p:txBody>
+      </p:sp>
     </p:spTree>
     <p:extLst>
       <p:ext uri="{BB962C8B-B14F-4D97-AF65-F5344CB8AC3E}">
@@ -9399,11 +9540,7 @@
             </a:pPr>
             <a:r>
               <a:rPr lang="en-US" sz="2000" smtClean="0"/>
-              <a:t>Get </a:t>
-            </a:r>
-            <a:r>
-              <a:rPr lang="en-US" sz="2000" smtClean="0"/>
-              <a:t>categories </a:t>
+              <a:t>Get categories </a:t>
             </a:r>
             <a:r>
               <a:rPr lang="en-US" sz="2000" dirty="0" smtClean="0"/>
@@ -9417,15 +9554,7 @@
             </a:pPr>
             <a:r>
               <a:rPr lang="en-US" sz="2000" dirty="0" smtClean="0"/>
-              <a:t>Order categories by </a:t>
-            </a:r>
-            <a:r>
-              <a:rPr lang="en-US" sz="2000" dirty="0" smtClean="0"/>
-              <a:t>user_count </a:t>
-            </a:r>
-            <a:r>
-              <a:rPr lang="en-US" sz="2000" dirty="0" smtClean="0"/>
-              <a:t>in descending order.</a:t>
+              <a:t>Order categories by user_count in descending order.</a:t>
             </a:r>
           </a:p>
           <a:p>
@@ -9458,19 +9587,7 @@
             </a:pPr>
             <a:r>
               <a:rPr lang="en-US" sz="2000" dirty="0" smtClean="0"/>
-              <a:t>The </a:t>
-            </a:r>
-            <a:r>
-              <a:rPr lang="en-US" sz="2000" dirty="0" smtClean="0"/>
-              <a:t>worker thread crawls the online shopping web site </a:t>
-            </a:r>
-            <a:r>
-              <a:rPr lang="en-US" sz="2000" dirty="0" smtClean="0"/>
-              <a:t>with product_list_url to </a:t>
-            </a:r>
-            <a:r>
-              <a:rPr lang="en-US" sz="2000" dirty="0" smtClean="0"/>
-              <a:t>get all products.</a:t>
+              <a:t>The worker thread crawls the online shopping web site with product_list_url to get all products.</a:t>
             </a:r>
           </a:p>
           <a:p>
@@ -11334,15 +11451,7 @@
             </a:pPr>
             <a:r>
               <a:rPr lang="en-US" sz="2000" dirty="0" smtClean="0"/>
-              <a:t>Check if product’s id exists in cache, if not, store the product in DB and &lt;</a:t>
-            </a:r>
-            <a:r>
-              <a:rPr lang="en-US" sz="2000" dirty="0" smtClean="0"/>
-              <a:t>product_id</a:t>
-            </a:r>
-            <a:r>
-              <a:rPr lang="en-US" sz="2000" dirty="0" smtClean="0"/>
-              <a:t>, price&gt; pair to cache.</a:t>
+              <a:t>Check if product’s id exists in cache, if not, store the product in DB and &lt;product_id, price&gt; pair to cache.</a:t>
             </a:r>
           </a:p>
           <a:p>
@@ -11352,11 +11461,7 @@
             </a:pPr>
             <a:r>
               <a:rPr lang="en-US" sz="2000" dirty="0" smtClean="0"/>
-              <a:t>If product exists in cache, compare if price is reduced, if yes, send product to q_discount_product_p(n) </a:t>
-            </a:r>
-            <a:r>
-              <a:rPr lang="en-US" sz="2000" dirty="0" smtClean="0"/>
-              <a:t>.</a:t>
+              <a:t>If product exists in cache, compare if price is reduced, if yes, send product to q_discount_product_p(n) .</a:t>
             </a:r>
           </a:p>
           <a:p>
@@ -11366,11 +11471,7 @@
             </a:pPr>
             <a:r>
               <a:rPr lang="en-US" sz="2000" dirty="0" smtClean="0"/>
-              <a:t>Update </a:t>
-            </a:r>
-            <a:r>
-              <a:rPr lang="en-US" sz="2000" dirty="0" smtClean="0"/>
-              <a:t>cache and DB with new price if price is changed.</a:t>
+              <a:t>Update cache and DB with new price if price is changed.</a:t>
             </a:r>
             <a:endParaRPr lang="en-US" sz="2000" dirty="0"/>
           </a:p>
@@ -12968,111 +13069,31 @@
           <a:p>
             <a:r>
               <a:rPr lang="en-US" sz="2000" dirty="0" smtClean="0"/>
-              <a:t>POST	</a:t>
-            </a:r>
+              <a:t>POST	/users								Create user</a:t>
+            </a:r>
+          </a:p>
+          <a:p>
             <a:r>
               <a:rPr lang="en-US" sz="2000" dirty="0" smtClean="0"/>
-              <a:t>/users</a:t>
-            </a:r>
+              <a:t>PUT	/users/{userId}							Update user</a:t>
+            </a:r>
+          </a:p>
+          <a:p>
             <a:r>
               <a:rPr lang="en-US" sz="2000" dirty="0" smtClean="0"/>
-              <a:t>					</a:t>
-            </a:r>
+              <a:t>DELETE	/users/{userId}							Delete user</a:t>
+            </a:r>
+          </a:p>
+          <a:p>
             <a:r>
               <a:rPr lang="en-US" sz="2000" dirty="0" smtClean="0"/>
-              <a:t>			Create </a:t>
-            </a:r>
+              <a:t>POST	/users/{userId}/categories/{categoryId}				Subscribe category</a:t>
+            </a:r>
+          </a:p>
+          <a:p>
             <a:r>
               <a:rPr lang="en-US" sz="2000" dirty="0" smtClean="0"/>
-              <a:t>user</a:t>
-            </a:r>
-          </a:p>
-          <a:p>
-            <a:r>
-              <a:rPr lang="en-US" sz="2000" dirty="0" smtClean="0"/>
-              <a:t>PUT	</a:t>
-            </a:r>
-            <a:r>
-              <a:rPr lang="en-US" sz="2000" dirty="0" smtClean="0"/>
-              <a:t>/users</a:t>
-            </a:r>
-            <a:r>
-              <a:rPr lang="en-US" sz="2000" dirty="0" smtClean="0"/>
-              <a:t>/{userId}				</a:t>
-            </a:r>
-            <a:r>
-              <a:rPr lang="en-US" sz="2000" dirty="0" smtClean="0"/>
-              <a:t>			Update </a:t>
-            </a:r>
-            <a:r>
-              <a:rPr lang="en-US" sz="2000" dirty="0" smtClean="0"/>
-              <a:t>user</a:t>
-            </a:r>
-          </a:p>
-          <a:p>
-            <a:r>
-              <a:rPr lang="en-US" sz="2000" dirty="0" smtClean="0"/>
-              <a:t>DELETE	</a:t>
-            </a:r>
-            <a:r>
-              <a:rPr lang="en-US" sz="2000" dirty="0" smtClean="0"/>
-              <a:t>/users</a:t>
-            </a:r>
-            <a:r>
-              <a:rPr lang="en-US" sz="2000" dirty="0" smtClean="0"/>
-              <a:t>/{userId}				</a:t>
-            </a:r>
-            <a:r>
-              <a:rPr lang="en-US" sz="2000" dirty="0" smtClean="0"/>
-              <a:t>			Delete </a:t>
-            </a:r>
-            <a:r>
-              <a:rPr lang="en-US" sz="2000" dirty="0" smtClean="0"/>
-              <a:t>user</a:t>
-            </a:r>
-          </a:p>
-          <a:p>
-            <a:r>
-              <a:rPr lang="en-US" sz="2000" dirty="0" smtClean="0"/>
-              <a:t>POST	</a:t>
-            </a:r>
-            <a:r>
-              <a:rPr lang="en-US" sz="2000" dirty="0" smtClean="0"/>
-              <a:t>/users</a:t>
-            </a:r>
-            <a:r>
-              <a:rPr lang="en-US" sz="2000" dirty="0" smtClean="0"/>
-              <a:t>/{userId}/categories/{categoryId}		</a:t>
-            </a:r>
-            <a:r>
-              <a:rPr lang="en-US" sz="2000" dirty="0" smtClean="0"/>
-              <a:t>		Subscribe </a:t>
-            </a:r>
-            <a:r>
-              <a:rPr lang="en-US" sz="2000" dirty="0" smtClean="0"/>
-              <a:t>category</a:t>
-            </a:r>
-          </a:p>
-          <a:p>
-            <a:r>
-              <a:rPr lang="en-US" sz="2000" dirty="0" smtClean="0"/>
-              <a:t>DELETE	</a:t>
-            </a:r>
-            <a:r>
-              <a:rPr lang="en-US" sz="2000" dirty="0" smtClean="0"/>
-              <a:t>/users</a:t>
-            </a:r>
-            <a:r>
-              <a:rPr lang="en-US" sz="2000" dirty="0" smtClean="0"/>
-              <a:t>/{userId}/categories/{categoryId}		</a:t>
-            </a:r>
-            <a:r>
-              <a:rPr lang="en-US" sz="2000" dirty="0" smtClean="0"/>
-              <a:t>		Unsubscribe </a:t>
-            </a:r>
-            <a:r>
-              <a:rPr lang="en-US" sz="2000" dirty="0" smtClean="0"/>
-              <a:t>category</a:t>
+              <a:t>DELETE	/users/{userId}/categories/{categoryId}				Unsubscribe category</a:t>
             </a:r>
           </a:p>
           <a:p>
@@ -13086,11 +13107,7 @@
             </a:r>
             <a:r>
               <a:rPr lang="en-US" sz="2000" dirty="0" smtClean="0"/>
-              <a:t>	</a:t>
-            </a:r>
-            <a:r>
-              <a:rPr lang="en-US" sz="2000" dirty="0" smtClean="0"/>
-              <a:t>				List </a:t>
+              <a:t>					List </a:t>
             </a:r>
             <a:r>
               <a:rPr lang="en-US" sz="2000" dirty="0"/>
@@ -13100,11 +13117,7 @@
           <a:p>
             <a:r>
               <a:rPr lang="en-US" sz="2000" dirty="0" smtClean="0"/>
-              <a:t>GET	/users/deals?</a:t>
-            </a:r>
-            <a:r>
-              <a:rPr lang="en-US" sz="2000" dirty="0" smtClean="0"/>
-              <a:t>page=&lt;page#&gt;&amp;size=&lt;page size&gt;			Search deals</a:t>
+              <a:t>GET	/users/deals?page=&lt;page#&gt;&amp;size=&lt;page size&gt;			Search deals</a:t>
             </a:r>
           </a:p>
           <a:p>

</xml_diff>

<commit_message>
Update subscribe category APis
</commit_message>
<xml_diff>
--- a/PriceMonitoringDesign.pptx
+++ b/PriceMonitoringDesign.pptx
@@ -231,7 +231,7 @@
           <a:p>
             <a:fld id="{822F189D-D7C4-2B4B-BA7D-F542C8765D31}" type="datetimeFigureOut">
               <a:rPr lang="en-US" smtClean="0"/>
-              <a:t>6/18/17</a:t>
+              <a:t>6/20/17</a:t>
             </a:fld>
             <a:endParaRPr lang="en-US" dirty="0"/>
           </a:p>
@@ -798,7 +798,7 @@
           <a:p>
             <a:fld id="{FE13B3C1-B50E-B844-B5EC-A0E6C3AA92EA}" type="datetimeFigureOut">
               <a:rPr lang="en-US" smtClean="0"/>
-              <a:t>6/18/17</a:t>
+              <a:t>6/20/17</a:t>
             </a:fld>
             <a:endParaRPr lang="en-US" dirty="0"/>
           </a:p>
@@ -968,7 +968,7 @@
           <a:p>
             <a:fld id="{FE13B3C1-B50E-B844-B5EC-A0E6C3AA92EA}" type="datetimeFigureOut">
               <a:rPr lang="en-US" smtClean="0"/>
-              <a:t>6/18/17</a:t>
+              <a:t>6/20/17</a:t>
             </a:fld>
             <a:endParaRPr lang="en-US" dirty="0"/>
           </a:p>
@@ -1148,7 +1148,7 @@
           <a:p>
             <a:fld id="{FE13B3C1-B50E-B844-B5EC-A0E6C3AA92EA}" type="datetimeFigureOut">
               <a:rPr lang="en-US" smtClean="0"/>
-              <a:t>6/18/17</a:t>
+              <a:t>6/20/17</a:t>
             </a:fld>
             <a:endParaRPr lang="en-US" dirty="0"/>
           </a:p>
@@ -1318,7 +1318,7 @@
           <a:p>
             <a:fld id="{FE13B3C1-B50E-B844-B5EC-A0E6C3AA92EA}" type="datetimeFigureOut">
               <a:rPr lang="en-US" smtClean="0"/>
-              <a:t>6/18/17</a:t>
+              <a:t>6/20/17</a:t>
             </a:fld>
             <a:endParaRPr lang="en-US" dirty="0"/>
           </a:p>
@@ -1564,7 +1564,7 @@
           <a:p>
             <a:fld id="{FE13B3C1-B50E-B844-B5EC-A0E6C3AA92EA}" type="datetimeFigureOut">
               <a:rPr lang="en-US" smtClean="0"/>
-              <a:t>6/18/17</a:t>
+              <a:t>6/20/17</a:t>
             </a:fld>
             <a:endParaRPr lang="en-US" dirty="0"/>
           </a:p>
@@ -1796,7 +1796,7 @@
           <a:p>
             <a:fld id="{FE13B3C1-B50E-B844-B5EC-A0E6C3AA92EA}" type="datetimeFigureOut">
               <a:rPr lang="en-US" smtClean="0"/>
-              <a:t>6/18/17</a:t>
+              <a:t>6/20/17</a:t>
             </a:fld>
             <a:endParaRPr lang="en-US" dirty="0"/>
           </a:p>
@@ -2163,7 +2163,7 @@
           <a:p>
             <a:fld id="{FE13B3C1-B50E-B844-B5EC-A0E6C3AA92EA}" type="datetimeFigureOut">
               <a:rPr lang="en-US" smtClean="0"/>
-              <a:t>6/18/17</a:t>
+              <a:t>6/20/17</a:t>
             </a:fld>
             <a:endParaRPr lang="en-US" dirty="0"/>
           </a:p>
@@ -2281,7 +2281,7 @@
           <a:p>
             <a:fld id="{FE13B3C1-B50E-B844-B5EC-A0E6C3AA92EA}" type="datetimeFigureOut">
               <a:rPr lang="en-US" smtClean="0"/>
-              <a:t>6/18/17</a:t>
+              <a:t>6/20/17</a:t>
             </a:fld>
             <a:endParaRPr lang="en-US" dirty="0"/>
           </a:p>
@@ -2376,7 +2376,7 @@
           <a:p>
             <a:fld id="{FE13B3C1-B50E-B844-B5EC-A0E6C3AA92EA}" type="datetimeFigureOut">
               <a:rPr lang="en-US" smtClean="0"/>
-              <a:t>6/18/17</a:t>
+              <a:t>6/20/17</a:t>
             </a:fld>
             <a:endParaRPr lang="en-US" dirty="0"/>
           </a:p>
@@ -2653,7 +2653,7 @@
           <a:p>
             <a:fld id="{FE13B3C1-B50E-B844-B5EC-A0E6C3AA92EA}" type="datetimeFigureOut">
               <a:rPr lang="en-US" smtClean="0"/>
-              <a:t>6/18/17</a:t>
+              <a:t>6/20/17</a:t>
             </a:fld>
             <a:endParaRPr lang="en-US" dirty="0"/>
           </a:p>
@@ -2906,7 +2906,7 @@
           <a:p>
             <a:fld id="{FE13B3C1-B50E-B844-B5EC-A0E6C3AA92EA}" type="datetimeFigureOut">
               <a:rPr lang="en-US" smtClean="0"/>
-              <a:t>6/18/17</a:t>
+              <a:t>6/20/17</a:t>
             </a:fld>
             <a:endParaRPr lang="en-US" dirty="0"/>
           </a:p>
@@ -3119,7 +3119,7 @@
           <a:p>
             <a:fld id="{FE13B3C1-B50E-B844-B5EC-A0E6C3AA92EA}" type="datetimeFigureOut">
               <a:rPr lang="en-US" smtClean="0"/>
-              <a:t>6/18/17</a:t>
+              <a:t>6/20/17</a:t>
             </a:fld>
             <a:endParaRPr lang="en-US" dirty="0"/>
           </a:p>
@@ -3960,7 +3960,7 @@
         <p:spPr>
           <a:xfrm>
             <a:off x="7954147" y="1456448"/>
-            <a:ext cx="0" cy="634290"/>
+            <a:ext cx="0" cy="491790"/>
           </a:xfrm>
           <a:prstGeom prst="straightConnector1">
             <a:avLst/>
@@ -3993,8 +3993,8 @@
         </p:nvSpPr>
         <p:spPr>
           <a:xfrm>
-            <a:off x="332509" y="2861966"/>
-            <a:ext cx="11542816" cy="3785652"/>
+            <a:off x="332509" y="2695716"/>
+            <a:ext cx="11542816" cy="4093428"/>
           </a:xfrm>
           <a:prstGeom prst="rect">
             <a:avLst/>
@@ -4051,13 +4051,75 @@
           <a:p>
             <a:r>
               <a:rPr lang="en-US" sz="2000" dirty="0" smtClean="0"/>
-              <a:t>POST	/users/{userId}/categories/{categoryId}				Subscribe category</a:t>
-            </a:r>
-          </a:p>
-          <a:p>
+              <a:t>POST	/</a:t>
+            </a:r>
             <a:r>
               <a:rPr lang="en-US" sz="2000" dirty="0" smtClean="0"/>
-              <a:t>DELETE	/users/{userId}/categories/{categoryId}				Unsubscribe category</a:t>
+              <a:t>users/{</a:t>
+            </a:r>
+            <a:r>
+              <a:rPr lang="en-US" sz="2000" dirty="0" err="1" smtClean="0"/>
+              <a:t>userId</a:t>
+            </a:r>
+            <a:r>
+              <a:rPr lang="en-US" sz="2000" dirty="0" smtClean="0"/>
+              <a:t>}/categories			</a:t>
+            </a:r>
+            <a:r>
+              <a:rPr lang="en-US" sz="2000" dirty="0" smtClean="0"/>
+              <a:t>			</a:t>
+            </a:r>
+            <a:r>
+              <a:rPr lang="en-US" sz="2000" dirty="0" smtClean="0"/>
+              <a:t>Subscribe </a:t>
+            </a:r>
+            <a:r>
+              <a:rPr lang="en-US" sz="2000" dirty="0" smtClean="0"/>
+              <a:t>category</a:t>
+            </a:r>
+          </a:p>
+          <a:p>
+            <a:r>
+              <a:rPr lang="en-US" sz="2000" dirty="0" smtClean="0"/>
+              <a:t>PUT</a:t>
+            </a:r>
+            <a:r>
+              <a:rPr lang="en-US" sz="2000" dirty="0"/>
+              <a:t>	/</a:t>
+            </a:r>
+            <a:r>
+              <a:rPr lang="en-US" sz="2000" dirty="0" smtClean="0"/>
+              <a:t>users/{</a:t>
+            </a:r>
+            <a:r>
+              <a:rPr lang="en-US" sz="2000" dirty="0" err="1" smtClean="0"/>
+              <a:t>userId</a:t>
+            </a:r>
+            <a:r>
+              <a:rPr lang="en-US" sz="2000" dirty="0" smtClean="0"/>
+              <a:t>}/categories</a:t>
+            </a:r>
+            <a:r>
+              <a:rPr lang="en-US" sz="2000" dirty="0"/>
+              <a:t>						</a:t>
+            </a:r>
+            <a:r>
+              <a:rPr lang="en-US" sz="2000" dirty="0" smtClean="0"/>
+              <a:t>Update subscribed </a:t>
+            </a:r>
+            <a:r>
+              <a:rPr lang="en-US" sz="2000" dirty="0"/>
+              <a:t>category</a:t>
+            </a:r>
+          </a:p>
+          <a:p>
+            <a:r>
+              <a:rPr lang="en-US" sz="2000" dirty="0" smtClean="0"/>
+              <a:t>DELETE</a:t>
+            </a:r>
+            <a:r>
+              <a:rPr lang="en-US" sz="2000" dirty="0" smtClean="0"/>
+              <a:t>	/users/{userId}/categories/{categoryId}				Unsubscribe category</a:t>
             </a:r>
           </a:p>
           <a:p>
@@ -4113,9 +4175,12 @@
             </a:r>
             <a:r>
               <a:rPr lang="en-US" sz="2000" dirty="0" smtClean="0"/>
-              <a:t>=&lt;minimum discount percentage&gt;</a:t>
-            </a:r>
-            <a:endParaRPr lang="en-US" sz="2000" dirty="0"/>
+              <a:t>=&lt;minimum discount percentage</a:t>
+            </a:r>
+            <a:r>
+              <a:rPr lang="en-US" sz="2000" dirty="0" smtClean="0"/>
+              <a:t>&gt;</a:t>
+            </a:r>
           </a:p>
         </p:txBody>
       </p:sp>
@@ -4141,7 +4206,7 @@
         </p:blipFill>
         <p:spPr>
           <a:xfrm>
-            <a:off x="7590961" y="2090738"/>
+            <a:off x="7590961" y="1948238"/>
             <a:ext cx="726372" cy="726372"/>
           </a:xfrm>
           <a:prstGeom prst="rect">
@@ -7090,7 +7155,6 @@
               <a:rPr lang="en-US" sz="1800" dirty="0" smtClean="0"/>
               <a:t>Id</a:t>
             </a:r>
-            <a:endParaRPr lang="en-US" sz="1800" dirty="0" smtClean="0"/>
           </a:p>
           <a:p>
             <a:pPr marL="0" indent="0">
@@ -7398,7 +7462,6 @@
               <a:rPr lang="en-US" sz="1800" dirty="0" smtClean="0"/>
               <a:t>Id</a:t>
             </a:r>
-            <a:endParaRPr lang="en-US" sz="1800" dirty="0" smtClean="0"/>
           </a:p>
           <a:p>
             <a:pPr marL="0" indent="0">
@@ -7420,7 +7483,6 @@
               <a:rPr lang="en-US" sz="1800" dirty="0" smtClean="0"/>
               <a:t>Priority</a:t>
             </a:r>
-            <a:endParaRPr lang="en-US" sz="1800" dirty="0" smtClean="0"/>
           </a:p>
           <a:p>
             <a:pPr marL="0" indent="0">
@@ -7704,9 +7766,24 @@
               <a:buNone/>
             </a:pPr>
             <a:r>
-              <a:rPr lang="en-US" sz="1800" dirty="0" smtClean="0"/>
+              <a:rPr lang="en-US" sz="1800" dirty="0" err="1" smtClean="0"/>
               <a:t>category_id</a:t>
             </a:r>
+            <a:endParaRPr lang="en-US" sz="1800" dirty="0" smtClean="0"/>
+          </a:p>
+          <a:p>
+            <a:pPr marL="0" indent="0">
+              <a:buNone/>
+            </a:pPr>
+            <a:r>
+              <a:rPr lang="en-US" sz="1800" dirty="0" err="1"/>
+              <a:t>m</a:t>
+            </a:r>
+            <a:r>
+              <a:rPr lang="en-US" sz="1800" dirty="0" err="1" smtClean="0"/>
+              <a:t>in_discount_percent</a:t>
+            </a:r>
+            <a:endParaRPr lang="en-US" sz="1800" dirty="0" smtClean="0"/>
           </a:p>
           <a:p>
             <a:pPr marL="0" indent="0">
@@ -8195,7 +8272,6 @@
               <a:rPr lang="en-US" sz="1800" dirty="0" smtClean="0"/>
               <a:t>id</a:t>
             </a:r>
-            <a:endParaRPr lang="en-US" sz="1800" dirty="0" smtClean="0"/>
           </a:p>
           <a:p>
             <a:pPr marL="0" indent="0">
@@ -12198,7 +12274,23 @@
             </a:pPr>
             <a:r>
               <a:rPr lang="en-US" sz="2000" dirty="0" smtClean="0"/>
-              <a:t>Update cache and DB with new price if price is changed.</a:t>
+              <a:t>Update cache and DB with new price </a:t>
+            </a:r>
+            <a:r>
+              <a:rPr lang="en-US" sz="2000" dirty="0" smtClean="0"/>
+              <a:t>and </a:t>
+            </a:r>
+            <a:r>
+              <a:rPr lang="en-US" sz="2000" dirty="0" err="1" smtClean="0"/>
+              <a:t>discountPercent</a:t>
+            </a:r>
+            <a:r>
+              <a:rPr lang="en-US" sz="2000" dirty="0" smtClean="0"/>
+              <a:t> if </a:t>
+            </a:r>
+            <a:r>
+              <a:rPr lang="en-US" sz="2000" dirty="0" smtClean="0"/>
+              <a:t>price is changed.</a:t>
             </a:r>
             <a:endParaRPr lang="en-US" sz="2000" dirty="0"/>
           </a:p>
@@ -12601,7 +12693,7 @@
         <p:spPr>
           <a:xfrm>
             <a:off x="696696" y="4940135"/>
-            <a:ext cx="7861465" cy="1015663"/>
+            <a:ext cx="11178629" cy="1323439"/>
           </a:xfrm>
           <a:prstGeom prst="rect">
             <a:avLst/>
@@ -12630,8 +12722,37 @@
             </a:pPr>
             <a:r>
               <a:rPr lang="en-US" sz="2000" dirty="0" smtClean="0"/>
-              <a:t>Find the subscribers of the product’s category.</a:t>
-            </a:r>
+              <a:t>Find the </a:t>
+            </a:r>
+            <a:r>
+              <a:rPr lang="en-US" sz="2000" dirty="0" smtClean="0"/>
+              <a:t>subscribers: </a:t>
+            </a:r>
+            <a:r>
+              <a:rPr lang="en-US" sz="2000" dirty="0" smtClean="0"/>
+              <a:t>of the product’s </a:t>
+            </a:r>
+            <a:r>
+              <a:rPr lang="en-US" sz="2000" dirty="0" smtClean="0"/>
+              <a:t>category whose </a:t>
+            </a:r>
+            <a:r>
+              <a:rPr lang="en-US" sz="2000" dirty="0" err="1" smtClean="0"/>
+              <a:t>minDiscountPercent</a:t>
+            </a:r>
+            <a:r>
+              <a:rPr lang="en-US" sz="2000" dirty="0" smtClean="0"/>
+              <a:t> &lt;= product’s </a:t>
+            </a:r>
+            <a:r>
+              <a:rPr lang="en-US" sz="2000" dirty="0" err="1" smtClean="0"/>
+              <a:t>discountPercent</a:t>
+            </a:r>
+            <a:r>
+              <a:rPr lang="en-US" sz="2000" dirty="0" smtClean="0"/>
+              <a:t>.</a:t>
+            </a:r>
+            <a:endParaRPr lang="en-US" sz="2000" dirty="0" smtClean="0"/>
           </a:p>
           <a:p>
             <a:pPr marL="342900" indent="-342900">

</xml_diff>

<commit_message>
Fix mail not delivered problem
</commit_message>
<xml_diff>
--- a/PriceMonitoringDesign.pptx
+++ b/PriceMonitoringDesign.pptx
@@ -231,7 +231,7 @@
           <a:p>
             <a:fld id="{822F189D-D7C4-2B4B-BA7D-F542C8765D31}" type="datetimeFigureOut">
               <a:rPr lang="en-US" smtClean="0"/>
-              <a:t>6/20/17</a:t>
+              <a:t>6/21/17</a:t>
             </a:fld>
             <a:endParaRPr lang="en-US" dirty="0"/>
           </a:p>
@@ -798,7 +798,7 @@
           <a:p>
             <a:fld id="{FE13B3C1-B50E-B844-B5EC-A0E6C3AA92EA}" type="datetimeFigureOut">
               <a:rPr lang="en-US" smtClean="0"/>
-              <a:t>6/20/17</a:t>
+              <a:t>6/21/17</a:t>
             </a:fld>
             <a:endParaRPr lang="en-US" dirty="0"/>
           </a:p>
@@ -968,7 +968,7 @@
           <a:p>
             <a:fld id="{FE13B3C1-B50E-B844-B5EC-A0E6C3AA92EA}" type="datetimeFigureOut">
               <a:rPr lang="en-US" smtClean="0"/>
-              <a:t>6/20/17</a:t>
+              <a:t>6/21/17</a:t>
             </a:fld>
             <a:endParaRPr lang="en-US" dirty="0"/>
           </a:p>
@@ -1148,7 +1148,7 @@
           <a:p>
             <a:fld id="{FE13B3C1-B50E-B844-B5EC-A0E6C3AA92EA}" type="datetimeFigureOut">
               <a:rPr lang="en-US" smtClean="0"/>
-              <a:t>6/20/17</a:t>
+              <a:t>6/21/17</a:t>
             </a:fld>
             <a:endParaRPr lang="en-US" dirty="0"/>
           </a:p>
@@ -1318,7 +1318,7 @@
           <a:p>
             <a:fld id="{FE13B3C1-B50E-B844-B5EC-A0E6C3AA92EA}" type="datetimeFigureOut">
               <a:rPr lang="en-US" smtClean="0"/>
-              <a:t>6/20/17</a:t>
+              <a:t>6/21/17</a:t>
             </a:fld>
             <a:endParaRPr lang="en-US" dirty="0"/>
           </a:p>
@@ -1564,7 +1564,7 @@
           <a:p>
             <a:fld id="{FE13B3C1-B50E-B844-B5EC-A0E6C3AA92EA}" type="datetimeFigureOut">
               <a:rPr lang="en-US" smtClean="0"/>
-              <a:t>6/20/17</a:t>
+              <a:t>6/21/17</a:t>
             </a:fld>
             <a:endParaRPr lang="en-US" dirty="0"/>
           </a:p>
@@ -1796,7 +1796,7 @@
           <a:p>
             <a:fld id="{FE13B3C1-B50E-B844-B5EC-A0E6C3AA92EA}" type="datetimeFigureOut">
               <a:rPr lang="en-US" smtClean="0"/>
-              <a:t>6/20/17</a:t>
+              <a:t>6/21/17</a:t>
             </a:fld>
             <a:endParaRPr lang="en-US" dirty="0"/>
           </a:p>
@@ -2163,7 +2163,7 @@
           <a:p>
             <a:fld id="{FE13B3C1-B50E-B844-B5EC-A0E6C3AA92EA}" type="datetimeFigureOut">
               <a:rPr lang="en-US" smtClean="0"/>
-              <a:t>6/20/17</a:t>
+              <a:t>6/21/17</a:t>
             </a:fld>
             <a:endParaRPr lang="en-US" dirty="0"/>
           </a:p>
@@ -2281,7 +2281,7 @@
           <a:p>
             <a:fld id="{FE13B3C1-B50E-B844-B5EC-A0E6C3AA92EA}" type="datetimeFigureOut">
               <a:rPr lang="en-US" smtClean="0"/>
-              <a:t>6/20/17</a:t>
+              <a:t>6/21/17</a:t>
             </a:fld>
             <a:endParaRPr lang="en-US" dirty="0"/>
           </a:p>
@@ -2376,7 +2376,7 @@
           <a:p>
             <a:fld id="{FE13B3C1-B50E-B844-B5EC-A0E6C3AA92EA}" type="datetimeFigureOut">
               <a:rPr lang="en-US" smtClean="0"/>
-              <a:t>6/20/17</a:t>
+              <a:t>6/21/17</a:t>
             </a:fld>
             <a:endParaRPr lang="en-US" dirty="0"/>
           </a:p>
@@ -2653,7 +2653,7 @@
           <a:p>
             <a:fld id="{FE13B3C1-B50E-B844-B5EC-A0E6C3AA92EA}" type="datetimeFigureOut">
               <a:rPr lang="en-US" smtClean="0"/>
-              <a:t>6/20/17</a:t>
+              <a:t>6/21/17</a:t>
             </a:fld>
             <a:endParaRPr lang="en-US" dirty="0"/>
           </a:p>
@@ -2906,7 +2906,7 @@
           <a:p>
             <a:fld id="{FE13B3C1-B50E-B844-B5EC-A0E6C3AA92EA}" type="datetimeFigureOut">
               <a:rPr lang="en-US" smtClean="0"/>
-              <a:t>6/20/17</a:t>
+              <a:t>6/21/17</a:t>
             </a:fld>
             <a:endParaRPr lang="en-US" dirty="0"/>
           </a:p>
@@ -3119,7 +3119,7 @@
           <a:p>
             <a:fld id="{FE13B3C1-B50E-B844-B5EC-A0E6C3AA92EA}" type="datetimeFigureOut">
               <a:rPr lang="en-US" smtClean="0"/>
-              <a:t>6/20/17</a:t>
+              <a:t>6/21/17</a:t>
             </a:fld>
             <a:endParaRPr lang="en-US" dirty="0"/>
           </a:p>
@@ -4051,7 +4051,25 @@
           <a:p>
             <a:r>
               <a:rPr lang="en-US" sz="2000" dirty="0" smtClean="0"/>
-              <a:t>POST	/</a:t>
+              <a:t>POST	/users/{</a:t>
+            </a:r>
+            <a:r>
+              <a:rPr lang="en-US" sz="2000" dirty="0" err="1" smtClean="0"/>
+              <a:t>userId</a:t>
+            </a:r>
+            <a:r>
+              <a:rPr lang="en-US" sz="2000" dirty="0" smtClean="0"/>
+              <a:t>}/categories						Subscribe category</a:t>
+            </a:r>
+          </a:p>
+          <a:p>
+            <a:r>
+              <a:rPr lang="en-US" sz="2000" dirty="0" smtClean="0"/>
+              <a:t>PUT</a:t>
+            </a:r>
+            <a:r>
+              <a:rPr lang="en-US" sz="2000" dirty="0"/>
+              <a:t>	/</a:t>
             </a:r>
             <a:r>
               <a:rPr lang="en-US" sz="2000" dirty="0" smtClean="0"/>
@@ -4063,40 +4081,6 @@
             </a:r>
             <a:r>
               <a:rPr lang="en-US" sz="2000" dirty="0" smtClean="0"/>
-              <a:t>}/categories			</a:t>
-            </a:r>
-            <a:r>
-              <a:rPr lang="en-US" sz="2000" dirty="0" smtClean="0"/>
-              <a:t>			</a:t>
-            </a:r>
-            <a:r>
-              <a:rPr lang="en-US" sz="2000" dirty="0" smtClean="0"/>
-              <a:t>Subscribe </a:t>
-            </a:r>
-            <a:r>
-              <a:rPr lang="en-US" sz="2000" dirty="0" smtClean="0"/>
-              <a:t>category</a:t>
-            </a:r>
-          </a:p>
-          <a:p>
-            <a:r>
-              <a:rPr lang="en-US" sz="2000" dirty="0" smtClean="0"/>
-              <a:t>PUT</a:t>
-            </a:r>
-            <a:r>
-              <a:rPr lang="en-US" sz="2000" dirty="0"/>
-              <a:t>	/</a:t>
-            </a:r>
-            <a:r>
-              <a:rPr lang="en-US" sz="2000" dirty="0" smtClean="0"/>
-              <a:t>users/{</a:t>
-            </a:r>
-            <a:r>
-              <a:rPr lang="en-US" sz="2000" dirty="0" err="1" smtClean="0"/>
-              <a:t>userId</a:t>
-            </a:r>
-            <a:r>
-              <a:rPr lang="en-US" sz="2000" dirty="0" smtClean="0"/>
               <a:t>}/categories</a:t>
             </a:r>
             <a:r>
@@ -4115,11 +4099,7 @@
           <a:p>
             <a:r>
               <a:rPr lang="en-US" sz="2000" dirty="0" smtClean="0"/>
-              <a:t>DELETE</a:t>
-            </a:r>
-            <a:r>
-              <a:rPr lang="en-US" sz="2000" dirty="0" smtClean="0"/>
-              <a:t>	/users/{userId}/categories/{categoryId}				Unsubscribe category</a:t>
+              <a:t>DELETE	/users/{userId}/categories/{categoryId}				Unsubscribe category</a:t>
             </a:r>
           </a:p>
           <a:p>
@@ -4175,11 +4155,7 @@
             </a:r>
             <a:r>
               <a:rPr lang="en-US" sz="2000" dirty="0" smtClean="0"/>
-              <a:t>=&lt;minimum discount percentage</a:t>
-            </a:r>
-            <a:r>
-              <a:rPr lang="en-US" sz="2000" dirty="0" smtClean="0"/>
-              <a:t>&gt;</a:t>
+              <a:t>=&lt;minimum discount percentage&gt;</a:t>
             </a:r>
           </a:p>
         </p:txBody>
@@ -12274,11 +12250,7 @@
             </a:pPr>
             <a:r>
               <a:rPr lang="en-US" sz="2000" dirty="0" smtClean="0"/>
-              <a:t>Update cache and DB with new price </a:t>
-            </a:r>
-            <a:r>
-              <a:rPr lang="en-US" sz="2000" dirty="0" smtClean="0"/>
-              <a:t>and </a:t>
+              <a:t>Update cache and DB with new price and </a:t>
             </a:r>
             <a:r>
               <a:rPr lang="en-US" sz="2000" dirty="0" err="1" smtClean="0"/>
@@ -12286,11 +12258,7 @@
             </a:r>
             <a:r>
               <a:rPr lang="en-US" sz="2000" dirty="0" smtClean="0"/>
-              <a:t> if </a:t>
-            </a:r>
-            <a:r>
-              <a:rPr lang="en-US" sz="2000" dirty="0" smtClean="0"/>
-              <a:t>price is changed.</a:t>
+              <a:t> if price is changed.</a:t>
             </a:r>
             <a:endParaRPr lang="en-US" sz="2000" dirty="0"/>
           </a:p>
@@ -12722,19 +12690,7 @@
             </a:pPr>
             <a:r>
               <a:rPr lang="en-US" sz="2000" dirty="0" smtClean="0"/>
-              <a:t>Find the </a:t>
-            </a:r>
-            <a:r>
-              <a:rPr lang="en-US" sz="2000" dirty="0" smtClean="0"/>
-              <a:t>subscribers: </a:t>
-            </a:r>
-            <a:r>
-              <a:rPr lang="en-US" sz="2000" dirty="0" smtClean="0"/>
-              <a:t>of the product’s </a:t>
-            </a:r>
-            <a:r>
-              <a:rPr lang="en-US" sz="2000" dirty="0" smtClean="0"/>
-              <a:t>category whose </a:t>
+              <a:t>Find the subscribers: of the product’s category whose </a:t>
             </a:r>
             <a:r>
               <a:rPr lang="en-US" sz="2000" dirty="0" err="1" smtClean="0"/>
@@ -12752,7 +12708,6 @@
               <a:rPr lang="en-US" sz="2000" dirty="0" smtClean="0"/>
               <a:t>.</a:t>
             </a:r>
-            <a:endParaRPr lang="en-US" sz="2000" dirty="0" smtClean="0"/>
           </a:p>
           <a:p>
             <a:pPr marL="342900" indent="-342900">

</xml_diff>

<commit_message>
Change schedule of crawlers
</commit_message>
<xml_diff>
--- a/PriceMonitoringDesign.pptx
+++ b/PriceMonitoringDesign.pptx
@@ -231,7 +231,7 @@
           <a:p>
             <a:fld id="{822F189D-D7C4-2B4B-BA7D-F542C8765D31}" type="datetimeFigureOut">
               <a:rPr lang="en-US" smtClean="0"/>
-              <a:t>6/21/17</a:t>
+              <a:t>6/22/17</a:t>
             </a:fld>
             <a:endParaRPr lang="en-US" dirty="0"/>
           </a:p>
@@ -798,7 +798,7 @@
           <a:p>
             <a:fld id="{FE13B3C1-B50E-B844-B5EC-A0E6C3AA92EA}" type="datetimeFigureOut">
               <a:rPr lang="en-US" smtClean="0"/>
-              <a:t>6/21/17</a:t>
+              <a:t>6/22/17</a:t>
             </a:fld>
             <a:endParaRPr lang="en-US" dirty="0"/>
           </a:p>
@@ -968,7 +968,7 @@
           <a:p>
             <a:fld id="{FE13B3C1-B50E-B844-B5EC-A0E6C3AA92EA}" type="datetimeFigureOut">
               <a:rPr lang="en-US" smtClean="0"/>
-              <a:t>6/21/17</a:t>
+              <a:t>6/22/17</a:t>
             </a:fld>
             <a:endParaRPr lang="en-US" dirty="0"/>
           </a:p>
@@ -1148,7 +1148,7 @@
           <a:p>
             <a:fld id="{FE13B3C1-B50E-B844-B5EC-A0E6C3AA92EA}" type="datetimeFigureOut">
               <a:rPr lang="en-US" smtClean="0"/>
-              <a:t>6/21/17</a:t>
+              <a:t>6/22/17</a:t>
             </a:fld>
             <a:endParaRPr lang="en-US" dirty="0"/>
           </a:p>
@@ -1318,7 +1318,7 @@
           <a:p>
             <a:fld id="{FE13B3C1-B50E-B844-B5EC-A0E6C3AA92EA}" type="datetimeFigureOut">
               <a:rPr lang="en-US" smtClean="0"/>
-              <a:t>6/21/17</a:t>
+              <a:t>6/22/17</a:t>
             </a:fld>
             <a:endParaRPr lang="en-US" dirty="0"/>
           </a:p>
@@ -1564,7 +1564,7 @@
           <a:p>
             <a:fld id="{FE13B3C1-B50E-B844-B5EC-A0E6C3AA92EA}" type="datetimeFigureOut">
               <a:rPr lang="en-US" smtClean="0"/>
-              <a:t>6/21/17</a:t>
+              <a:t>6/22/17</a:t>
             </a:fld>
             <a:endParaRPr lang="en-US" dirty="0"/>
           </a:p>
@@ -1796,7 +1796,7 @@
           <a:p>
             <a:fld id="{FE13B3C1-B50E-B844-B5EC-A0E6C3AA92EA}" type="datetimeFigureOut">
               <a:rPr lang="en-US" smtClean="0"/>
-              <a:t>6/21/17</a:t>
+              <a:t>6/22/17</a:t>
             </a:fld>
             <a:endParaRPr lang="en-US" dirty="0"/>
           </a:p>
@@ -2163,7 +2163,7 @@
           <a:p>
             <a:fld id="{FE13B3C1-B50E-B844-B5EC-A0E6C3AA92EA}" type="datetimeFigureOut">
               <a:rPr lang="en-US" smtClean="0"/>
-              <a:t>6/21/17</a:t>
+              <a:t>6/22/17</a:t>
             </a:fld>
             <a:endParaRPr lang="en-US" dirty="0"/>
           </a:p>
@@ -2281,7 +2281,7 @@
           <a:p>
             <a:fld id="{FE13B3C1-B50E-B844-B5EC-A0E6C3AA92EA}" type="datetimeFigureOut">
               <a:rPr lang="en-US" smtClean="0"/>
-              <a:t>6/21/17</a:t>
+              <a:t>6/22/17</a:t>
             </a:fld>
             <a:endParaRPr lang="en-US" dirty="0"/>
           </a:p>
@@ -2376,7 +2376,7 @@
           <a:p>
             <a:fld id="{FE13B3C1-B50E-B844-B5EC-A0E6C3AA92EA}" type="datetimeFigureOut">
               <a:rPr lang="en-US" smtClean="0"/>
-              <a:t>6/21/17</a:t>
+              <a:t>6/22/17</a:t>
             </a:fld>
             <a:endParaRPr lang="en-US" dirty="0"/>
           </a:p>
@@ -2653,7 +2653,7 @@
           <a:p>
             <a:fld id="{FE13B3C1-B50E-B844-B5EC-A0E6C3AA92EA}" type="datetimeFigureOut">
               <a:rPr lang="en-US" smtClean="0"/>
-              <a:t>6/21/17</a:t>
+              <a:t>6/22/17</a:t>
             </a:fld>
             <a:endParaRPr lang="en-US" dirty="0"/>
           </a:p>
@@ -2906,7 +2906,7 @@
           <a:p>
             <a:fld id="{FE13B3C1-B50E-B844-B5EC-A0E6C3AA92EA}" type="datetimeFigureOut">
               <a:rPr lang="en-US" smtClean="0"/>
-              <a:t>6/21/17</a:t>
+              <a:t>6/22/17</a:t>
             </a:fld>
             <a:endParaRPr lang="en-US" dirty="0"/>
           </a:p>
@@ -3119,7 +3119,7 @@
           <a:p>
             <a:fld id="{FE13B3C1-B50E-B844-B5EC-A0E6C3AA92EA}" type="datetimeFigureOut">
               <a:rPr lang="en-US" smtClean="0"/>
-              <a:t>6/21/17</a:t>
+              <a:t>6/22/17</a:t>
             </a:fld>
             <a:endParaRPr lang="en-US" dirty="0"/>
           </a:p>
@@ -4679,15 +4679,7 @@
             </a:r>
             <a:r>
               <a:rPr lang="en-US" dirty="0" smtClean="0"/>
-              <a:t>eeps track of product prices at </a:t>
-            </a:r>
-            <a:r>
-              <a:rPr lang="en-US" dirty="0" smtClean="0"/>
-              <a:t>an online </a:t>
-            </a:r>
-            <a:r>
-              <a:rPr lang="en-US" dirty="0" smtClean="0"/>
-              <a:t>shopping web site. </a:t>
+              <a:t>eeps track of product prices at an online shopping web site. </a:t>
             </a:r>
           </a:p>
           <a:p>
@@ -4703,11 +4695,7 @@
             </a:r>
             <a:r>
               <a:rPr lang="en-US" dirty="0" smtClean="0"/>
-              <a:t>there is any discount product in the subscribed categories</a:t>
-            </a:r>
-            <a:r>
-              <a:rPr lang="en-US" dirty="0" smtClean="0"/>
-              <a:t>.</a:t>
+              <a:t>there is any discount product in the subscribed categories.</a:t>
             </a:r>
           </a:p>
           <a:p>
@@ -9234,7 +9222,15 @@
             <a:pPr algn="l"/>
             <a:r>
               <a:rPr lang="en-US" sz="2000" dirty="0" smtClean="0"/>
-              <a:t>Executed weekly at 00:00:00 AM Sunday</a:t>
+              <a:t>Executed weekly at </a:t>
+            </a:r>
+            <a:r>
+              <a:rPr lang="en-US" sz="2000" dirty="0" smtClean="0"/>
+              <a:t>07:00:00 </a:t>
+            </a:r>
+            <a:r>
+              <a:rPr lang="en-US" sz="2000" dirty="0" smtClean="0"/>
+              <a:t>AM Sunday</a:t>
             </a:r>
             <a:endParaRPr lang="en-US" sz="2000" dirty="0"/>
           </a:p>
@@ -9883,7 +9879,15 @@
             <a:pPr algn="l"/>
             <a:r>
               <a:rPr lang="en-US" sz="2000" dirty="0" smtClean="0"/>
-              <a:t>Update category priority at 00:00:00 AM Monday - Saturday</a:t>
+              <a:t>Update category priority at </a:t>
+            </a:r>
+            <a:r>
+              <a:rPr lang="en-US" sz="2000" dirty="0" smtClean="0"/>
+              <a:t>07:00:00 </a:t>
+            </a:r>
+            <a:r>
+              <a:rPr lang="en-US" sz="2000" dirty="0" smtClean="0"/>
+              <a:t>AM Monday - Saturday</a:t>
             </a:r>
             <a:endParaRPr lang="en-US" sz="2000" dirty="0"/>
           </a:p>
@@ -10070,8 +10074,21 @@
           <a:p>
             <a:r>
               <a:rPr lang="en-US" dirty="0"/>
-              <a:t>HIGH priority: executed every 3 hours starting at 01:00:00 AM</a:t>
-            </a:r>
+              <a:t>HIGH priority: executed every 3 hours starting at </a:t>
+            </a:r>
+            <a:r>
+              <a:rPr lang="en-US" dirty="0" smtClean="0"/>
+              <a:t>08:00:00 </a:t>
+            </a:r>
+            <a:r>
+              <a:rPr lang="en-US" dirty="0"/>
+              <a:t>A</a:t>
+            </a:r>
+            <a:r>
+              <a:rPr lang="en-US" dirty="0" smtClean="0"/>
+              <a:t>M</a:t>
+            </a:r>
+            <a:endParaRPr lang="en-US" dirty="0"/>
           </a:p>
         </p:txBody>
       </p:sp>
@@ -10099,7 +10116,11 @@
           <a:p>
             <a:r>
               <a:rPr lang="en-US" dirty="0"/>
-              <a:t>MIDUM priority: executed every 12 hours starting at 02:00:00 </a:t>
+              <a:t>MIDUM priority: executed every 12 hours starting at </a:t>
+            </a:r>
+            <a:r>
+              <a:rPr lang="en-US" dirty="0" smtClean="0"/>
+              <a:t>09:00:00 </a:t>
             </a:r>
             <a:r>
               <a:rPr lang="en-US" dirty="0" smtClean="0"/>
@@ -10133,7 +10154,19 @@
           <a:p>
             <a:r>
               <a:rPr lang="en-US" dirty="0"/>
-              <a:t>LOW priority: executed every day at 03:00:00 AM</a:t>
+              <a:t>LOW priority: executed every day at </a:t>
+            </a:r>
+            <a:r>
+              <a:rPr lang="en-US" dirty="0" smtClean="0"/>
+              <a:t>10</a:t>
+            </a:r>
+            <a:r>
+              <a:rPr lang="en-US" dirty="0" smtClean="0"/>
+              <a:t>:00:00 </a:t>
+            </a:r>
+            <a:r>
+              <a:rPr lang="en-US" dirty="0"/>
+              <a:t>AM</a:t>
             </a:r>
           </a:p>
         </p:txBody>

</xml_diff>

<commit_message>
Update wording of pptx
</commit_message>
<xml_diff>
--- a/PriceMonitoringDesign.pptx
+++ b/PriceMonitoringDesign.pptx
@@ -231,7 +231,7 @@
           <a:p>
             <a:fld id="{822F189D-D7C4-2B4B-BA7D-F542C8765D31}" type="datetimeFigureOut">
               <a:rPr lang="en-US" smtClean="0"/>
-              <a:t>6/22/17</a:t>
+              <a:t>7/1/17</a:t>
             </a:fld>
             <a:endParaRPr lang="en-US" dirty="0"/>
           </a:p>
@@ -798,7 +798,7 @@
           <a:p>
             <a:fld id="{FE13B3C1-B50E-B844-B5EC-A0E6C3AA92EA}" type="datetimeFigureOut">
               <a:rPr lang="en-US" smtClean="0"/>
-              <a:t>6/22/17</a:t>
+              <a:t>7/1/17</a:t>
             </a:fld>
             <a:endParaRPr lang="en-US" dirty="0"/>
           </a:p>
@@ -968,7 +968,7 @@
           <a:p>
             <a:fld id="{FE13B3C1-B50E-B844-B5EC-A0E6C3AA92EA}" type="datetimeFigureOut">
               <a:rPr lang="en-US" smtClean="0"/>
-              <a:t>6/22/17</a:t>
+              <a:t>7/1/17</a:t>
             </a:fld>
             <a:endParaRPr lang="en-US" dirty="0"/>
           </a:p>
@@ -1148,7 +1148,7 @@
           <a:p>
             <a:fld id="{FE13B3C1-B50E-B844-B5EC-A0E6C3AA92EA}" type="datetimeFigureOut">
               <a:rPr lang="en-US" smtClean="0"/>
-              <a:t>6/22/17</a:t>
+              <a:t>7/1/17</a:t>
             </a:fld>
             <a:endParaRPr lang="en-US" dirty="0"/>
           </a:p>
@@ -1318,7 +1318,7 @@
           <a:p>
             <a:fld id="{FE13B3C1-B50E-B844-B5EC-A0E6C3AA92EA}" type="datetimeFigureOut">
               <a:rPr lang="en-US" smtClean="0"/>
-              <a:t>6/22/17</a:t>
+              <a:t>7/1/17</a:t>
             </a:fld>
             <a:endParaRPr lang="en-US" dirty="0"/>
           </a:p>
@@ -1564,7 +1564,7 @@
           <a:p>
             <a:fld id="{FE13B3C1-B50E-B844-B5EC-A0E6C3AA92EA}" type="datetimeFigureOut">
               <a:rPr lang="en-US" smtClean="0"/>
-              <a:t>6/22/17</a:t>
+              <a:t>7/1/17</a:t>
             </a:fld>
             <a:endParaRPr lang="en-US" dirty="0"/>
           </a:p>
@@ -1796,7 +1796,7 @@
           <a:p>
             <a:fld id="{FE13B3C1-B50E-B844-B5EC-A0E6C3AA92EA}" type="datetimeFigureOut">
               <a:rPr lang="en-US" smtClean="0"/>
-              <a:t>6/22/17</a:t>
+              <a:t>7/1/17</a:t>
             </a:fld>
             <a:endParaRPr lang="en-US" dirty="0"/>
           </a:p>
@@ -2163,7 +2163,7 @@
           <a:p>
             <a:fld id="{FE13B3C1-B50E-B844-B5EC-A0E6C3AA92EA}" type="datetimeFigureOut">
               <a:rPr lang="en-US" smtClean="0"/>
-              <a:t>6/22/17</a:t>
+              <a:t>7/1/17</a:t>
             </a:fld>
             <a:endParaRPr lang="en-US" dirty="0"/>
           </a:p>
@@ -2281,7 +2281,7 @@
           <a:p>
             <a:fld id="{FE13B3C1-B50E-B844-B5EC-A0E6C3AA92EA}" type="datetimeFigureOut">
               <a:rPr lang="en-US" smtClean="0"/>
-              <a:t>6/22/17</a:t>
+              <a:t>7/1/17</a:t>
             </a:fld>
             <a:endParaRPr lang="en-US" dirty="0"/>
           </a:p>
@@ -2376,7 +2376,7 @@
           <a:p>
             <a:fld id="{FE13B3C1-B50E-B844-B5EC-A0E6C3AA92EA}" type="datetimeFigureOut">
               <a:rPr lang="en-US" smtClean="0"/>
-              <a:t>6/22/17</a:t>
+              <a:t>7/1/17</a:t>
             </a:fld>
             <a:endParaRPr lang="en-US" dirty="0"/>
           </a:p>
@@ -2653,7 +2653,7 @@
           <a:p>
             <a:fld id="{FE13B3C1-B50E-B844-B5EC-A0E6C3AA92EA}" type="datetimeFigureOut">
               <a:rPr lang="en-US" smtClean="0"/>
-              <a:t>6/22/17</a:t>
+              <a:t>7/1/17</a:t>
             </a:fld>
             <a:endParaRPr lang="en-US" dirty="0"/>
           </a:p>
@@ -2906,7 +2906,7 @@
           <a:p>
             <a:fld id="{FE13B3C1-B50E-B844-B5EC-A0E6C3AA92EA}" type="datetimeFigureOut">
               <a:rPr lang="en-US" smtClean="0"/>
-              <a:t>6/22/17</a:t>
+              <a:t>7/1/17</a:t>
             </a:fld>
             <a:endParaRPr lang="en-US" dirty="0"/>
           </a:p>
@@ -3119,7 +3119,7 @@
           <a:p>
             <a:fld id="{FE13B3C1-B50E-B844-B5EC-A0E6C3AA92EA}" type="datetimeFigureOut">
               <a:rPr lang="en-US" smtClean="0"/>
-              <a:t>6/22/17</a:t>
+              <a:t>7/1/17</a:t>
             </a:fld>
             <a:endParaRPr lang="en-US" dirty="0"/>
           </a:p>
@@ -4679,7 +4679,15 @@
             </a:r>
             <a:r>
               <a:rPr lang="en-US" dirty="0" smtClean="0"/>
-              <a:t>eeps track of product prices at an online shopping web site. </a:t>
+              <a:t>eeps track of product prices at an </a:t>
+            </a:r>
+            <a:r>
+              <a:rPr lang="en-US" dirty="0" smtClean="0"/>
+              <a:t>e-commerce </a:t>
+            </a:r>
+            <a:r>
+              <a:rPr lang="en-US" dirty="0" smtClean="0"/>
+              <a:t>web site. </a:t>
             </a:r>
           </a:p>
           <a:p>
@@ -4701,18 +4709,25 @@
           <a:p>
             <a:r>
               <a:rPr lang="en-US" dirty="0" smtClean="0"/>
-              <a:t>Subscribers can specify minimum discount threshold of each category for </a:t>
-            </a:r>
-            <a:r>
-              <a:rPr lang="en-US" smtClean="0"/>
-              <a:t>receiving notifications.</a:t>
-            </a:r>
-            <a:endParaRPr lang="en-US" dirty="0" smtClean="0"/>
-          </a:p>
-          <a:p>
+              <a:t>Subscribers can specify </a:t>
+            </a:r>
             <a:r>
               <a:rPr lang="en-US" dirty="0" smtClean="0"/>
-              <a:t>Also allows users </a:t>
+              <a:t>the minimum </a:t>
+            </a:r>
+            <a:r>
+              <a:rPr lang="en-US" dirty="0" smtClean="0"/>
+              <a:t>discount threshold of each category for receiving notifications.</a:t>
+            </a:r>
+          </a:p>
+          <a:p>
+            <a:r>
+              <a:rPr lang="en-US" dirty="0" smtClean="0"/>
+              <a:t>Allows </a:t>
+            </a:r>
+            <a:r>
+              <a:rPr lang="en-US" dirty="0" smtClean="0"/>
+              <a:t>users </a:t>
             </a:r>
             <a:r>
               <a:rPr lang="en-US" dirty="0"/>
@@ -4720,7 +4735,11 @@
             </a:r>
             <a:r>
               <a:rPr lang="en-US" dirty="0" smtClean="0"/>
-              <a:t>online.</a:t>
+              <a:t>of any category online</a:t>
+            </a:r>
+            <a:r>
+              <a:rPr lang="en-US" dirty="0" smtClean="0"/>
+              <a:t>.</a:t>
             </a:r>
             <a:endParaRPr lang="en-US" dirty="0"/>
           </a:p>
@@ -9222,15 +9241,7 @@
             <a:pPr algn="l"/>
             <a:r>
               <a:rPr lang="en-US" sz="2000" dirty="0" smtClean="0"/>
-              <a:t>Executed weekly at </a:t>
-            </a:r>
-            <a:r>
-              <a:rPr lang="en-US" sz="2000" dirty="0" smtClean="0"/>
-              <a:t>07:00:00 </a:t>
-            </a:r>
-            <a:r>
-              <a:rPr lang="en-US" sz="2000" dirty="0" smtClean="0"/>
-              <a:t>AM Sunday</a:t>
+              <a:t>Executed weekly at 07:00:00 AM Sunday</a:t>
             </a:r>
             <a:endParaRPr lang="en-US" sz="2000" dirty="0"/>
           </a:p>
@@ -9484,7 +9495,15 @@
             </a:pPr>
             <a:r>
               <a:rPr lang="en-US" sz="2000" dirty="0" smtClean="0"/>
-              <a:t>Crawl categories from online shopping web site.</a:t>
+              <a:t>Crawl categories from </a:t>
+            </a:r>
+            <a:r>
+              <a:rPr lang="en-US" sz="2000" dirty="0" smtClean="0"/>
+              <a:t>an e-commerce </a:t>
+            </a:r>
+            <a:r>
+              <a:rPr lang="en-US" sz="2000" dirty="0" smtClean="0"/>
+              <a:t>web site.</a:t>
             </a:r>
           </a:p>
           <a:p>
@@ -9494,7 +9513,15 @@
             </a:pPr>
             <a:r>
               <a:rPr lang="en-US" sz="2000" dirty="0" smtClean="0"/>
-              <a:t>For each category, find the product list url, store the information into DB.</a:t>
+              <a:t>For each category, find the product list </a:t>
+            </a:r>
+            <a:r>
+              <a:rPr lang="en-US" sz="2000" dirty="0" smtClean="0"/>
+              <a:t>URL, </a:t>
+            </a:r>
+            <a:r>
+              <a:rPr lang="en-US" sz="2000" dirty="0" smtClean="0"/>
+              <a:t>store the information into DB.</a:t>
             </a:r>
           </a:p>
           <a:p>
@@ -9593,13 +9620,10 @@
               <a:t>also be changed at run time through REST </a:t>
             </a:r>
             <a:r>
-              <a:rPr lang="en-US" sz="2000" dirty="0" err="1" smtClean="0"/>
-              <a:t>api</a:t>
-            </a:r>
-            <a:r>
               <a:rPr lang="en-US" sz="2000" dirty="0" smtClean="0"/>
-              <a:t>:</a:t>
-            </a:r>
+              <a:t>API:</a:t>
+            </a:r>
+            <a:endParaRPr lang="en-US" sz="2000" dirty="0" smtClean="0"/>
           </a:p>
           <a:p>
             <a:pPr marL="285750" indent="-285750">
@@ -9879,15 +9903,7 @@
             <a:pPr algn="l"/>
             <a:r>
               <a:rPr lang="en-US" sz="2000" dirty="0" smtClean="0"/>
-              <a:t>Update category priority at </a:t>
-            </a:r>
-            <a:r>
-              <a:rPr lang="en-US" sz="2000" dirty="0" smtClean="0"/>
-              <a:t>07:00:00 </a:t>
-            </a:r>
-            <a:r>
-              <a:rPr lang="en-US" sz="2000" dirty="0" smtClean="0"/>
-              <a:t>AM Monday - Saturday</a:t>
+              <a:t>Update category priority at 07:00:00 AM Monday - Saturday</a:t>
             </a:r>
             <a:endParaRPr lang="en-US" sz="2000" dirty="0"/>
           </a:p>
@@ -10120,11 +10136,7 @@
             </a:r>
             <a:r>
               <a:rPr lang="en-US" dirty="0" smtClean="0"/>
-              <a:t>09:00:00 </a:t>
-            </a:r>
-            <a:r>
-              <a:rPr lang="en-US" dirty="0" smtClean="0"/>
-              <a:t>AM</a:t>
+              <a:t>09:00:00 AM</a:t>
             </a:r>
             <a:endParaRPr lang="en-US" dirty="0"/>
           </a:p>
@@ -10158,11 +10170,7 @@
             </a:r>
             <a:r>
               <a:rPr lang="en-US" dirty="0" smtClean="0"/>
-              <a:t>10</a:t>
-            </a:r>
-            <a:r>
-              <a:rPr lang="en-US" dirty="0" smtClean="0"/>
-              <a:t>:00:00 </a:t>
+              <a:t>10:00:00 </a:t>
             </a:r>
             <a:r>
               <a:rPr lang="en-US" dirty="0"/>
@@ -10374,12 +10382,8 @@
               <a:buChar char="•"/>
             </a:pPr>
             <a:r>
-              <a:rPr lang="en-US" sz="2000" smtClean="0"/>
-              <a:t>Get categories </a:t>
-            </a:r>
-            <a:r>
               <a:rPr lang="en-US" sz="2000" dirty="0" smtClean="0"/>
-              <a:t>from Category table with the matching priority.</a:t>
+              <a:t>Get categories from Category table with the matching priority.</a:t>
             </a:r>
           </a:p>
           <a:p>
@@ -10422,7 +10426,15 @@
             </a:pPr>
             <a:r>
               <a:rPr lang="en-US" sz="2000" dirty="0" smtClean="0"/>
-              <a:t>The worker thread crawls the online shopping web site with product_list_url to get all products.</a:t>
+              <a:t>The worker thread crawls the </a:t>
+            </a:r>
+            <a:r>
+              <a:rPr lang="en-US" sz="2000" dirty="0" smtClean="0"/>
+              <a:t>e-commerce </a:t>
+            </a:r>
+            <a:r>
+              <a:rPr lang="en-US" sz="2000" dirty="0" smtClean="0"/>
+              <a:t>web site with product_list_url to get all products.</a:t>
             </a:r>
           </a:p>
           <a:p>
@@ -12296,7 +12308,15 @@
             </a:pPr>
             <a:r>
               <a:rPr lang="en-US" sz="2000" dirty="0" smtClean="0"/>
-              <a:t>If product exists in cache, compare if price is reduced, if yes, send product to q_discount_product_p(n) .</a:t>
+              <a:t>If product exists in cache, </a:t>
+            </a:r>
+            <a:r>
+              <a:rPr lang="en-US" sz="2000" dirty="0" smtClean="0"/>
+              <a:t>check if </a:t>
+            </a:r>
+            <a:r>
+              <a:rPr lang="en-US" sz="2000" dirty="0" smtClean="0"/>
+              <a:t>price is reduced, if yes, send product to q_discount_product_p(n) .</a:t>
             </a:r>
           </a:p>
           <a:p>

</xml_diff>